<commit_message>
First round of feedback from David.
</commit_message>
<xml_diff>
--- a/analytics_for_hmos.pptx
+++ b/analytics_for_hmos.pptx
@@ -11,7 +11,7 @@
     <p:sldMasterId id="2147483693" r:id="rId7"/>
   </p:sldMasterIdLst>
   <p:notesMasterIdLst>
-    <p:notesMasterId r:id="rId26"/>
+    <p:notesMasterId r:id="rId28"/>
   </p:notesMasterIdLst>
   <p:sldIdLst>
     <p:sldId id="256" r:id="rId8"/>
@@ -19,19 +19,21 @@
     <p:sldId id="258" r:id="rId10"/>
     <p:sldId id="261" r:id="rId11"/>
     <p:sldId id="260" r:id="rId12"/>
-    <p:sldId id="263" r:id="rId13"/>
-    <p:sldId id="264" r:id="rId14"/>
-    <p:sldId id="266" r:id="rId15"/>
-    <p:sldId id="267" r:id="rId16"/>
-    <p:sldId id="270" r:id="rId17"/>
-    <p:sldId id="271" r:id="rId18"/>
-    <p:sldId id="269" r:id="rId19"/>
-    <p:sldId id="274" r:id="rId20"/>
-    <p:sldId id="275" r:id="rId21"/>
-    <p:sldId id="259" r:id="rId22"/>
-    <p:sldId id="262" r:id="rId23"/>
-    <p:sldId id="277" r:id="rId24"/>
-    <p:sldId id="276" r:id="rId25"/>
+    <p:sldId id="278" r:id="rId13"/>
+    <p:sldId id="279" r:id="rId14"/>
+    <p:sldId id="263" r:id="rId15"/>
+    <p:sldId id="264" r:id="rId16"/>
+    <p:sldId id="266" r:id="rId17"/>
+    <p:sldId id="267" r:id="rId18"/>
+    <p:sldId id="270" r:id="rId19"/>
+    <p:sldId id="271" r:id="rId20"/>
+    <p:sldId id="269" r:id="rId21"/>
+    <p:sldId id="274" r:id="rId22"/>
+    <p:sldId id="275" r:id="rId23"/>
+    <p:sldId id="259" r:id="rId24"/>
+    <p:sldId id="262" r:id="rId25"/>
+    <p:sldId id="277" r:id="rId26"/>
+    <p:sldId id="276" r:id="rId27"/>
   </p:sldIdLst>
   <p:sldSz cx="12192000" cy="6858000"/>
   <p:notesSz cx="6858000" cy="9144000"/>
@@ -231,7 +233,7 @@
           <a:p>
             <a:fld id="{51870728-32F9-4016-A7F9-3908380B41C6}" type="datetimeFigureOut">
               <a:rPr lang="en-US" smtClean="0"/>
-              <a:t>3/3/2019</a:t>
+              <a:t>3/6/2019</a:t>
             </a:fld>
             <a:endParaRPr lang="en-US"/>
           </a:p>
@@ -896,227 +898,10 @@
           <a:bodyPr/>
           <a:lstStyle/>
           <a:p>
-            <a:pPr marL="0" marR="0" lvl="0" indent="0" algn="l" defTabSz="914400" rtl="0" eaLnBrk="1" fontAlgn="auto" latinLnBrk="0" hangingPunct="1">
-              <a:lnSpc>
-                <a:spcPct val="100000"/>
-              </a:lnSpc>
-              <a:spcBef>
-                <a:spcPts val="0"/>
-              </a:spcBef>
-              <a:spcAft>
-                <a:spcPts val="0"/>
-              </a:spcAft>
-              <a:buClrTx/>
-              <a:buSzTx/>
-              <a:buFontTx/>
-              <a:buNone/>
-              <a:tabLst/>
-              <a:defRPr/>
-            </a:pPr>
-            <a:r>
-              <a:rPr lang="en-US" sz="1200" kern="1200" dirty="0">
-                <a:solidFill>
-                  <a:schemeClr val="tx1"/>
-                </a:solidFill>
-                <a:effectLst/>
-                <a:latin typeface="+mn-lt"/>
-                <a:ea typeface="+mn-ea"/>
-                <a:cs typeface="+mn-cs"/>
-              </a:rPr>
-              <a:t>Couple of lines of particular interest:</a:t>
-            </a:r>
-          </a:p>
-          <a:p>
-            <a:pPr marL="228600" marR="0" lvl="0" indent="-228600" algn="l" defTabSz="914400" rtl="0" eaLnBrk="1" fontAlgn="auto" latinLnBrk="0" hangingPunct="1">
-              <a:lnSpc>
-                <a:spcPct val="100000"/>
-              </a:lnSpc>
-              <a:spcBef>
-                <a:spcPts val="0"/>
-              </a:spcBef>
-              <a:spcAft>
-                <a:spcPts val="0"/>
-              </a:spcAft>
-              <a:buClrTx/>
-              <a:buSzTx/>
-              <a:buFont typeface="+mj-lt"/>
-              <a:buAutoNum type="arabicPeriod"/>
-              <a:tabLst/>
-              <a:defRPr/>
-            </a:pPr>
-            <a:r>
-              <a:rPr lang="en-US" sz="1200" kern="1200" dirty="0">
-                <a:solidFill>
-                  <a:schemeClr val="tx1"/>
-                </a:solidFill>
-                <a:effectLst/>
-                <a:latin typeface="+mn-lt"/>
-                <a:ea typeface="+mn-ea"/>
-                <a:cs typeface="+mn-cs"/>
-              </a:rPr>
-              <a:t>The purple ‘cheating’ line is what we get if we order people by their true status—we put everyone who was in fact hospitalized up to the beginning of the line, and have godlike, perfect ‘prediction’.  That represents the absolute best that any predictor could possibly do.  Nobody is in that neighborhood—not even ACG.</a:t>
-            </a:r>
-          </a:p>
-          <a:p>
-            <a:pPr marL="228600" marR="0" lvl="0" indent="-228600" algn="l" defTabSz="914400" rtl="0" eaLnBrk="1" fontAlgn="auto" latinLnBrk="0" hangingPunct="1">
-              <a:lnSpc>
-                <a:spcPct val="100000"/>
-              </a:lnSpc>
-              <a:spcBef>
-                <a:spcPts val="0"/>
-              </a:spcBef>
-              <a:spcAft>
-                <a:spcPts val="0"/>
-              </a:spcAft>
-              <a:buClrTx/>
-              <a:buSzTx/>
-              <a:buFont typeface="+mj-lt"/>
-              <a:buAutoNum type="arabicPeriod"/>
-              <a:tabLst/>
-              <a:defRPr/>
-            </a:pPr>
-            <a:r>
-              <a:rPr lang="en-US" sz="1200" kern="1200" dirty="0">
-                <a:solidFill>
-                  <a:schemeClr val="tx1"/>
-                </a:solidFill>
-                <a:effectLst/>
-                <a:latin typeface="+mn-lt"/>
-                <a:ea typeface="+mn-ea"/>
-                <a:cs typeface="+mn-cs"/>
-              </a:rPr>
-              <a:t>The dull yellow-green 45-degree line in the middle is what we get if we order people randomly.  That’s what we should expect to see from a complete bullshit, snake-oil predictor.  Astoundingly, Naïve Bayes manages to be worse than this.  Possibly I’m using it incorrectly somehow—not sure.</a:t>
-            </a:r>
-          </a:p>
-          <a:p>
-            <a:pPr marL="228600" marR="0" lvl="0" indent="-228600" algn="l" defTabSz="914400" rtl="0" eaLnBrk="1" fontAlgn="auto" latinLnBrk="0" hangingPunct="1">
-              <a:lnSpc>
-                <a:spcPct val="100000"/>
-              </a:lnSpc>
-              <a:spcBef>
-                <a:spcPts val="0"/>
-              </a:spcBef>
-              <a:spcAft>
-                <a:spcPts val="0"/>
-              </a:spcAft>
-              <a:buClrTx/>
-              <a:buSzTx/>
-              <a:buFont typeface="+mj-lt"/>
-              <a:buAutoNum type="arabicPeriod"/>
-              <a:tabLst/>
-              <a:defRPr/>
-            </a:pPr>
-            <a:r>
-              <a:rPr lang="en-US" sz="1200" kern="1200" dirty="0">
-                <a:solidFill>
-                  <a:schemeClr val="tx1"/>
-                </a:solidFill>
-                <a:effectLst/>
-                <a:latin typeface="+mn-lt"/>
-                <a:ea typeface="+mn-ea"/>
-                <a:cs typeface="+mn-cs"/>
-              </a:rPr>
-              <a:t>The turquoise line is of course ACG—that’s what we’re shooting at. It’s a pretty clear favorite over the entire range of the development sample here.  Pre-2,500 people there are two candidates that give ACG a run for its money, but after that ACG pulls away.</a:t>
-            </a:r>
-          </a:p>
-          <a:p>
-            <a:pPr marL="228600" marR="0" lvl="0" indent="-228600" algn="l" defTabSz="914400" rtl="0" eaLnBrk="1" fontAlgn="auto" latinLnBrk="0" hangingPunct="1">
-              <a:lnSpc>
-                <a:spcPct val="100000"/>
-              </a:lnSpc>
-              <a:spcBef>
-                <a:spcPts val="0"/>
-              </a:spcBef>
-              <a:spcAft>
-                <a:spcPts val="0"/>
-              </a:spcAft>
-              <a:buClrTx/>
-              <a:buSzTx/>
-              <a:buFont typeface="+mj-lt"/>
-              <a:buAutoNum type="arabicPeriod"/>
-              <a:tabLst/>
-              <a:defRPr/>
-            </a:pPr>
-            <a:r>
-              <a:rPr lang="en-US" sz="1200" kern="1200" dirty="0">
-                <a:solidFill>
-                  <a:schemeClr val="tx1"/>
-                </a:solidFill>
-                <a:effectLst/>
-                <a:latin typeface="+mn-lt"/>
-                <a:ea typeface="+mn-ea"/>
-                <a:cs typeface="+mn-cs"/>
-              </a:rPr>
-              <a:t>BUT! On the left hand side of the axis, we have two candidate scores that look pretty darn good—SVC and Random Forest.  That’s a pretty important part of the graph actually, because just like you don’t normally have time to page through the 2d, 3</a:t>
-            </a:r>
-            <a:r>
-              <a:rPr lang="en-US" sz="1200" kern="1200" baseline="30000" dirty="0">
-                <a:solidFill>
-                  <a:schemeClr val="tx1"/>
-                </a:solidFill>
-                <a:effectLst/>
-                <a:latin typeface="+mn-lt"/>
-                <a:ea typeface="+mn-ea"/>
-                <a:cs typeface="+mn-cs"/>
-              </a:rPr>
-              <a:t>rd</a:t>
-            </a:r>
-            <a:r>
-              <a:rPr lang="en-US" sz="1200" kern="1200" dirty="0">
-                <a:solidFill>
-                  <a:schemeClr val="tx1"/>
-                </a:solidFill>
-                <a:effectLst/>
-                <a:latin typeface="+mn-lt"/>
-                <a:ea typeface="+mn-ea"/>
-                <a:cs typeface="+mn-cs"/>
-              </a:rPr>
-              <a:t>, 4</a:t>
-            </a:r>
-            <a:r>
-              <a:rPr lang="en-US" sz="1200" kern="1200" baseline="30000" dirty="0">
-                <a:solidFill>
-                  <a:schemeClr val="tx1"/>
-                </a:solidFill>
-                <a:effectLst/>
-                <a:latin typeface="+mn-lt"/>
-                <a:ea typeface="+mn-ea"/>
-                <a:cs typeface="+mn-cs"/>
-              </a:rPr>
-              <a:t>th</a:t>
-            </a:r>
-            <a:r>
-              <a:rPr lang="en-US" sz="1200" kern="1200" dirty="0">
-                <a:solidFill>
-                  <a:schemeClr val="tx1"/>
-                </a:solidFill>
-                <a:effectLst/>
-                <a:latin typeface="+mn-lt"/>
-                <a:ea typeface="+mn-ea"/>
-                <a:cs typeface="+mn-cs"/>
-              </a:rPr>
-              <a:t> pages of google results that you get on a search, CM folks don’t have time to get involved with 2500 people. So all is not lost here. If we can deliver say, the top 300 people most likely to be hospitalized, we’ve got a win.</a:t>
-            </a:r>
-          </a:p>
-          <a:p>
-            <a:pPr marL="228600" marR="0" lvl="0" indent="-228600" algn="l" defTabSz="914400" rtl="0" eaLnBrk="1" fontAlgn="auto" latinLnBrk="0" hangingPunct="1">
-              <a:lnSpc>
-                <a:spcPct val="100000"/>
-              </a:lnSpc>
-              <a:spcBef>
-                <a:spcPts val="0"/>
-              </a:spcBef>
-              <a:spcAft>
-                <a:spcPts val="0"/>
-              </a:spcAft>
-              <a:buClrTx/>
-              <a:buSzTx/>
-              <a:buFont typeface="+mj-lt"/>
-              <a:buAutoNum type="arabicPeriod"/>
-              <a:tabLst/>
-              <a:defRPr/>
-            </a:pPr>
-            <a:endParaRPr lang="en-US" dirty="0"/>
+            <a:r>
+              <a:rPr lang="en-US" dirty="0"/>
+              <a:t>Would it be enough to say “number needed to treat” here?</a:t>
+            </a:r>
           </a:p>
         </p:txBody>
       </p:sp>
@@ -1135,9 +920,9 @@
           <a:bodyPr/>
           <a:lstStyle/>
           <a:p>
-            <a:fld id="{69FC0A38-DBDE-460A-8530-8E0C13833A00}" type="slidenum">
+            <a:fld id="{75B7C00E-9EAE-46FD-9540-156265FB12BC}" type="slidenum">
               <a:rPr lang="en-US" smtClean="0"/>
-              <a:t>10</a:t>
+              <a:t>11</a:t>
             </a:fld>
             <a:endParaRPr lang="en-US"/>
           </a:p>
@@ -1146,7 +931,7 @@
     </p:spTree>
     <p:extLst>
       <p:ext uri="{BB962C8B-B14F-4D97-AF65-F5344CB8AC3E}">
-        <p14:creationId xmlns:p14="http://schemas.microsoft.com/office/powerpoint/2010/main" val="3013002786"/>
+        <p14:creationId xmlns:p14="http://schemas.microsoft.com/office/powerpoint/2010/main" val="239069557"/>
       </p:ext>
     </p:extLst>
   </p:cSld>
@@ -1200,22 +985,227 @@
           <a:bodyPr/>
           <a:lstStyle/>
           <a:p>
-            <a:r>
-              <a:rPr lang="en-US" dirty="0"/>
-              <a:t>Support Vector classifier beats ACG over this whole range!</a:t>
-            </a:r>
-          </a:p>
-          <a:p>
-            <a:r>
-              <a:rPr lang="en-US" dirty="0"/>
-              <a:t>Random Forest is ahead for the first 135 people or so.</a:t>
-            </a:r>
-          </a:p>
-          <a:p>
-            <a:r>
-              <a:rPr lang="en-US" dirty="0"/>
-              <a:t>Both are worthy alternatives to ACG.</a:t>
-            </a:r>
+            <a:pPr marL="0" marR="0" lvl="0" indent="0" algn="l" defTabSz="914400" rtl="0" eaLnBrk="1" fontAlgn="auto" latinLnBrk="0" hangingPunct="1">
+              <a:lnSpc>
+                <a:spcPct val="100000"/>
+              </a:lnSpc>
+              <a:spcBef>
+                <a:spcPts val="0"/>
+              </a:spcBef>
+              <a:spcAft>
+                <a:spcPts val="0"/>
+              </a:spcAft>
+              <a:buClrTx/>
+              <a:buSzTx/>
+              <a:buFontTx/>
+              <a:buNone/>
+              <a:tabLst/>
+              <a:defRPr/>
+            </a:pPr>
+            <a:r>
+              <a:rPr lang="en-US" sz="1200" kern="1200" dirty="0">
+                <a:solidFill>
+                  <a:schemeClr val="tx1"/>
+                </a:solidFill>
+                <a:effectLst/>
+                <a:latin typeface="+mn-lt"/>
+                <a:ea typeface="+mn-ea"/>
+                <a:cs typeface="+mn-cs"/>
+              </a:rPr>
+              <a:t>Couple of lines of particular interest:</a:t>
+            </a:r>
+          </a:p>
+          <a:p>
+            <a:pPr marL="228600" marR="0" lvl="0" indent="-228600" algn="l" defTabSz="914400" rtl="0" eaLnBrk="1" fontAlgn="auto" latinLnBrk="0" hangingPunct="1">
+              <a:lnSpc>
+                <a:spcPct val="100000"/>
+              </a:lnSpc>
+              <a:spcBef>
+                <a:spcPts val="0"/>
+              </a:spcBef>
+              <a:spcAft>
+                <a:spcPts val="0"/>
+              </a:spcAft>
+              <a:buClrTx/>
+              <a:buSzTx/>
+              <a:buFont typeface="+mj-lt"/>
+              <a:buAutoNum type="arabicPeriod"/>
+              <a:tabLst/>
+              <a:defRPr/>
+            </a:pPr>
+            <a:r>
+              <a:rPr lang="en-US" sz="1200" kern="1200" dirty="0">
+                <a:solidFill>
+                  <a:schemeClr val="tx1"/>
+                </a:solidFill>
+                <a:effectLst/>
+                <a:latin typeface="+mn-lt"/>
+                <a:ea typeface="+mn-ea"/>
+                <a:cs typeface="+mn-cs"/>
+              </a:rPr>
+              <a:t>The purple ‘cheating’ line is what we get if we order people by their true status—we put everyone who was in fact hospitalized up to the beginning of the line, and have godlike, perfect ‘prediction’.  That represents the absolute best that any predictor could possibly do.  Nobody is in that neighborhood—not even ACG.</a:t>
+            </a:r>
+          </a:p>
+          <a:p>
+            <a:pPr marL="228600" marR="0" lvl="0" indent="-228600" algn="l" defTabSz="914400" rtl="0" eaLnBrk="1" fontAlgn="auto" latinLnBrk="0" hangingPunct="1">
+              <a:lnSpc>
+                <a:spcPct val="100000"/>
+              </a:lnSpc>
+              <a:spcBef>
+                <a:spcPts val="0"/>
+              </a:spcBef>
+              <a:spcAft>
+                <a:spcPts val="0"/>
+              </a:spcAft>
+              <a:buClrTx/>
+              <a:buSzTx/>
+              <a:buFont typeface="+mj-lt"/>
+              <a:buAutoNum type="arabicPeriod"/>
+              <a:tabLst/>
+              <a:defRPr/>
+            </a:pPr>
+            <a:r>
+              <a:rPr lang="en-US" sz="1200" kern="1200" dirty="0">
+                <a:solidFill>
+                  <a:schemeClr val="tx1"/>
+                </a:solidFill>
+                <a:effectLst/>
+                <a:latin typeface="+mn-lt"/>
+                <a:ea typeface="+mn-ea"/>
+                <a:cs typeface="+mn-cs"/>
+              </a:rPr>
+              <a:t>The dull yellow-green 45-degree line in the middle is what we get if we order people randomly.  That’s what we should expect to see from a complete bullshit, snake-oil predictor.  Astoundingly, Naïve Bayes manages to be worse than this.  Possibly I’m using it incorrectly somehow—not sure.</a:t>
+            </a:r>
+          </a:p>
+          <a:p>
+            <a:pPr marL="228600" marR="0" lvl="0" indent="-228600" algn="l" defTabSz="914400" rtl="0" eaLnBrk="1" fontAlgn="auto" latinLnBrk="0" hangingPunct="1">
+              <a:lnSpc>
+                <a:spcPct val="100000"/>
+              </a:lnSpc>
+              <a:spcBef>
+                <a:spcPts val="0"/>
+              </a:spcBef>
+              <a:spcAft>
+                <a:spcPts val="0"/>
+              </a:spcAft>
+              <a:buClrTx/>
+              <a:buSzTx/>
+              <a:buFont typeface="+mj-lt"/>
+              <a:buAutoNum type="arabicPeriod"/>
+              <a:tabLst/>
+              <a:defRPr/>
+            </a:pPr>
+            <a:r>
+              <a:rPr lang="en-US" sz="1200" kern="1200" dirty="0">
+                <a:solidFill>
+                  <a:schemeClr val="tx1"/>
+                </a:solidFill>
+                <a:effectLst/>
+                <a:latin typeface="+mn-lt"/>
+                <a:ea typeface="+mn-ea"/>
+                <a:cs typeface="+mn-cs"/>
+              </a:rPr>
+              <a:t>The turquoise line is of course ACG—that’s what we’re shooting at. It’s a pretty clear favorite over the entire range of the development sample here.  Pre-2,500 people there are two candidates that give ACG a run for its money, but after that ACG pulls away.</a:t>
+            </a:r>
+          </a:p>
+          <a:p>
+            <a:pPr marL="228600" marR="0" lvl="0" indent="-228600" algn="l" defTabSz="914400" rtl="0" eaLnBrk="1" fontAlgn="auto" latinLnBrk="0" hangingPunct="1">
+              <a:lnSpc>
+                <a:spcPct val="100000"/>
+              </a:lnSpc>
+              <a:spcBef>
+                <a:spcPts val="0"/>
+              </a:spcBef>
+              <a:spcAft>
+                <a:spcPts val="0"/>
+              </a:spcAft>
+              <a:buClrTx/>
+              <a:buSzTx/>
+              <a:buFont typeface="+mj-lt"/>
+              <a:buAutoNum type="arabicPeriod"/>
+              <a:tabLst/>
+              <a:defRPr/>
+            </a:pPr>
+            <a:r>
+              <a:rPr lang="en-US" sz="1200" kern="1200" dirty="0">
+                <a:solidFill>
+                  <a:schemeClr val="tx1"/>
+                </a:solidFill>
+                <a:effectLst/>
+                <a:latin typeface="+mn-lt"/>
+                <a:ea typeface="+mn-ea"/>
+                <a:cs typeface="+mn-cs"/>
+              </a:rPr>
+              <a:t>BUT! On the left hand side of the axis, we have two candidate scores that look pretty darn good—SVC and Random Forest.  That’s a pretty important part of the graph actually, because just like you don’t normally have time to page through the 2d, 3</a:t>
+            </a:r>
+            <a:r>
+              <a:rPr lang="en-US" sz="1200" kern="1200" baseline="30000" dirty="0">
+                <a:solidFill>
+                  <a:schemeClr val="tx1"/>
+                </a:solidFill>
+                <a:effectLst/>
+                <a:latin typeface="+mn-lt"/>
+                <a:ea typeface="+mn-ea"/>
+                <a:cs typeface="+mn-cs"/>
+              </a:rPr>
+              <a:t>rd</a:t>
+            </a:r>
+            <a:r>
+              <a:rPr lang="en-US" sz="1200" kern="1200" dirty="0">
+                <a:solidFill>
+                  <a:schemeClr val="tx1"/>
+                </a:solidFill>
+                <a:effectLst/>
+                <a:latin typeface="+mn-lt"/>
+                <a:ea typeface="+mn-ea"/>
+                <a:cs typeface="+mn-cs"/>
+              </a:rPr>
+              <a:t>, 4</a:t>
+            </a:r>
+            <a:r>
+              <a:rPr lang="en-US" sz="1200" kern="1200" baseline="30000" dirty="0">
+                <a:solidFill>
+                  <a:schemeClr val="tx1"/>
+                </a:solidFill>
+                <a:effectLst/>
+                <a:latin typeface="+mn-lt"/>
+                <a:ea typeface="+mn-ea"/>
+                <a:cs typeface="+mn-cs"/>
+              </a:rPr>
+              <a:t>th</a:t>
+            </a:r>
+            <a:r>
+              <a:rPr lang="en-US" sz="1200" kern="1200" dirty="0">
+                <a:solidFill>
+                  <a:schemeClr val="tx1"/>
+                </a:solidFill>
+                <a:effectLst/>
+                <a:latin typeface="+mn-lt"/>
+                <a:ea typeface="+mn-ea"/>
+                <a:cs typeface="+mn-cs"/>
+              </a:rPr>
+              <a:t> pages of google results that you get on a search, CM folks don’t have time to get involved with 2500 people. So all is not lost here. If we can deliver say, the top 300 people most likely to be hospitalized, we’ve got a win.</a:t>
+            </a:r>
+          </a:p>
+          <a:p>
+            <a:pPr marL="228600" marR="0" lvl="0" indent="-228600" algn="l" defTabSz="914400" rtl="0" eaLnBrk="1" fontAlgn="auto" latinLnBrk="0" hangingPunct="1">
+              <a:lnSpc>
+                <a:spcPct val="100000"/>
+              </a:lnSpc>
+              <a:spcBef>
+                <a:spcPts val="0"/>
+              </a:spcBef>
+              <a:spcAft>
+                <a:spcPts val="0"/>
+              </a:spcAft>
+              <a:buClrTx/>
+              <a:buSzTx/>
+              <a:buFont typeface="+mj-lt"/>
+              <a:buAutoNum type="arabicPeriod"/>
+              <a:tabLst/>
+              <a:defRPr/>
+            </a:pPr>
+            <a:endParaRPr lang="en-US" dirty="0"/>
           </a:p>
         </p:txBody>
       </p:sp>
@@ -1236,7 +1226,7 @@
           <a:p>
             <a:fld id="{69FC0A38-DBDE-460A-8530-8E0C13833A00}" type="slidenum">
               <a:rPr lang="en-US" smtClean="0"/>
-              <a:t>11</a:t>
+              <a:t>12</a:t>
             </a:fld>
             <a:endParaRPr lang="en-US"/>
           </a:p>
@@ -1245,7 +1235,7 @@
     </p:spTree>
     <p:extLst>
       <p:ext uri="{BB962C8B-B14F-4D97-AF65-F5344CB8AC3E}">
-        <p14:creationId xmlns:p14="http://schemas.microsoft.com/office/powerpoint/2010/main" val="1608744341"/>
+        <p14:creationId xmlns:p14="http://schemas.microsoft.com/office/powerpoint/2010/main" val="3013002786"/>
       </p:ext>
     </p:extLst>
   </p:cSld>
@@ -1301,8 +1291,34 @@
           <a:p>
             <a:r>
               <a:rPr lang="en-US" dirty="0"/>
-              <a:t>TODO: gather stats on my desktop computer (processer/ram).</a:t>
-            </a:r>
+              <a:t>Support Vector classifier beats ACG over this whole range!</a:t>
+            </a:r>
+          </a:p>
+          <a:p>
+            <a:r>
+              <a:rPr lang="en-US" dirty="0"/>
+              <a:t>Random Forest is ahead for the first 135 people or so.</a:t>
+            </a:r>
+          </a:p>
+          <a:p>
+            <a:r>
+              <a:rPr lang="en-US" dirty="0"/>
+              <a:t>Both are worthy alternatives to ACG.</a:t>
+            </a:r>
+          </a:p>
+          <a:p>
+            <a:endParaRPr lang="en-US" dirty="0"/>
+          </a:p>
+          <a:p>
+            <a:r>
+              <a:rPr lang="en-US" dirty="0"/>
+              <a:t>This looks like success to me, and it’s likely that we could improve </a:t>
+            </a:r>
+            <a:r>
+              <a:rPr lang="en-US"/>
+              <a:t>this significantly from here.</a:t>
+            </a:r>
+            <a:endParaRPr lang="en-US" dirty="0"/>
           </a:p>
         </p:txBody>
       </p:sp>
@@ -1321,9 +1337,9 @@
           <a:bodyPr/>
           <a:lstStyle/>
           <a:p>
-            <a:fld id="{75B7C00E-9EAE-46FD-9540-156265FB12BC}" type="slidenum">
+            <a:fld id="{69FC0A38-DBDE-460A-8530-8E0C13833A00}" type="slidenum">
               <a:rPr lang="en-US" smtClean="0"/>
-              <a:t>12</a:t>
+              <a:t>13</a:t>
             </a:fld>
             <a:endParaRPr lang="en-US"/>
           </a:p>
@@ -1332,7 +1348,7 @@
     </p:spTree>
     <p:extLst>
       <p:ext uri="{BB962C8B-B14F-4D97-AF65-F5344CB8AC3E}">
-        <p14:creationId xmlns:p14="http://schemas.microsoft.com/office/powerpoint/2010/main" val="1883912347"/>
+        <p14:creationId xmlns:p14="http://schemas.microsoft.com/office/powerpoint/2010/main" val="1608744341"/>
       </p:ext>
     </p:extLst>
   </p:cSld>
@@ -1388,7 +1404,7 @@
           <a:p>
             <a:r>
               <a:rPr lang="en-US" dirty="0"/>
-              <a:t>Unfortunately it’s not clear I’ll get to do any of this—LHS leadership was not enthusiastic about it, for reasons I still don’t understand.</a:t>
+              <a:t>TODO: gather stats on my desktop computer (processer/ram).</a:t>
             </a:r>
           </a:p>
         </p:txBody>
@@ -1408,9 +1424,9 @@
           <a:bodyPr/>
           <a:lstStyle/>
           <a:p>
-            <a:fld id="{69FC0A38-DBDE-460A-8530-8E0C13833A00}" type="slidenum">
+            <a:fld id="{75B7C00E-9EAE-46FD-9540-156265FB12BC}" type="slidenum">
               <a:rPr lang="en-US" smtClean="0"/>
-              <a:t>13</a:t>
+              <a:t>14</a:t>
             </a:fld>
             <a:endParaRPr lang="en-US"/>
           </a:p>
@@ -1419,7 +1435,7 @@
     </p:spTree>
     <p:extLst>
       <p:ext uri="{BB962C8B-B14F-4D97-AF65-F5344CB8AC3E}">
-        <p14:creationId xmlns:p14="http://schemas.microsoft.com/office/powerpoint/2010/main" val="14512803"/>
+        <p14:creationId xmlns:p14="http://schemas.microsoft.com/office/powerpoint/2010/main" val="1883912347"/>
       </p:ext>
     </p:extLst>
   </p:cSld>
@@ -1475,17 +1491,8 @@
           <a:p>
             <a:r>
               <a:rPr lang="en-US" dirty="0"/>
-              <a:t>Bonus slides follow that </a:t>
-            </a:r>
-            <a:r>
-              <a:rPr lang="en-US" i="1" dirty="0"/>
-              <a:t>may</a:t>
-            </a:r>
-            <a:r>
-              <a:rPr lang="en-US" i="0" dirty="0"/>
-              <a:t> be useful if I get questions.</a:t>
-            </a:r>
-            <a:endParaRPr lang="en-US" dirty="0"/>
+              <a:t>Unfortunately it’s not clear I’ll get to do any of this—LHS leadership was not enthusiastic about it, for reasons I still don’t understand.</a:t>
+            </a:r>
           </a:p>
         </p:txBody>
       </p:sp>
@@ -1504,9 +1511,9 @@
           <a:bodyPr/>
           <a:lstStyle/>
           <a:p>
-            <a:fld id="{75B7C00E-9EAE-46FD-9540-156265FB12BC}" type="slidenum">
+            <a:fld id="{69FC0A38-DBDE-460A-8530-8E0C13833A00}" type="slidenum">
               <a:rPr lang="en-US" smtClean="0"/>
-              <a:t>14</a:t>
+              <a:t>15</a:t>
             </a:fld>
             <a:endParaRPr lang="en-US"/>
           </a:p>
@@ -1515,7 +1522,7 @@
     </p:spTree>
     <p:extLst>
       <p:ext uri="{BB962C8B-B14F-4D97-AF65-F5344CB8AC3E}">
-        <p14:creationId xmlns:p14="http://schemas.microsoft.com/office/powerpoint/2010/main" val="4203251224"/>
+        <p14:creationId xmlns:p14="http://schemas.microsoft.com/office/powerpoint/2010/main" val="14512803"/>
       </p:ext>
     </p:extLst>
   </p:cSld>
@@ -1571,8 +1578,17 @@
           <a:p>
             <a:r>
               <a:rPr lang="en-US" dirty="0"/>
-              <a:t>https://www.hopkinsacg.org/ </a:t>
-            </a:r>
+              <a:t>Bonus slides follow that </a:t>
+            </a:r>
+            <a:r>
+              <a:rPr lang="en-US" i="1" dirty="0"/>
+              <a:t>may</a:t>
+            </a:r>
+            <a:r>
+              <a:rPr lang="en-US" i="0" dirty="0"/>
+              <a:t> be useful if I get questions.</a:t>
+            </a:r>
+            <a:endParaRPr lang="en-US" dirty="0"/>
           </a:p>
         </p:txBody>
       </p:sp>
@@ -1593,7 +1609,7 @@
           <a:p>
             <a:fld id="{75B7C00E-9EAE-46FD-9540-156265FB12BC}" type="slidenum">
               <a:rPr lang="en-US" smtClean="0"/>
-              <a:t>15</a:t>
+              <a:t>16</a:t>
             </a:fld>
             <a:endParaRPr lang="en-US"/>
           </a:p>
@@ -1602,7 +1618,7 @@
     </p:spTree>
     <p:extLst>
       <p:ext uri="{BB962C8B-B14F-4D97-AF65-F5344CB8AC3E}">
-        <p14:creationId xmlns:p14="http://schemas.microsoft.com/office/powerpoint/2010/main" val="1471927266"/>
+        <p14:creationId xmlns:p14="http://schemas.microsoft.com/office/powerpoint/2010/main" val="4203251224"/>
       </p:ext>
     </p:extLst>
   </p:cSld>
@@ -1658,15 +1674,7 @@
           <a:p>
             <a:r>
               <a:rPr lang="en-US" dirty="0"/>
-              <a:t>The features we fed in to the ML algorithms was a concatenation of the type &amp; code fields.  Each one was treated as a distinct ‘variable’ if you will.  You can see the actual implementation in ml_hospitalizations.py in the </a:t>
-            </a:r>
-            <a:r>
-              <a:rPr lang="en-US" dirty="0" err="1"/>
-              <a:t>github</a:t>
-            </a:r>
-            <a:r>
-              <a:rPr lang="en-US" dirty="0"/>
-              <a:t> repository cited in the thank-you slide.</a:t>
+              <a:t>https://www.hopkinsacg.org/ </a:t>
             </a:r>
           </a:p>
         </p:txBody>
@@ -1688,7 +1696,7 @@
           <a:p>
             <a:fld id="{75B7C00E-9EAE-46FD-9540-156265FB12BC}" type="slidenum">
               <a:rPr lang="en-US" smtClean="0"/>
-              <a:t>16</a:t>
+              <a:t>17</a:t>
             </a:fld>
             <a:endParaRPr lang="en-US"/>
           </a:p>
@@ -1697,7 +1705,7 @@
     </p:spTree>
     <p:extLst>
       <p:ext uri="{BB962C8B-B14F-4D97-AF65-F5344CB8AC3E}">
-        <p14:creationId xmlns:p14="http://schemas.microsoft.com/office/powerpoint/2010/main" val="4092777129"/>
+        <p14:creationId xmlns:p14="http://schemas.microsoft.com/office/powerpoint/2010/main" val="1471927266"/>
       </p:ext>
     </p:extLst>
   </p:cSld>
@@ -1753,40 +1761,15 @@
           <a:p>
             <a:r>
               <a:rPr lang="en-US" dirty="0"/>
-              <a:t>In case anybody is curious about how the predictions compare on individuals.  The paneling here is done on the basis of delivery system. At </a:t>
+              <a:t>The features we fed in to the ML algorithms was a concatenation of the type &amp; code fields.  Each one was treated as a distinct ‘variable’ if you will.  You can see the actual implementation in ml_hospitalizations.py in the </a:t>
             </a:r>
             <a:r>
               <a:rPr lang="en-US" dirty="0" err="1"/>
-              <a:t>KaPoW</a:t>
+              <a:t>github</a:t>
             </a:r>
             <a:r>
               <a:rPr lang="en-US" dirty="0"/>
-              <a:t> we have basically 2 DSs—Group Practice patients  are people who get the vast majority of their care from </a:t>
-            </a:r>
-            <a:r>
-              <a:rPr lang="en-US" dirty="0" err="1"/>
-              <a:t>KaPoW</a:t>
-            </a:r>
-            <a:r>
-              <a:rPr lang="en-US" dirty="0"/>
-              <a:t> owned/operated clinics.  Contract Network patients experience </a:t>
-            </a:r>
-            <a:r>
-              <a:rPr lang="en-US" dirty="0" err="1"/>
-              <a:t>KaPoW</a:t>
-            </a:r>
-            <a:r>
-              <a:rPr lang="en-US" dirty="0"/>
-              <a:t> as pretty much just an insurer (so ACG should feel right at home in that pop).</a:t>
-            </a:r>
-          </a:p>
-          <a:p>
-            <a:endParaRPr lang="en-US" dirty="0"/>
-          </a:p>
-          <a:p>
-            <a:r>
-              <a:rPr lang="en-US" dirty="0"/>
-              <a:t>It would be interesting to see NNT diagrams that were stratified by delivery system.</a:t>
+              <a:t> repository cited in the thank-you slide.</a:t>
             </a:r>
           </a:p>
         </p:txBody>
@@ -1806,9 +1789,9 @@
           <a:bodyPr/>
           <a:lstStyle/>
           <a:p>
-            <a:fld id="{69FC0A38-DBDE-460A-8530-8E0C13833A00}" type="slidenum">
+            <a:fld id="{75B7C00E-9EAE-46FD-9540-156265FB12BC}" type="slidenum">
               <a:rPr lang="en-US" smtClean="0"/>
-              <a:t>17</a:t>
+              <a:t>18</a:t>
             </a:fld>
             <a:endParaRPr lang="en-US"/>
           </a:p>
@@ -1817,7 +1800,7 @@
     </p:spTree>
     <p:extLst>
       <p:ext uri="{BB962C8B-B14F-4D97-AF65-F5344CB8AC3E}">
-        <p14:creationId xmlns:p14="http://schemas.microsoft.com/office/powerpoint/2010/main" val="624591206"/>
+        <p14:creationId xmlns:p14="http://schemas.microsoft.com/office/powerpoint/2010/main" val="4092777129"/>
       </p:ext>
     </p:extLst>
   </p:cSld>
@@ -1873,6 +1856,126 @@
           <a:p>
             <a:r>
               <a:rPr lang="en-US" dirty="0"/>
+              <a:t>In case anybody is curious about how the predictions compare on individuals.  The paneling here is done on the basis of delivery system. At </a:t>
+            </a:r>
+            <a:r>
+              <a:rPr lang="en-US" dirty="0" err="1"/>
+              <a:t>KaPoW</a:t>
+            </a:r>
+            <a:r>
+              <a:rPr lang="en-US" dirty="0"/>
+              <a:t> we have basically 2 DSs—Group Practice patients  are people who get the vast majority of their care from </a:t>
+            </a:r>
+            <a:r>
+              <a:rPr lang="en-US" dirty="0" err="1"/>
+              <a:t>KaPoW</a:t>
+            </a:r>
+            <a:r>
+              <a:rPr lang="en-US" dirty="0"/>
+              <a:t> owned/operated clinics.  Contract Network patients experience </a:t>
+            </a:r>
+            <a:r>
+              <a:rPr lang="en-US" dirty="0" err="1"/>
+              <a:t>KaPoW</a:t>
+            </a:r>
+            <a:r>
+              <a:rPr lang="en-US" dirty="0"/>
+              <a:t> as pretty much just an insurer (so ACG should feel right at home in that pop).</a:t>
+            </a:r>
+          </a:p>
+          <a:p>
+            <a:endParaRPr lang="en-US" dirty="0"/>
+          </a:p>
+          <a:p>
+            <a:r>
+              <a:rPr lang="en-US" dirty="0"/>
+              <a:t>It would be interesting to see NNT diagrams that were stratified by delivery system.</a:t>
+            </a:r>
+          </a:p>
+        </p:txBody>
+      </p:sp>
+      <p:sp>
+        <p:nvSpPr>
+          <p:cNvPr id="4" name="Slide Number Placeholder 3"/>
+          <p:cNvSpPr>
+            <a:spLocks noGrp="1"/>
+          </p:cNvSpPr>
+          <p:nvPr>
+            <p:ph type="sldNum" sz="quarter" idx="10"/>
+          </p:nvPr>
+        </p:nvSpPr>
+        <p:spPr/>
+        <p:txBody>
+          <a:bodyPr/>
+          <a:lstStyle/>
+          <a:p>
+            <a:fld id="{69FC0A38-DBDE-460A-8530-8E0C13833A00}" type="slidenum">
+              <a:rPr lang="en-US" smtClean="0"/>
+              <a:t>19</a:t>
+            </a:fld>
+            <a:endParaRPr lang="en-US"/>
+          </a:p>
+        </p:txBody>
+      </p:sp>
+    </p:spTree>
+    <p:extLst>
+      <p:ext uri="{BB962C8B-B14F-4D97-AF65-F5344CB8AC3E}">
+        <p14:creationId xmlns:p14="http://schemas.microsoft.com/office/powerpoint/2010/main" val="624591206"/>
+      </p:ext>
+    </p:extLst>
+  </p:cSld>
+  <p:clrMapOvr>
+    <a:masterClrMapping/>
+  </p:clrMapOvr>
+</p:notes>
+</file>
+
+<file path=ppt/notesSlides/notesSlide19.xml><?xml version="1.0" encoding="utf-8"?>
+<p:notes xmlns:a="http://schemas.openxmlformats.org/drawingml/2006/main" xmlns:r="http://schemas.openxmlformats.org/officeDocument/2006/relationships" xmlns:p="http://schemas.openxmlformats.org/presentationml/2006/main">
+  <p:cSld>
+    <p:spTree>
+      <p:nvGrpSpPr>
+        <p:cNvPr id="1" name=""/>
+        <p:cNvGrpSpPr/>
+        <p:nvPr/>
+      </p:nvGrpSpPr>
+      <p:grpSpPr>
+        <a:xfrm>
+          <a:off x="0" y="0"/>
+          <a:ext cx="0" cy="0"/>
+          <a:chOff x="0" y="0"/>
+          <a:chExt cx="0" cy="0"/>
+        </a:xfrm>
+      </p:grpSpPr>
+      <p:sp>
+        <p:nvSpPr>
+          <p:cNvPr id="2" name="Slide Image Placeholder 1"/>
+          <p:cNvSpPr>
+            <a:spLocks noGrp="1" noRot="1" noChangeAspect="1"/>
+          </p:cNvSpPr>
+          <p:nvPr>
+            <p:ph type="sldImg"/>
+          </p:nvPr>
+        </p:nvSpPr>
+        <p:spPr/>
+      </p:sp>
+      <p:sp>
+        <p:nvSpPr>
+          <p:cNvPr id="3" name="Notes Placeholder 2"/>
+          <p:cNvSpPr>
+            <a:spLocks noGrp="1"/>
+          </p:cNvSpPr>
+          <p:nvPr>
+            <p:ph type="body" idx="1"/>
+          </p:nvPr>
+        </p:nvSpPr>
+        <p:spPr/>
+        <p:txBody>
+          <a:bodyPr/>
+          <a:lstStyle/>
+          <a:p>
+            <a:r>
+              <a:rPr lang="en-US" dirty="0"/>
               <a:t>Image from https://onlinecourses.science.psu.edu/stat857/node/22/ </a:t>
             </a:r>
           </a:p>
@@ -1904,7 +2007,7 @@
           <a:p>
             <a:fld id="{69FC0A38-DBDE-460A-8530-8E0C13833A00}" type="slidenum">
               <a:rPr lang="en-US" smtClean="0"/>
-              <a:t>18</a:t>
+              <a:t>20</a:t>
             </a:fld>
             <a:endParaRPr lang="en-US"/>
           </a:p>
@@ -2502,33 +2605,7 @@
           <a:p>
             <a:r>
               <a:rPr lang="en-US" dirty="0"/>
-              <a:t>Ultimately, we need an answer to the question “why should I believe your predictions?”</a:t>
-            </a:r>
-          </a:p>
-          <a:p>
-            <a:endParaRPr lang="en-US" dirty="0"/>
-          </a:p>
-          <a:p>
-            <a:r>
-              <a:rPr lang="en-US" dirty="0"/>
-              <a:t>Harken back to your stats professors railing against stepwise regression.  That was one of the first iterative, automated model selection techniques. The primary reason that was bad was that it involved doing </a:t>
-            </a:r>
-            <a:r>
-              <a:rPr lang="en-US" dirty="0" err="1"/>
-              <a:t>waaaay</a:t>
-            </a:r>
-            <a:r>
-              <a:rPr lang="en-US" dirty="0"/>
-              <a:t> too many significance tests w/out protecting the overall experiment-wise error rate.</a:t>
-            </a:r>
-          </a:p>
-          <a:p>
-            <a:endParaRPr lang="en-US" dirty="0"/>
-          </a:p>
-          <a:p>
-            <a:r>
-              <a:rPr lang="en-US" dirty="0"/>
-              <a:t>For a representative screed against stepwise, see e.g. https://towardsdatascience.com/stopping-stepwise-why-stepwise-selection-is-bad-and-what-you-should-use-instead-90818b3f52df.</a:t>
+              <a:t>Dig how brute-force this is.</a:t>
             </a:r>
           </a:p>
         </p:txBody>
@@ -2548,9 +2625,9 @@
           <a:bodyPr/>
           <a:lstStyle/>
           <a:p>
-            <a:fld id="{69FC0A38-DBDE-460A-8530-8E0C13833A00}" type="slidenum">
+            <a:fld id="{75B7C00E-9EAE-46FD-9540-156265FB12BC}" type="slidenum">
               <a:rPr lang="en-US" smtClean="0"/>
-              <a:t>6</a:t>
+              <a:t>7</a:t>
             </a:fld>
             <a:endParaRPr lang="en-US"/>
           </a:p>
@@ -2559,7 +2636,7 @@
     </p:spTree>
     <p:extLst>
       <p:ext uri="{BB962C8B-B14F-4D97-AF65-F5344CB8AC3E}">
-        <p14:creationId xmlns:p14="http://schemas.microsoft.com/office/powerpoint/2010/main" val="812206298"/>
+        <p14:creationId xmlns:p14="http://schemas.microsoft.com/office/powerpoint/2010/main" val="4138497965"/>
       </p:ext>
     </p:extLst>
   </p:cSld>
@@ -2615,13 +2692,24 @@
           <a:p>
             <a:r>
               <a:rPr lang="en-US" dirty="0"/>
-              <a:t>80% dev and 20% validation.</a:t>
-            </a:r>
+              <a:t>Ultimately, we need an answer to the question “why should I believe your predictions?”</a:t>
+            </a:r>
+          </a:p>
+          <a:p>
+            <a:endParaRPr lang="en-US" dirty="0"/>
           </a:p>
           <a:p>
             <a:r>
               <a:rPr lang="en-US" dirty="0"/>
-              <a:t>Note that 12% of our cohort has been hospitalized. These are pretty sick people.</a:t>
+              <a:t>Harken back to your stats professors railing against stepwise regression.  That was one of the first iterative, automated model selection techniques. The primary reason that was bad was that it involved doing </a:t>
+            </a:r>
+            <a:r>
+              <a:rPr lang="en-US" dirty="0" err="1"/>
+              <a:t>waaaay</a:t>
+            </a:r>
+            <a:r>
+              <a:rPr lang="en-US" dirty="0"/>
+              <a:t> too many significance tests w/out protecting the overall experiment-wise error rate.</a:t>
             </a:r>
           </a:p>
           <a:p>
@@ -2630,24 +2718,7 @@
           <a:p>
             <a:r>
               <a:rPr lang="en-US" dirty="0"/>
-              <a:t>‘Hospitalization’ here excludes accidents &amp; pregnancies—see the list of excluded DRGs starting on line 72 of </a:t>
-            </a:r>
-            <a:r>
-              <a:rPr lang="en-US" dirty="0" err="1"/>
-              <a:t>get_features.sas</a:t>
-            </a:r>
-            <a:r>
-              <a:rPr lang="en-US" dirty="0"/>
-              <a:t>.</a:t>
-            </a:r>
-          </a:p>
-          <a:p>
-            <a:endParaRPr lang="en-US" dirty="0"/>
-          </a:p>
-          <a:p>
-            <a:r>
-              <a:rPr lang="en-US" dirty="0"/>
-              <a:t>So—dev is the playground. We can torture that for as long as we like, commit unspeakable statistical crimes upon it etc.  Validation is our safety net—that’s the basis of our argument later on that whatever we put together to predict in dev will be useful beyond that set of data.</a:t>
+              <a:t>For a representative screed against stepwise, see e.g. https://towardsdatascience.com/stopping-stepwise-why-stepwise-selection-is-bad-and-what-you-should-use-instead-90818b3f52df.</a:t>
             </a:r>
           </a:p>
         </p:txBody>
@@ -2669,7 +2740,7 @@
           <a:p>
             <a:fld id="{69FC0A38-DBDE-460A-8530-8E0C13833A00}" type="slidenum">
               <a:rPr lang="en-US" smtClean="0"/>
-              <a:t>7</a:t>
+              <a:t>8</a:t>
             </a:fld>
             <a:endParaRPr lang="en-US"/>
           </a:p>
@@ -2678,7 +2749,7 @@
     </p:spTree>
     <p:extLst>
       <p:ext uri="{BB962C8B-B14F-4D97-AF65-F5344CB8AC3E}">
-        <p14:creationId xmlns:p14="http://schemas.microsoft.com/office/powerpoint/2010/main" val="3337520326"/>
+        <p14:creationId xmlns:p14="http://schemas.microsoft.com/office/powerpoint/2010/main" val="812206298"/>
       </p:ext>
     </p:extLst>
   </p:cSld>
@@ -2734,7 +2805,13 @@
           <a:p>
             <a:r>
               <a:rPr lang="en-US" dirty="0"/>
-              <a:t>Here’s the iteration I was talking about.</a:t>
+              <a:t>80% dev and 20% validation.</a:t>
+            </a:r>
+          </a:p>
+          <a:p>
+            <a:r>
+              <a:rPr lang="en-US" dirty="0"/>
+              <a:t>Note that 12% of our cohort has been hospitalized. These are pretty sick people.</a:t>
             </a:r>
           </a:p>
           <a:p>
@@ -2743,7 +2820,15 @@
           <a:p>
             <a:r>
               <a:rPr lang="en-US" dirty="0"/>
-              <a:t>Note that we’re not bringing any actual clinical or even statistical knowledge to bear on this problem.  This is very much a throw-it-against-the-wall-and-see-what-sticks approach.</a:t>
+              <a:t>‘Hospitalization’ here excludes accidents &amp; pregnancies—see the list of excluded DRGs starting on line 72 of </a:t>
+            </a:r>
+            <a:r>
+              <a:rPr lang="en-US" dirty="0" err="1"/>
+              <a:t>get_features.sas</a:t>
+            </a:r>
+            <a:r>
+              <a:rPr lang="en-US" dirty="0"/>
+              <a:t>.</a:t>
             </a:r>
           </a:p>
           <a:p>
@@ -2752,24 +2837,7 @@
           <a:p>
             <a:r>
               <a:rPr lang="en-US" dirty="0"/>
-              <a:t>One very nice thing about the </a:t>
-            </a:r>
-            <a:r>
-              <a:rPr lang="en-US" dirty="0" err="1"/>
-              <a:t>scikit</a:t>
-            </a:r>
-            <a:r>
-              <a:rPr lang="en-US" dirty="0"/>
-              <a:t>-learn libs I was able to use is that their interfaces are pretty uniform.  So I was able to write a single function that accepted a generic classifier and the training/test data and would spit out predictions &amp; statistics.</a:t>
-            </a:r>
-          </a:p>
-          <a:p>
-            <a:endParaRPr lang="en-US" dirty="0"/>
-          </a:p>
-          <a:p>
-            <a:r>
-              <a:rPr lang="en-US" dirty="0"/>
-              <a:t>Note also that we don’t touch the validation data in this process at all.  That is our ultimate backstop on overfitting—if we overfit development, validation will smack us upside the head.</a:t>
+              <a:t>So—dev is the playground. We can torture that for as long as we like, commit unspeakable statistical crimes upon it etc.  Validation is our safety net—that’s the basis of our argument later on that whatever we put together to predict in dev will be useful beyond that set of data.</a:t>
             </a:r>
           </a:p>
         </p:txBody>
@@ -2791,7 +2859,7 @@
           <a:p>
             <a:fld id="{69FC0A38-DBDE-460A-8530-8E0C13833A00}" type="slidenum">
               <a:rPr lang="en-US" smtClean="0"/>
-              <a:t>8</a:t>
+              <a:t>9</a:t>
             </a:fld>
             <a:endParaRPr lang="en-US"/>
           </a:p>
@@ -2800,7 +2868,7 @@
     </p:spTree>
     <p:extLst>
       <p:ext uri="{BB962C8B-B14F-4D97-AF65-F5344CB8AC3E}">
-        <p14:creationId xmlns:p14="http://schemas.microsoft.com/office/powerpoint/2010/main" val="1088601172"/>
+        <p14:creationId xmlns:p14="http://schemas.microsoft.com/office/powerpoint/2010/main" val="3337520326"/>
       </p:ext>
     </p:extLst>
   </p:cSld>
@@ -2856,7 +2924,42 @@
           <a:p>
             <a:r>
               <a:rPr lang="en-US" dirty="0"/>
-              <a:t>Would it be enough to say “number needed to treat” here?</a:t>
+              <a:t>Here’s the iteration I was talking about.</a:t>
+            </a:r>
+          </a:p>
+          <a:p>
+            <a:endParaRPr lang="en-US" dirty="0"/>
+          </a:p>
+          <a:p>
+            <a:r>
+              <a:rPr lang="en-US" dirty="0"/>
+              <a:t>Note that we’re not bringing any actual clinical or even statistical knowledge to bear on this problem.  This is very much a throw-it-against-the-wall-and-see-what-sticks approach.</a:t>
+            </a:r>
+          </a:p>
+          <a:p>
+            <a:endParaRPr lang="en-US" dirty="0"/>
+          </a:p>
+          <a:p>
+            <a:r>
+              <a:rPr lang="en-US" dirty="0"/>
+              <a:t>One very nice thing about the </a:t>
+            </a:r>
+            <a:r>
+              <a:rPr lang="en-US" dirty="0" err="1"/>
+              <a:t>scikit</a:t>
+            </a:r>
+            <a:r>
+              <a:rPr lang="en-US" dirty="0"/>
+              <a:t>-learn libs I was able to use is that their interfaces are pretty uniform.  So I was able to write a single function that accepted a generic classifier and the training/test data and would spit out predictions &amp; statistics.</a:t>
+            </a:r>
+          </a:p>
+          <a:p>
+            <a:endParaRPr lang="en-US" dirty="0"/>
+          </a:p>
+          <a:p>
+            <a:r>
+              <a:rPr lang="en-US" dirty="0"/>
+              <a:t>Note also that we don’t touch the validation data in this process at all.  That is our ultimate backstop on overfitting—if we overfit development, validation will smack us upside the head.</a:t>
             </a:r>
           </a:p>
         </p:txBody>
@@ -2876,9 +2979,9 @@
           <a:bodyPr/>
           <a:lstStyle/>
           <a:p>
-            <a:fld id="{75B7C00E-9EAE-46FD-9540-156265FB12BC}" type="slidenum">
+            <a:fld id="{69FC0A38-DBDE-460A-8530-8E0C13833A00}" type="slidenum">
               <a:rPr lang="en-US" smtClean="0"/>
-              <a:t>9</a:t>
+              <a:t>10</a:t>
             </a:fld>
             <a:endParaRPr lang="en-US"/>
           </a:p>
@@ -2887,7 +2990,7 @@
     </p:spTree>
     <p:extLst>
       <p:ext uri="{BB962C8B-B14F-4D97-AF65-F5344CB8AC3E}">
-        <p14:creationId xmlns:p14="http://schemas.microsoft.com/office/powerpoint/2010/main" val="239069557"/>
+        <p14:creationId xmlns:p14="http://schemas.microsoft.com/office/powerpoint/2010/main" val="1088601172"/>
       </p:ext>
     </p:extLst>
   </p:cSld>
@@ -8860,7 +8963,7 @@
           <a:p>
             <a:fld id="{48A87A34-81AB-432B-8DAE-1953F412C126}" type="datetimeFigureOut">
               <a:rPr lang="en-US" smtClean="0"/>
-              <a:t>3/3/2019</a:t>
+              <a:t>3/6/2019</a:t>
             </a:fld>
             <a:endParaRPr lang="en-US" dirty="0"/>
           </a:p>
@@ -9148,7 +9251,7 @@
           <a:p>
             <a:fld id="{48A87A34-81AB-432B-8DAE-1953F412C126}" type="datetimeFigureOut">
               <a:rPr lang="en-US" smtClean="0"/>
-              <a:t>3/2/2019</a:t>
+              <a:t>3/6/2019</a:t>
             </a:fld>
             <a:endParaRPr lang="en-US" dirty="0"/>
           </a:p>
@@ -9916,7 +10019,7 @@
           <a:p>
             <a:fld id="{C25EEC7D-36B5-410D-A12B-950009EE4C4D}" type="datetimeFigureOut">
               <a:rPr lang="en-US" smtClean="0"/>
-              <a:t>3/3/2019</a:t>
+              <a:t>3/6/2019</a:t>
             </a:fld>
             <a:endParaRPr lang="en-US"/>
           </a:p>
@@ -10114,7 +10217,7 @@
           <a:p>
             <a:fld id="{C25EEC7D-36B5-410D-A12B-950009EE4C4D}" type="datetimeFigureOut">
               <a:rPr lang="en-US" smtClean="0"/>
-              <a:t>3/3/2019</a:t>
+              <a:t>3/6/2019</a:t>
             </a:fld>
             <a:endParaRPr lang="en-US"/>
           </a:p>
@@ -14213,6 +14316,422 @@
           <a:chExt cx="0" cy="0"/>
         </a:xfrm>
       </p:grpSpPr>
+      <p:sp>
+        <p:nvSpPr>
+          <p:cNvPr id="2" name="Title 1">
+            <a:extLst>
+              <a:ext uri="{FF2B5EF4-FFF2-40B4-BE49-F238E27FC236}">
+                <a16:creationId xmlns:a16="http://schemas.microsoft.com/office/drawing/2014/main" id="{C6AB2A77-B940-4CB2-B125-F010521A823F}"/>
+              </a:ext>
+            </a:extLst>
+          </p:cNvPr>
+          <p:cNvSpPr>
+            <a:spLocks noGrp="1"/>
+          </p:cNvSpPr>
+          <p:nvPr>
+            <p:ph type="title"/>
+          </p:nvPr>
+        </p:nvSpPr>
+        <p:spPr/>
+        <p:txBody>
+          <a:bodyPr/>
+          <a:lstStyle/>
+          <a:p>
+            <a:r>
+              <a:rPr lang="en-US" sz="3200" dirty="0"/>
+              <a:t>Development Process:</a:t>
+            </a:r>
+          </a:p>
+        </p:txBody>
+      </p:sp>
+      <p:sp>
+        <p:nvSpPr>
+          <p:cNvPr id="3" name="Content Placeholder 2">
+            <a:extLst>
+              <a:ext uri="{FF2B5EF4-FFF2-40B4-BE49-F238E27FC236}">
+                <a16:creationId xmlns:a16="http://schemas.microsoft.com/office/drawing/2014/main" id="{C672D832-6F41-4047-8E00-67D9D06E266B}"/>
+              </a:ext>
+            </a:extLst>
+          </p:cNvPr>
+          <p:cNvSpPr>
+            <a:spLocks noGrp="1"/>
+          </p:cNvSpPr>
+          <p:nvPr>
+            <p:ph idx="1"/>
+          </p:nvPr>
+        </p:nvSpPr>
+        <p:spPr/>
+        <p:txBody>
+          <a:bodyPr/>
+          <a:lstStyle/>
+          <a:p>
+            <a:pPr marL="514350" lvl="0" indent="-514350">
+              <a:buFont typeface="+mj-lt"/>
+              <a:buAutoNum type="arabicPeriod"/>
+            </a:pPr>
+            <a:r>
+              <a:rPr lang="en-US" sz="2400" dirty="0"/>
+              <a:t>Read (just) the development data out of the database.</a:t>
+            </a:r>
+          </a:p>
+          <a:p>
+            <a:pPr marL="514350" lvl="0" indent="-514350">
+              <a:buFont typeface="+mj-lt"/>
+              <a:buAutoNum type="arabicPeriod"/>
+            </a:pPr>
+            <a:r>
+              <a:rPr lang="en-US" sz="2400" dirty="0"/>
+              <a:t>Randomly divide </a:t>
+            </a:r>
+            <a:r>
+              <a:rPr lang="en-US" sz="2400" i="1" dirty="0"/>
+              <a:t>that</a:t>
+            </a:r>
+            <a:r>
+              <a:rPr lang="en-US" sz="2400" dirty="0"/>
+              <a:t> into two-thirds training and one-third test subsamples (again stratified by Hospitalization status).</a:t>
+            </a:r>
+          </a:p>
+          <a:p>
+            <a:pPr marL="514350" lvl="0" indent="-514350">
+              <a:buFont typeface="+mj-lt"/>
+              <a:buAutoNum type="arabicPeriod"/>
+            </a:pPr>
+            <a:r>
+              <a:rPr lang="en-US" sz="2400" dirty="0"/>
+              <a:t>Use the training subsample to train various classifiers (random forest, support vector, etc.)</a:t>
+            </a:r>
+          </a:p>
+          <a:p>
+            <a:pPr marL="514350" lvl="0" indent="-514350">
+              <a:buFont typeface="+mj-lt"/>
+              <a:buAutoNum type="arabicPeriod"/>
+            </a:pPr>
+            <a:r>
+              <a:rPr lang="en-US" sz="2400" dirty="0"/>
+              <a:t>Use those trained classifiers to predict the cases from the ‘test’ subsample.</a:t>
+            </a:r>
+          </a:p>
+          <a:p>
+            <a:pPr marL="514350" lvl="0" indent="-514350">
+              <a:buFont typeface="+mj-lt"/>
+              <a:buAutoNum type="arabicPeriod"/>
+            </a:pPr>
+            <a:r>
+              <a:rPr lang="en-US" sz="2400" dirty="0"/>
+              <a:t>Evaluate performance.</a:t>
+            </a:r>
+          </a:p>
+          <a:p>
+            <a:pPr marL="514350" indent="-514350">
+              <a:buFont typeface="+mj-lt"/>
+              <a:buAutoNum type="arabicPeriod"/>
+            </a:pPr>
+            <a:r>
+              <a:rPr lang="en-US" sz="2400" dirty="0"/>
+              <a:t>If performance is unsatisfactory </a:t>
+            </a:r>
+            <a:r>
+              <a:rPr lang="en-US" sz="2400" b="1" dirty="0"/>
+              <a:t>and</a:t>
+            </a:r>
+            <a:r>
+              <a:rPr lang="en-US" sz="2400" dirty="0"/>
+              <a:t> we can think of something to tweak (features, classifier parameters, etc.) do those tweaks and start back at #1.</a:t>
+            </a:r>
+          </a:p>
+          <a:p>
+            <a:pPr marL="514350" indent="-514350">
+              <a:buFont typeface="+mj-lt"/>
+              <a:buAutoNum type="arabicPeriod"/>
+            </a:pPr>
+            <a:r>
+              <a:rPr lang="en-US" sz="2400" dirty="0"/>
+              <a:t>When done iterating, test classifiers in the held-back validation data.</a:t>
+            </a:r>
+          </a:p>
+        </p:txBody>
+      </p:sp>
+    </p:spTree>
+    <p:extLst>
+      <p:ext uri="{BB962C8B-B14F-4D97-AF65-F5344CB8AC3E}">
+        <p14:creationId xmlns:p14="http://schemas.microsoft.com/office/powerpoint/2010/main" val="3487464237"/>
+      </p:ext>
+    </p:extLst>
+  </p:cSld>
+  <p:clrMapOvr>
+    <a:masterClrMapping/>
+  </p:clrMapOvr>
+</p:sld>
+</file>
+
+<file path=ppt/slides/slide11.xml><?xml version="1.0" encoding="utf-8"?>
+<p:sld xmlns:a="http://schemas.openxmlformats.org/drawingml/2006/main" xmlns:r="http://schemas.openxmlformats.org/officeDocument/2006/relationships" xmlns:p="http://schemas.openxmlformats.org/presentationml/2006/main">
+  <p:cSld>
+    <p:spTree>
+      <p:nvGrpSpPr>
+        <p:cNvPr id="1" name=""/>
+        <p:cNvGrpSpPr/>
+        <p:nvPr/>
+      </p:nvGrpSpPr>
+      <p:grpSpPr>
+        <a:xfrm>
+          <a:off x="0" y="0"/>
+          <a:ext cx="0" cy="0"/>
+          <a:chOff x="0" y="0"/>
+          <a:chExt cx="0" cy="0"/>
+        </a:xfrm>
+      </p:grpSpPr>
+      <p:sp>
+        <p:nvSpPr>
+          <p:cNvPr id="9" name="Text Placeholder 8">
+            <a:extLst>
+              <a:ext uri="{FF2B5EF4-FFF2-40B4-BE49-F238E27FC236}">
+                <a16:creationId xmlns:a16="http://schemas.microsoft.com/office/drawing/2014/main" id="{13FE8F7C-D8D9-4E08-ABAA-C5E193CDA846}"/>
+              </a:ext>
+            </a:extLst>
+          </p:cNvPr>
+          <p:cNvSpPr>
+            <a:spLocks noGrp="1"/>
+          </p:cNvSpPr>
+          <p:nvPr>
+            <p:ph type="body" sz="quarter" idx="14"/>
+          </p:nvPr>
+        </p:nvSpPr>
+        <p:spPr/>
+        <p:txBody>
+          <a:bodyPr/>
+          <a:lstStyle/>
+          <a:p>
+            <a:endParaRPr lang="en-US" dirty="0"/>
+          </a:p>
+        </p:txBody>
+      </p:sp>
+      <p:sp>
+        <p:nvSpPr>
+          <p:cNvPr id="11" name="Text Placeholder 10">
+            <a:extLst>
+              <a:ext uri="{FF2B5EF4-FFF2-40B4-BE49-F238E27FC236}">
+                <a16:creationId xmlns:a16="http://schemas.microsoft.com/office/drawing/2014/main" id="{8E3D4659-5ED8-4F9F-A39C-0FBC78F5FB0C}"/>
+              </a:ext>
+            </a:extLst>
+          </p:cNvPr>
+          <p:cNvSpPr>
+            <a:spLocks noGrp="1"/>
+          </p:cNvSpPr>
+          <p:nvPr>
+            <p:ph type="body" sz="quarter" idx="15"/>
+          </p:nvPr>
+        </p:nvSpPr>
+        <p:spPr/>
+        <p:txBody>
+          <a:bodyPr/>
+          <a:lstStyle/>
+          <a:p>
+            <a:endParaRPr lang="en-US"/>
+          </a:p>
+        </p:txBody>
+      </p:sp>
+      <p:sp>
+        <p:nvSpPr>
+          <p:cNvPr id="4" name="Title 3">
+            <a:extLst>
+              <a:ext uri="{FF2B5EF4-FFF2-40B4-BE49-F238E27FC236}">
+                <a16:creationId xmlns:a16="http://schemas.microsoft.com/office/drawing/2014/main" id="{E37812BD-31E0-4570-AEEB-2C1D1B104D7F}"/>
+              </a:ext>
+            </a:extLst>
+          </p:cNvPr>
+          <p:cNvSpPr>
+            <a:spLocks noGrp="1"/>
+          </p:cNvSpPr>
+          <p:nvPr>
+            <p:ph type="title"/>
+          </p:nvPr>
+        </p:nvSpPr>
+        <p:spPr/>
+        <p:txBody>
+          <a:bodyPr/>
+          <a:lstStyle/>
+          <a:p>
+            <a:r>
+              <a:rPr lang="en-US" sz="3200" dirty="0"/>
+              <a:t>How’d We Do?</a:t>
+            </a:r>
+          </a:p>
+        </p:txBody>
+      </p:sp>
+      <p:sp>
+        <p:nvSpPr>
+          <p:cNvPr id="12" name="Content Placeholder 11">
+            <a:extLst>
+              <a:ext uri="{FF2B5EF4-FFF2-40B4-BE49-F238E27FC236}">
+                <a16:creationId xmlns:a16="http://schemas.microsoft.com/office/drawing/2014/main" id="{6B387B93-FB0C-4FEF-ADBD-064E110E6326}"/>
+              </a:ext>
+            </a:extLst>
+          </p:cNvPr>
+          <p:cNvSpPr>
+            <a:spLocks noGrp="1"/>
+          </p:cNvSpPr>
+          <p:nvPr>
+            <p:ph sz="quarter" idx="19"/>
+          </p:nvPr>
+        </p:nvSpPr>
+        <p:spPr/>
+        <p:txBody>
+          <a:bodyPr/>
+          <a:lstStyle/>
+          <a:p>
+            <a:r>
+              <a:rPr lang="en-US" sz="2000" dirty="0"/>
+              <a:t>This is a </a:t>
+            </a:r>
+            <a:r>
+              <a:rPr lang="en-US" sz="2000" b="1" dirty="0"/>
+              <a:t>triage</a:t>
+            </a:r>
+            <a:r>
+              <a:rPr lang="en-US" sz="2000" dirty="0"/>
+              <a:t> task—goal is to help Case Managers </a:t>
+            </a:r>
+            <a:r>
+              <a:rPr lang="en-US" sz="2000" i="1" dirty="0"/>
+              <a:t>prioritize</a:t>
+            </a:r>
+            <a:r>
+              <a:rPr lang="en-US" sz="2000" dirty="0"/>
+              <a:t> their efforts.</a:t>
+            </a:r>
+          </a:p>
+          <a:p>
+            <a:r>
+              <a:rPr lang="en-US" sz="2000" dirty="0"/>
+              <a:t>So what we really want is a good </a:t>
+            </a:r>
+            <a:r>
+              <a:rPr lang="en-US" sz="2000" i="1" dirty="0"/>
+              <a:t>ranking</a:t>
+            </a:r>
+            <a:r>
+              <a:rPr lang="en-US" sz="2000" dirty="0"/>
+              <a:t> of most-needy to least-needy.</a:t>
+            </a:r>
+          </a:p>
+          <a:p>
+            <a:r>
+              <a:rPr lang="en-US" sz="2000" dirty="0"/>
+              <a:t>To evaluate rankings:</a:t>
+            </a:r>
+          </a:p>
+          <a:p>
+            <a:pPr marL="617220" lvl="1" indent="-342900">
+              <a:buFont typeface="+mj-lt"/>
+              <a:buAutoNum type="arabicPeriod"/>
+            </a:pPr>
+            <a:r>
+              <a:rPr lang="en-US" sz="2000" dirty="0"/>
+              <a:t>Sort the test subsample by one of the candidate predictions, from most-likely-to-be-hospitalized to least-likely.</a:t>
+            </a:r>
+          </a:p>
+          <a:p>
+            <a:pPr marL="617220" lvl="1" indent="-342900">
+              <a:buFont typeface="+mj-lt"/>
+              <a:buAutoNum type="arabicPeriod"/>
+            </a:pPr>
+            <a:r>
+              <a:rPr lang="en-US" sz="2000" dirty="0"/>
+              <a:t>Run down the line counting the cumulative number of people who were in fact hospitalized.</a:t>
+            </a:r>
+          </a:p>
+          <a:p>
+            <a:pPr marL="617220" lvl="1" indent="-342900">
+              <a:buFont typeface="+mj-lt"/>
+              <a:buAutoNum type="arabicPeriod"/>
+            </a:pPr>
+            <a:r>
+              <a:rPr lang="en-US" sz="2000" dirty="0"/>
+              <a:t>How many people do we have to go through in order to find Y people hospitalized?</a:t>
+            </a:r>
+          </a:p>
+          <a:p>
+            <a:pPr marL="274320" lvl="1" indent="0">
+              <a:buNone/>
+            </a:pPr>
+            <a:endParaRPr lang="en-US" sz="2000" dirty="0"/>
+          </a:p>
+          <a:p>
+            <a:pPr marL="0" indent="-182789">
+              <a:buNone/>
+            </a:pPr>
+            <a:r>
+              <a:rPr lang="en-US" sz="2800" dirty="0"/>
+              <a:t>The faster the Y values climb, the better the predictor.</a:t>
+            </a:r>
+          </a:p>
+          <a:p>
+            <a:endParaRPr lang="en-US" sz="2000" dirty="0"/>
+          </a:p>
+        </p:txBody>
+      </p:sp>
+      <p:sp>
+        <p:nvSpPr>
+          <p:cNvPr id="6" name="Slide Number Placeholder 5">
+            <a:extLst>
+              <a:ext uri="{FF2B5EF4-FFF2-40B4-BE49-F238E27FC236}">
+                <a16:creationId xmlns:a16="http://schemas.microsoft.com/office/drawing/2014/main" id="{43F859F1-3EB0-4637-984D-6BC68A6A6E0B}"/>
+              </a:ext>
+            </a:extLst>
+          </p:cNvPr>
+          <p:cNvSpPr>
+            <a:spLocks noGrp="1"/>
+          </p:cNvSpPr>
+          <p:nvPr>
+            <p:ph type="sldNum" sz="quarter" idx="4"/>
+          </p:nvPr>
+        </p:nvSpPr>
+        <p:spPr/>
+        <p:txBody>
+          <a:bodyPr/>
+          <a:lstStyle/>
+          <a:p>
+            <a:fld id="{8C8B385D-DF67-E241-B0BF-76B80A8E743B}" type="slidenum">
+              <a:rPr lang="en-US" smtClean="0"/>
+              <a:pPr/>
+              <a:t>11</a:t>
+            </a:fld>
+            <a:endParaRPr lang="en-US" dirty="0"/>
+          </a:p>
+        </p:txBody>
+      </p:sp>
+    </p:spTree>
+    <p:extLst>
+      <p:ext uri="{BB962C8B-B14F-4D97-AF65-F5344CB8AC3E}">
+        <p14:creationId xmlns:p14="http://schemas.microsoft.com/office/powerpoint/2010/main" val="1438239045"/>
+      </p:ext>
+    </p:extLst>
+  </p:cSld>
+  <p:clrMapOvr>
+    <a:masterClrMapping/>
+  </p:clrMapOvr>
+</p:sld>
+</file>
+
+<file path=ppt/slides/slide12.xml><?xml version="1.0" encoding="utf-8"?>
+<p:sld xmlns:a="http://schemas.openxmlformats.org/drawingml/2006/main" xmlns:r="http://schemas.openxmlformats.org/officeDocument/2006/relationships" xmlns:p="http://schemas.openxmlformats.org/presentationml/2006/main">
+  <p:cSld>
+    <p:spTree>
+      <p:nvGrpSpPr>
+        <p:cNvPr id="1" name=""/>
+        <p:cNvGrpSpPr/>
+        <p:nvPr/>
+      </p:nvGrpSpPr>
+      <p:grpSpPr>
+        <a:xfrm>
+          <a:off x="0" y="0"/>
+          <a:ext cx="0" cy="0"/>
+          <a:chOff x="0" y="0"/>
+          <a:chExt cx="0" cy="0"/>
+        </a:xfrm>
+      </p:grpSpPr>
       <p:pic>
         <p:nvPicPr>
           <p:cNvPr id="10" name="Picture 9">
@@ -14336,7 +14855,7 @@
 </p:sld>
 </file>
 
-<file path=ppt/slides/slide11.xml><?xml version="1.0" encoding="utf-8"?>
+<file path=ppt/slides/slide13.xml><?xml version="1.0" encoding="utf-8"?>
 <p:sld xmlns:a="http://schemas.openxmlformats.org/drawingml/2006/main" xmlns:r="http://schemas.openxmlformats.org/officeDocument/2006/relationships" xmlns:p="http://schemas.openxmlformats.org/presentationml/2006/main">
   <p:cSld>
     <p:spTree>
@@ -14442,382 +14961,6 @@
 </p:sld>
 </file>
 
-<file path=ppt/slides/slide12.xml><?xml version="1.0" encoding="utf-8"?>
-<p:sld xmlns:a="http://schemas.openxmlformats.org/drawingml/2006/main" xmlns:r="http://schemas.openxmlformats.org/officeDocument/2006/relationships" xmlns:p="http://schemas.openxmlformats.org/presentationml/2006/main">
-  <p:cSld>
-    <p:spTree>
-      <p:nvGrpSpPr>
-        <p:cNvPr id="1" name=""/>
-        <p:cNvGrpSpPr/>
-        <p:nvPr/>
-      </p:nvGrpSpPr>
-      <p:grpSpPr>
-        <a:xfrm>
-          <a:off x="0" y="0"/>
-          <a:ext cx="0" cy="0"/>
-          <a:chOff x="0" y="0"/>
-          <a:chExt cx="0" cy="0"/>
-        </a:xfrm>
-      </p:grpSpPr>
-      <p:sp>
-        <p:nvSpPr>
-          <p:cNvPr id="7" name="Text Placeholder 6">
-            <a:extLst>
-              <a:ext uri="{FF2B5EF4-FFF2-40B4-BE49-F238E27FC236}">
-                <a16:creationId xmlns:a16="http://schemas.microsoft.com/office/drawing/2014/main" id="{4666FAEF-1F46-409C-AB17-050EA196AE4F}"/>
-              </a:ext>
-            </a:extLst>
-          </p:cNvPr>
-          <p:cNvSpPr>
-            <a:spLocks noGrp="1"/>
-          </p:cNvSpPr>
-          <p:nvPr>
-            <p:ph type="body" sz="quarter" idx="14"/>
-          </p:nvPr>
-        </p:nvSpPr>
-        <p:spPr/>
-        <p:txBody>
-          <a:bodyPr/>
-          <a:lstStyle/>
-          <a:p>
-            <a:endParaRPr lang="en-US"/>
-          </a:p>
-        </p:txBody>
-      </p:sp>
-      <p:sp>
-        <p:nvSpPr>
-          <p:cNvPr id="10" name="Text Placeholder 9">
-            <a:extLst>
-              <a:ext uri="{FF2B5EF4-FFF2-40B4-BE49-F238E27FC236}">
-                <a16:creationId xmlns:a16="http://schemas.microsoft.com/office/drawing/2014/main" id="{745DC592-CE06-480A-9109-2ACC007B5600}"/>
-              </a:ext>
-            </a:extLst>
-          </p:cNvPr>
-          <p:cNvSpPr>
-            <a:spLocks noGrp="1"/>
-          </p:cNvSpPr>
-          <p:nvPr>
-            <p:ph type="body" sz="quarter" idx="15"/>
-          </p:nvPr>
-        </p:nvSpPr>
-        <p:spPr/>
-        <p:txBody>
-          <a:bodyPr/>
-          <a:lstStyle/>
-          <a:p>
-            <a:endParaRPr lang="en-US"/>
-          </a:p>
-        </p:txBody>
-      </p:sp>
-      <p:sp>
-        <p:nvSpPr>
-          <p:cNvPr id="2" name="Title 1">
-            <a:extLst>
-              <a:ext uri="{FF2B5EF4-FFF2-40B4-BE49-F238E27FC236}">
-                <a16:creationId xmlns:a16="http://schemas.microsoft.com/office/drawing/2014/main" id="{23AAB693-84A1-4CBC-BA56-5FF9A193AA5D}"/>
-              </a:ext>
-            </a:extLst>
-          </p:cNvPr>
-          <p:cNvSpPr>
-            <a:spLocks noGrp="1"/>
-          </p:cNvSpPr>
-          <p:nvPr>
-            <p:ph type="title"/>
-          </p:nvPr>
-        </p:nvSpPr>
-        <p:spPr/>
-        <p:txBody>
-          <a:bodyPr/>
-          <a:lstStyle/>
-          <a:p>
-            <a:r>
-              <a:rPr lang="en-US" sz="2800" dirty="0"/>
-              <a:t>Conclusions and Caveats</a:t>
-            </a:r>
-          </a:p>
-        </p:txBody>
-      </p:sp>
-      <p:sp>
-        <p:nvSpPr>
-          <p:cNvPr id="8" name="Content Placeholder 7">
-            <a:extLst>
-              <a:ext uri="{FF2B5EF4-FFF2-40B4-BE49-F238E27FC236}">
-                <a16:creationId xmlns:a16="http://schemas.microsoft.com/office/drawing/2014/main" id="{01348890-9006-4308-9B95-2401AE998340}"/>
-              </a:ext>
-            </a:extLst>
-          </p:cNvPr>
-          <p:cNvSpPr>
-            <a:spLocks noGrp="1"/>
-          </p:cNvSpPr>
-          <p:nvPr>
-            <p:ph sz="quarter" idx="20"/>
-          </p:nvPr>
-        </p:nvSpPr>
-        <p:spPr/>
-        <p:txBody>
-          <a:bodyPr/>
-          <a:lstStyle/>
-          <a:p>
-            <a:r>
-              <a:rPr lang="en-US" sz="2000" dirty="0"/>
-              <a:t>Generally Black Boxes.</a:t>
-            </a:r>
-          </a:p>
-          <a:p>
-            <a:r>
-              <a:rPr lang="en-US" sz="2000" dirty="0"/>
-              <a:t>Not </a:t>
-            </a:r>
-            <a:r>
-              <a:rPr lang="en-US" sz="2000" i="1" dirty="0"/>
-              <a:t>Research</a:t>
-            </a:r>
-            <a:r>
-              <a:rPr lang="en-US" sz="2000" dirty="0"/>
-              <a:t>, really.</a:t>
-            </a:r>
-          </a:p>
-          <a:p>
-            <a:r>
-              <a:rPr lang="en-US" sz="2000" dirty="0"/>
-              <a:t>Not unlocking mysteries of the underlying mechanisms here.</a:t>
-            </a:r>
-          </a:p>
-        </p:txBody>
-      </p:sp>
-      <p:sp>
-        <p:nvSpPr>
-          <p:cNvPr id="11" name="Content Placeholder 10">
-            <a:extLst>
-              <a:ext uri="{FF2B5EF4-FFF2-40B4-BE49-F238E27FC236}">
-                <a16:creationId xmlns:a16="http://schemas.microsoft.com/office/drawing/2014/main" id="{A4E0BDCA-8EB1-4909-A06C-FA5E977DCFFE}"/>
-              </a:ext>
-            </a:extLst>
-          </p:cNvPr>
-          <p:cNvSpPr>
-            <a:spLocks noGrp="1"/>
-          </p:cNvSpPr>
-          <p:nvPr>
-            <p:ph sz="quarter" idx="21"/>
-          </p:nvPr>
-        </p:nvSpPr>
-        <p:spPr/>
-        <p:txBody>
-          <a:bodyPr/>
-          <a:lstStyle/>
-          <a:p>
-            <a:r>
-              <a:rPr lang="en-US" sz="2000" dirty="0"/>
-              <a:t>We were able to create a predictor just as good (for our purposes) as an expensive third party tool, using fewer months of input data.</a:t>
-            </a:r>
-          </a:p>
-          <a:p>
-            <a:pPr lvl="1"/>
-            <a:r>
-              <a:rPr lang="en-US" sz="2000" dirty="0"/>
-              <a:t>With very little expertise, medical or otherwise.</a:t>
-            </a:r>
-          </a:p>
-          <a:p>
-            <a:pPr lvl="1"/>
-            <a:r>
-              <a:rPr lang="en-US" sz="2000" dirty="0"/>
-              <a:t>$0 spent on software/hardware.</a:t>
-            </a:r>
-          </a:p>
-          <a:p>
-            <a:r>
-              <a:rPr lang="en-US" sz="2000" dirty="0"/>
-              <a:t>Python + </a:t>
-            </a:r>
-            <a:r>
-              <a:rPr lang="en-US" sz="2000" dirty="0" err="1"/>
-              <a:t>scikit</a:t>
-            </a:r>
-            <a:r>
-              <a:rPr lang="en-US" sz="2000" dirty="0"/>
-              <a:t>-learn very usable.</a:t>
-            </a:r>
-          </a:p>
-          <a:p>
-            <a:r>
-              <a:rPr lang="en-US" sz="2000" dirty="0"/>
-              <a:t>Ditto VDW Data.</a:t>
-            </a:r>
-          </a:p>
-          <a:p>
-            <a:r>
-              <a:rPr lang="en-US" sz="2000" dirty="0"/>
-              <a:t>No reason to operate with one hand (insurance/clinical data) tied behind our back.</a:t>
-            </a:r>
-          </a:p>
-          <a:p>
-            <a:endParaRPr lang="en-US" dirty="0"/>
-          </a:p>
-        </p:txBody>
-      </p:sp>
-    </p:spTree>
-    <p:extLst>
-      <p:ext uri="{BB962C8B-B14F-4D97-AF65-F5344CB8AC3E}">
-        <p14:creationId xmlns:p14="http://schemas.microsoft.com/office/powerpoint/2010/main" val="351981485"/>
-      </p:ext>
-    </p:extLst>
-  </p:cSld>
-  <p:clrMapOvr>
-    <a:masterClrMapping/>
-  </p:clrMapOvr>
-</p:sld>
-</file>
-
-<file path=ppt/slides/slide13.xml><?xml version="1.0" encoding="utf-8"?>
-<p:sld xmlns:a="http://schemas.openxmlformats.org/drawingml/2006/main" xmlns:r="http://schemas.openxmlformats.org/officeDocument/2006/relationships" xmlns:p="http://schemas.openxmlformats.org/presentationml/2006/main">
-  <p:cSld>
-    <p:spTree>
-      <p:nvGrpSpPr>
-        <p:cNvPr id="1" name=""/>
-        <p:cNvGrpSpPr/>
-        <p:nvPr/>
-      </p:nvGrpSpPr>
-      <p:grpSpPr>
-        <a:xfrm>
-          <a:off x="0" y="0"/>
-          <a:ext cx="0" cy="0"/>
-          <a:chOff x="0" y="0"/>
-          <a:chExt cx="0" cy="0"/>
-        </a:xfrm>
-      </p:grpSpPr>
-      <p:sp>
-        <p:nvSpPr>
-          <p:cNvPr id="2" name="Title 1">
-            <a:extLst>
-              <a:ext uri="{FF2B5EF4-FFF2-40B4-BE49-F238E27FC236}">
-                <a16:creationId xmlns:a16="http://schemas.microsoft.com/office/drawing/2014/main" id="{02D0C212-A423-49D2-99A2-0CFFB9139CF3}"/>
-              </a:ext>
-            </a:extLst>
-          </p:cNvPr>
-          <p:cNvSpPr>
-            <a:spLocks noGrp="1"/>
-          </p:cNvSpPr>
-          <p:nvPr>
-            <p:ph type="title"/>
-          </p:nvPr>
-        </p:nvSpPr>
-        <p:spPr/>
-        <p:txBody>
-          <a:bodyPr/>
-          <a:lstStyle/>
-          <a:p>
-            <a:r>
-              <a:rPr lang="en-US" sz="3600" dirty="0"/>
-              <a:t>Future Directions</a:t>
-            </a:r>
-          </a:p>
-        </p:txBody>
-      </p:sp>
-      <p:sp>
-        <p:nvSpPr>
-          <p:cNvPr id="3" name="Content Placeholder 2">
-            <a:extLst>
-              <a:ext uri="{FF2B5EF4-FFF2-40B4-BE49-F238E27FC236}">
-                <a16:creationId xmlns:a16="http://schemas.microsoft.com/office/drawing/2014/main" id="{3E2DE287-CB92-4B45-90F1-E8D2F1F543B5}"/>
-              </a:ext>
-            </a:extLst>
-          </p:cNvPr>
-          <p:cNvSpPr>
-            <a:spLocks noGrp="1"/>
-          </p:cNvSpPr>
-          <p:nvPr>
-            <p:ph idx="1"/>
-          </p:nvPr>
-        </p:nvSpPr>
-        <p:spPr/>
-        <p:txBody>
-          <a:bodyPr>
-            <a:normAutofit/>
-          </a:bodyPr>
-          <a:lstStyle/>
-          <a:p>
-            <a:r>
-              <a:rPr lang="en-US" sz="2400" dirty="0"/>
-              <a:t>Switch </a:t>
-            </a:r>
-          </a:p>
-          <a:p>
-            <a:pPr lvl="1"/>
-            <a:r>
-              <a:rPr lang="en-US" sz="2400" dirty="0"/>
-              <a:t>from using binary feature flags to counts of feature occurrences.</a:t>
-            </a:r>
-          </a:p>
-          <a:p>
-            <a:pPr lvl="1"/>
-            <a:r>
-              <a:rPr lang="en-US" sz="2400" dirty="0"/>
-              <a:t>to ingredient-level </a:t>
-            </a:r>
-            <a:r>
-              <a:rPr lang="en-US" sz="2400" dirty="0" err="1"/>
-              <a:t>RxCUIs</a:t>
-            </a:r>
-            <a:r>
-              <a:rPr lang="en-US" sz="2400" dirty="0"/>
-              <a:t> (or supplement with?)</a:t>
-            </a:r>
-          </a:p>
-          <a:p>
-            <a:pPr lvl="1"/>
-            <a:r>
-              <a:rPr lang="en-US" sz="2400" dirty="0"/>
-              <a:t>to lower-latency sources for dx/</a:t>
-            </a:r>
-            <a:r>
-              <a:rPr lang="en-US" sz="2400" dirty="0" err="1"/>
-              <a:t>px</a:t>
-            </a:r>
-            <a:r>
-              <a:rPr lang="en-US" sz="2400" dirty="0"/>
-              <a:t> (other sources are already daily).</a:t>
-            </a:r>
-          </a:p>
-          <a:p>
-            <a:r>
-              <a:rPr lang="en-US" sz="2400" dirty="0"/>
-              <a:t>Try additional classifiers.</a:t>
-            </a:r>
-          </a:p>
-          <a:p>
-            <a:r>
-              <a:rPr lang="en-US" sz="2400" dirty="0"/>
-              <a:t>Tweak Parameters.</a:t>
-            </a:r>
-          </a:p>
-          <a:p>
-            <a:r>
-              <a:rPr lang="en-US" sz="2400" dirty="0"/>
-              <a:t>Expand population, either to additional diseases, or to the general population.</a:t>
-            </a:r>
-          </a:p>
-          <a:p>
-            <a:r>
-              <a:rPr lang="en-US" sz="2400" dirty="0"/>
-              <a:t>Create additional predictors for Care Managers’ ratings of success/impact.</a:t>
-            </a:r>
-          </a:p>
-        </p:txBody>
-      </p:sp>
-    </p:spTree>
-    <p:extLst>
-      <p:ext uri="{BB962C8B-B14F-4D97-AF65-F5344CB8AC3E}">
-        <p14:creationId xmlns:p14="http://schemas.microsoft.com/office/powerpoint/2010/main" val="3441954348"/>
-      </p:ext>
-    </p:extLst>
-  </p:cSld>
-  <p:clrMapOvr>
-    <a:masterClrMapping/>
-  </p:clrMapOvr>
-</p:sld>
-</file>
-
 <file path=ppt/slides/slide14.xml><?xml version="1.0" encoding="utf-8"?>
 <p:sld xmlns:a="http://schemas.openxmlformats.org/drawingml/2006/main" xmlns:r="http://schemas.openxmlformats.org/officeDocument/2006/relationships" xmlns:p="http://schemas.openxmlformats.org/presentationml/2006/main">
   <p:cSld>
@@ -14837,10 +14980,10 @@
       </p:grpSpPr>
       <p:sp>
         <p:nvSpPr>
-          <p:cNvPr id="5" name="Title 4">
+          <p:cNvPr id="7" name="Text Placeholder 6">
             <a:extLst>
               <a:ext uri="{FF2B5EF4-FFF2-40B4-BE49-F238E27FC236}">
-                <a16:creationId xmlns:a16="http://schemas.microsoft.com/office/drawing/2014/main" id="{07744E30-D06D-4A8C-8C1D-44F154E9BF0E}"/>
+                <a16:creationId xmlns:a16="http://schemas.microsoft.com/office/drawing/2014/main" id="{4666FAEF-1F46-409C-AB17-050EA196AE4F}"/>
               </a:ext>
             </a:extLst>
           </p:cNvPr>
@@ -14848,32 +14991,24 @@
             <a:spLocks noGrp="1"/>
           </p:cNvSpPr>
           <p:nvPr>
-            <p:ph type="title"/>
-          </p:nvPr>
-        </p:nvSpPr>
-        <p:spPr>
-          <a:xfrm>
-            <a:off x="838091" y="1306360"/>
-            <a:ext cx="10515818" cy="1690776"/>
-          </a:xfrm>
-        </p:spPr>
+            <p:ph type="body" sz="quarter" idx="14"/>
+          </p:nvPr>
+        </p:nvSpPr>
+        <p:spPr/>
         <p:txBody>
           <a:bodyPr/>
           <a:lstStyle/>
           <a:p>
-            <a:r>
-              <a:rPr lang="en-US" sz="6000" dirty="0"/>
-              <a:t>Thank You!</a:t>
-            </a:r>
-          </a:p>
-        </p:txBody>
-      </p:sp>
-      <p:sp>
-        <p:nvSpPr>
-          <p:cNvPr id="6" name="Text Placeholder 5">
+            <a:endParaRPr lang="en-US"/>
+          </a:p>
+        </p:txBody>
+      </p:sp>
+      <p:sp>
+        <p:nvSpPr>
+          <p:cNvPr id="10" name="Text Placeholder 9">
             <a:extLst>
               <a:ext uri="{FF2B5EF4-FFF2-40B4-BE49-F238E27FC236}">
-                <a16:creationId xmlns:a16="http://schemas.microsoft.com/office/drawing/2014/main" id="{7FF91EDB-7BD0-453F-80BD-82DF4B04EFF6}"/>
+                <a16:creationId xmlns:a16="http://schemas.microsoft.com/office/drawing/2014/main" id="{745DC592-CE06-480A-9109-2ACC007B5600}"/>
               </a:ext>
             </a:extLst>
           </p:cNvPr>
@@ -14881,47 +15016,24 @@
             <a:spLocks noGrp="1"/>
           </p:cNvSpPr>
           <p:nvPr>
-            <p:ph type="body" sz="quarter" idx="10"/>
-          </p:nvPr>
-        </p:nvSpPr>
-        <p:spPr>
-          <a:xfrm>
-            <a:off x="838091" y="4684144"/>
-            <a:ext cx="10515818" cy="1155940"/>
-          </a:xfrm>
-        </p:spPr>
+            <p:ph type="body" sz="quarter" idx="15"/>
+          </p:nvPr>
+        </p:nvSpPr>
+        <p:spPr/>
         <p:txBody>
           <a:bodyPr/>
           <a:lstStyle/>
           <a:p>
-            <a:r>
-              <a:rPr lang="en-US" sz="4000" dirty="0"/>
-              <a:t>https://github.com/rpardee/hcsrn_2019</a:t>
-            </a:r>
-          </a:p>
-          <a:p>
-            <a:endParaRPr lang="en-US" sz="2000" dirty="0"/>
-          </a:p>
-          <a:p>
-            <a:r>
-              <a:rPr lang="en-US" sz="2000" dirty="0"/>
-              <a:t>roy.e.pardee@kp.org</a:t>
-            </a:r>
-          </a:p>
-          <a:p>
-            <a:r>
-              <a:rPr lang="en-US" sz="2000" dirty="0"/>
-              <a:t>david.j.cronkite@kp.org</a:t>
-            </a:r>
-          </a:p>
-        </p:txBody>
-      </p:sp>
-      <p:sp>
-        <p:nvSpPr>
-          <p:cNvPr id="4" name="Slide Number Placeholder 3">
+            <a:endParaRPr lang="en-US"/>
+          </a:p>
+        </p:txBody>
+      </p:sp>
+      <p:sp>
+        <p:nvSpPr>
+          <p:cNvPr id="2" name="Title 1">
             <a:extLst>
               <a:ext uri="{FF2B5EF4-FFF2-40B4-BE49-F238E27FC236}">
-                <a16:creationId xmlns:a16="http://schemas.microsoft.com/office/drawing/2014/main" id="{117AD612-B4E1-4199-AFDB-1A1E7566813D}"/>
+                <a16:creationId xmlns:a16="http://schemas.microsoft.com/office/drawing/2014/main" id="{23AAB693-84A1-4CBC-BA56-5FF9A193AA5D}"/>
               </a:ext>
             </a:extLst>
           </p:cNvPr>
@@ -14929,7 +15041,7 @@
             <a:spLocks noGrp="1"/>
           </p:cNvSpPr>
           <p:nvPr>
-            <p:ph type="sldNum" sz="quarter" idx="11"/>
+            <p:ph type="title"/>
           </p:nvPr>
         </p:nvSpPr>
         <p:spPr/>
@@ -14937,10 +15049,149 @@
           <a:bodyPr/>
           <a:lstStyle/>
           <a:p>
-            <a:fld id="{6D22F896-40B5-4ADD-8801-0D06FADFA095}" type="slidenum">
-              <a:rPr lang="en-US" smtClean="0"/>
-              <a:t>14</a:t>
-            </a:fld>
+            <a:r>
+              <a:rPr lang="en-US" sz="2800" dirty="0"/>
+              <a:t>Conclusions and Caveats</a:t>
+            </a:r>
+          </a:p>
+        </p:txBody>
+      </p:sp>
+      <p:sp>
+        <p:nvSpPr>
+          <p:cNvPr id="8" name="Content Placeholder 7">
+            <a:extLst>
+              <a:ext uri="{FF2B5EF4-FFF2-40B4-BE49-F238E27FC236}">
+                <a16:creationId xmlns:a16="http://schemas.microsoft.com/office/drawing/2014/main" id="{01348890-9006-4308-9B95-2401AE998340}"/>
+              </a:ext>
+            </a:extLst>
+          </p:cNvPr>
+          <p:cNvSpPr>
+            <a:spLocks noGrp="1"/>
+          </p:cNvSpPr>
+          <p:nvPr>
+            <p:ph sz="quarter" idx="20"/>
+          </p:nvPr>
+        </p:nvSpPr>
+        <p:spPr/>
+        <p:txBody>
+          <a:bodyPr/>
+          <a:lstStyle/>
+          <a:p>
+            <a:r>
+              <a:rPr lang="en-US" sz="2000" dirty="0"/>
+              <a:t>Retrospective nature of the data means all claims were in. </a:t>
+            </a:r>
+          </a:p>
+          <a:p>
+            <a:pPr lvl="1"/>
+            <a:r>
+              <a:rPr lang="en-US" sz="2000" dirty="0"/>
+              <a:t>Real world low-latency data will be spottier.</a:t>
+            </a:r>
+          </a:p>
+          <a:p>
+            <a:pPr lvl="1"/>
+            <a:r>
+              <a:rPr lang="en-US" sz="2000" dirty="0"/>
+              <a:t>Predictions may not be as good.</a:t>
+            </a:r>
+          </a:p>
+          <a:p>
+            <a:r>
+              <a:rPr lang="en-US" sz="2000" dirty="0"/>
+              <a:t>Classifiers are generally Black Boxes.</a:t>
+            </a:r>
+          </a:p>
+          <a:p>
+            <a:r>
+              <a:rPr lang="en-US" sz="2000" dirty="0"/>
+              <a:t>Not </a:t>
+            </a:r>
+            <a:r>
+              <a:rPr lang="en-US" sz="2000" i="1" dirty="0"/>
+              <a:t>Research</a:t>
+            </a:r>
+            <a:r>
+              <a:rPr lang="en-US" sz="2000" dirty="0"/>
+              <a:t>, really.</a:t>
+            </a:r>
+          </a:p>
+          <a:p>
+            <a:pPr lvl="1"/>
+            <a:r>
+              <a:rPr lang="en-US" sz="2000" dirty="0"/>
+              <a:t>Not unlocking mysteries of the underlying mechanisms here.</a:t>
+            </a:r>
+          </a:p>
+        </p:txBody>
+      </p:sp>
+      <p:sp>
+        <p:nvSpPr>
+          <p:cNvPr id="11" name="Content Placeholder 10">
+            <a:extLst>
+              <a:ext uri="{FF2B5EF4-FFF2-40B4-BE49-F238E27FC236}">
+                <a16:creationId xmlns:a16="http://schemas.microsoft.com/office/drawing/2014/main" id="{A4E0BDCA-8EB1-4909-A06C-FA5E977DCFFE}"/>
+              </a:ext>
+            </a:extLst>
+          </p:cNvPr>
+          <p:cNvSpPr>
+            <a:spLocks noGrp="1"/>
+          </p:cNvSpPr>
+          <p:nvPr>
+            <p:ph sz="quarter" idx="21"/>
+          </p:nvPr>
+        </p:nvSpPr>
+        <p:spPr/>
+        <p:txBody>
+          <a:bodyPr/>
+          <a:lstStyle/>
+          <a:p>
+            <a:r>
+              <a:rPr lang="en-US" sz="2000" dirty="0"/>
+              <a:t>We were able to create a predictor just as good (for our purposes) as an expensive third party tool, using fewer months of input data.</a:t>
+            </a:r>
+          </a:p>
+          <a:p>
+            <a:pPr lvl="1"/>
+            <a:r>
+              <a:rPr lang="en-US" sz="2000" dirty="0"/>
+              <a:t>With very little expertise, medical or otherwise.</a:t>
+            </a:r>
+          </a:p>
+          <a:p>
+            <a:pPr lvl="1"/>
+            <a:r>
+              <a:rPr lang="en-US" sz="2000" dirty="0"/>
+              <a:t>$0 spent on software/hardware.</a:t>
+            </a:r>
+          </a:p>
+          <a:p>
+            <a:r>
+              <a:rPr lang="en-US" sz="2000" dirty="0"/>
+              <a:t>Python + </a:t>
+            </a:r>
+            <a:r>
+              <a:rPr lang="en-US" sz="2000" dirty="0" err="1"/>
+              <a:t>scikit</a:t>
+            </a:r>
+            <a:r>
+              <a:rPr lang="en-US" sz="2000" dirty="0"/>
+              <a:t>-learn very usable.</a:t>
+            </a:r>
+          </a:p>
+          <a:p>
+            <a:r>
+              <a:rPr lang="en-US" sz="2000" dirty="0"/>
+              <a:t>Ditto VDW Data.</a:t>
+            </a:r>
+          </a:p>
+          <a:p>
+            <a:r>
+              <a:rPr lang="en-US" sz="2000" dirty="0"/>
+              <a:t>No reason to operate with one hand (insurance/clinical data) tied behind our back.</a:t>
+            </a:r>
+          </a:p>
+          <a:p>
             <a:endParaRPr lang="en-US" dirty="0"/>
           </a:p>
         </p:txBody>
@@ -14948,7 +15199,7 @@
     </p:spTree>
     <p:extLst>
       <p:ext uri="{BB962C8B-B14F-4D97-AF65-F5344CB8AC3E}">
-        <p14:creationId xmlns:p14="http://schemas.microsoft.com/office/powerpoint/2010/main" val="2017354462"/>
+        <p14:creationId xmlns:p14="http://schemas.microsoft.com/office/powerpoint/2010/main" val="351981485"/>
       </p:ext>
     </p:extLst>
   </p:cSld>
@@ -14977,10 +15228,10 @@
       </p:grpSpPr>
       <p:sp>
         <p:nvSpPr>
-          <p:cNvPr id="29" name="Text Placeholder 28">
+          <p:cNvPr id="2" name="Title 1">
             <a:extLst>
               <a:ext uri="{FF2B5EF4-FFF2-40B4-BE49-F238E27FC236}">
-                <a16:creationId xmlns:a16="http://schemas.microsoft.com/office/drawing/2014/main" id="{C1F188DA-015E-4BB0-934B-F132DB871503}"/>
+                <a16:creationId xmlns:a16="http://schemas.microsoft.com/office/drawing/2014/main" id="{02D0C212-A423-49D2-99A2-0CFFB9139CF3}"/>
               </a:ext>
             </a:extLst>
           </p:cNvPr>
@@ -14988,7 +15239,7 @@
             <a:spLocks noGrp="1"/>
           </p:cNvSpPr>
           <p:nvPr>
-            <p:ph type="body" sz="quarter" idx="14"/>
+            <p:ph type="title"/>
           </p:nvPr>
         </p:nvSpPr>
         <p:spPr/>
@@ -14996,16 +15247,19 @@
           <a:bodyPr/>
           <a:lstStyle/>
           <a:p>
-            <a:endParaRPr lang="en-US"/>
-          </a:p>
-        </p:txBody>
-      </p:sp>
-      <p:sp>
-        <p:nvSpPr>
-          <p:cNvPr id="30" name="Text Placeholder 29">
+            <a:r>
+              <a:rPr lang="en-US" sz="3600" dirty="0"/>
+              <a:t>Future Directions</a:t>
+            </a:r>
+          </a:p>
+        </p:txBody>
+      </p:sp>
+      <p:sp>
+        <p:nvSpPr>
+          <p:cNvPr id="3" name="Content Placeholder 2">
             <a:extLst>
               <a:ext uri="{FF2B5EF4-FFF2-40B4-BE49-F238E27FC236}">
-                <a16:creationId xmlns:a16="http://schemas.microsoft.com/office/drawing/2014/main" id="{8878F790-4198-4AB4-A6B1-BFE114F72AA2}"/>
+                <a16:creationId xmlns:a16="http://schemas.microsoft.com/office/drawing/2014/main" id="{3E2DE287-CB92-4B45-90F1-E8D2F1F543B5}"/>
               </a:ext>
             </a:extLst>
           </p:cNvPr>
@@ -15013,144 +15267,88 @@
             <a:spLocks noGrp="1"/>
           </p:cNvSpPr>
           <p:nvPr>
-            <p:ph type="body" sz="quarter" idx="15"/>
+            <p:ph idx="1"/>
           </p:nvPr>
         </p:nvSpPr>
         <p:spPr/>
         <p:txBody>
-          <a:bodyPr/>
+          <a:bodyPr>
+            <a:normAutofit/>
+          </a:bodyPr>
           <a:lstStyle/>
           <a:p>
-            <a:endParaRPr lang="en-US"/>
-          </a:p>
-        </p:txBody>
-      </p:sp>
-      <p:sp>
-        <p:nvSpPr>
-          <p:cNvPr id="6" name="Title 5">
-            <a:extLst>
-              <a:ext uri="{FF2B5EF4-FFF2-40B4-BE49-F238E27FC236}">
-                <a16:creationId xmlns:a16="http://schemas.microsoft.com/office/drawing/2014/main" id="{196F7678-A0ED-4A84-8835-D38DE69228E8}"/>
-              </a:ext>
-            </a:extLst>
-          </p:cNvPr>
-          <p:cNvSpPr>
-            <a:spLocks noGrp="1"/>
-          </p:cNvSpPr>
-          <p:nvPr>
-            <p:ph type="title"/>
-          </p:nvPr>
-        </p:nvSpPr>
-        <p:spPr/>
-        <p:txBody>
-          <a:bodyPr/>
-          <a:lstStyle/>
-          <a:p>
-            <a:r>
-              <a:rPr lang="en-US" sz="3600" dirty="0"/>
-              <a:t>Context: Learning Health System</a:t>
-            </a:r>
-          </a:p>
-        </p:txBody>
-      </p:sp>
-      <p:sp>
-        <p:nvSpPr>
-          <p:cNvPr id="10" name="Content Placeholder 9">
-            <a:extLst>
-              <a:ext uri="{FF2B5EF4-FFF2-40B4-BE49-F238E27FC236}">
-                <a16:creationId xmlns:a16="http://schemas.microsoft.com/office/drawing/2014/main" id="{32977DC1-8D77-41B6-B23C-D5881E5D6FBB}"/>
-              </a:ext>
-            </a:extLst>
-          </p:cNvPr>
-          <p:cNvSpPr>
-            <a:spLocks noGrp="1"/>
-          </p:cNvSpPr>
-          <p:nvPr>
-            <p:ph sz="quarter" idx="19"/>
-          </p:nvPr>
-        </p:nvSpPr>
-        <p:spPr/>
-        <p:txBody>
-          <a:bodyPr/>
-          <a:lstStyle/>
-          <a:p>
-            <a:r>
-              <a:rPr lang="en-US" sz="2800" dirty="0"/>
-              <a:t>Partnership between Research and Care Delivery aimed at cutting out the middle layers of the Research </a:t>
-            </a:r>
-            <a:r>
-              <a:rPr lang="en-US" sz="2800" dirty="0">
-                <a:sym typeface="Wingdings" panose="05000000000000000000" pitchFamily="2" charset="2"/>
-              </a:rPr>
-              <a:t> Dissemination  Practice cycle.</a:t>
+            <a:r>
+              <a:rPr lang="en-US" sz="2400" dirty="0"/>
+              <a:t>Switch </a:t>
             </a:r>
           </a:p>
           <a:p>
             <a:pPr lvl="1"/>
             <a:r>
-              <a:rPr lang="en-US" sz="2800" dirty="0">
-                <a:sym typeface="Wingdings" panose="05000000000000000000" pitchFamily="2" charset="2"/>
-              </a:rPr>
-              <a:t>Not Research</a:t>
+              <a:rPr lang="en-US" sz="2400" dirty="0"/>
+              <a:t>from using binary feature flags to counts of feature occurrences.</a:t>
             </a:r>
           </a:p>
           <a:p>
             <a:pPr lvl="1"/>
             <a:r>
-              <a:rPr lang="en-US" sz="2800" dirty="0">
-                <a:sym typeface="Wingdings" panose="05000000000000000000" pitchFamily="2" charset="2"/>
-              </a:rPr>
-              <a:t>Aims at leveraging data to optimize care delivery</a:t>
-            </a:r>
-          </a:p>
-          <a:p>
-            <a:r>
-              <a:rPr lang="en-US" sz="2800" dirty="0"/>
-              <a:t>Care Management “ensures patients receive timely and appropriate care and supports utilization management activities.”</a:t>
-            </a:r>
-          </a:p>
-          <a:p>
-            <a:r>
-              <a:rPr lang="en-US" sz="2800" dirty="0"/>
-              <a:t>KPWA LHS Goal: reduce inpatient admissions by 2%</a:t>
-            </a:r>
-          </a:p>
-        </p:txBody>
-      </p:sp>
-      <p:sp>
-        <p:nvSpPr>
-          <p:cNvPr id="7" name="Slide Number Placeholder 6">
-            <a:extLst>
-              <a:ext uri="{FF2B5EF4-FFF2-40B4-BE49-F238E27FC236}">
-                <a16:creationId xmlns:a16="http://schemas.microsoft.com/office/drawing/2014/main" id="{D44A96A6-A317-455E-A84C-717EDE44CA65}"/>
-              </a:ext>
-            </a:extLst>
-          </p:cNvPr>
-          <p:cNvSpPr>
-            <a:spLocks noGrp="1"/>
-          </p:cNvSpPr>
-          <p:nvPr>
-            <p:ph type="sldNum" sz="quarter" idx="4"/>
-          </p:nvPr>
-        </p:nvSpPr>
-        <p:spPr/>
-        <p:txBody>
-          <a:bodyPr/>
-          <a:lstStyle/>
-          <a:p>
-            <a:fld id="{8C8B385D-DF67-E241-B0BF-76B80A8E743B}" type="slidenum">
-              <a:rPr lang="en-US" smtClean="0"/>
-              <a:pPr/>
-              <a:t>15</a:t>
-            </a:fld>
-            <a:endParaRPr lang="en-US" dirty="0"/>
+              <a:rPr lang="en-US" sz="2400" dirty="0"/>
+              <a:t>to ingredient-level </a:t>
+            </a:r>
+            <a:r>
+              <a:rPr lang="en-US" sz="2400" dirty="0" err="1"/>
+              <a:t>RxCUIs</a:t>
+            </a:r>
+            <a:r>
+              <a:rPr lang="en-US" sz="2400" dirty="0"/>
+              <a:t> (or supplement with?)</a:t>
+            </a:r>
+          </a:p>
+          <a:p>
+            <a:pPr lvl="1"/>
+            <a:r>
+              <a:rPr lang="en-US" sz="2400" dirty="0"/>
+              <a:t>to lower-latency sources for dx/</a:t>
+            </a:r>
+            <a:r>
+              <a:rPr lang="en-US" sz="2400" dirty="0" err="1"/>
+              <a:t>px</a:t>
+            </a:r>
+            <a:r>
+              <a:rPr lang="en-US" sz="2400" dirty="0"/>
+              <a:t> (other sources are already daily).</a:t>
+            </a:r>
+          </a:p>
+          <a:p>
+            <a:r>
+              <a:rPr lang="en-US" sz="2400" dirty="0"/>
+              <a:t>Try additional classifiers.</a:t>
+            </a:r>
+          </a:p>
+          <a:p>
+            <a:r>
+              <a:rPr lang="en-US" sz="2400" dirty="0"/>
+              <a:t>Tweak Parameters.</a:t>
+            </a:r>
+          </a:p>
+          <a:p>
+            <a:r>
+              <a:rPr lang="en-US" sz="2400" dirty="0"/>
+              <a:t>Expand population, either to additional diseases, or to the general population.</a:t>
+            </a:r>
+          </a:p>
+          <a:p>
+            <a:r>
+              <a:rPr lang="en-US" sz="2400" dirty="0"/>
+              <a:t>Create additional predictors for Care Managers’ ratings of success/impact.</a:t>
+            </a:r>
           </a:p>
         </p:txBody>
       </p:sp>
     </p:spTree>
     <p:extLst>
       <p:ext uri="{BB962C8B-B14F-4D97-AF65-F5344CB8AC3E}">
-        <p14:creationId xmlns:p14="http://schemas.microsoft.com/office/powerpoint/2010/main" val="1790581713"/>
+        <p14:creationId xmlns:p14="http://schemas.microsoft.com/office/powerpoint/2010/main" val="3441954348"/>
       </p:ext>
     </p:extLst>
   </p:cSld>
@@ -15179,6 +15377,348 @@
       </p:grpSpPr>
       <p:sp>
         <p:nvSpPr>
+          <p:cNvPr id="5" name="Title 4">
+            <a:extLst>
+              <a:ext uri="{FF2B5EF4-FFF2-40B4-BE49-F238E27FC236}">
+                <a16:creationId xmlns:a16="http://schemas.microsoft.com/office/drawing/2014/main" id="{07744E30-D06D-4A8C-8C1D-44F154E9BF0E}"/>
+              </a:ext>
+            </a:extLst>
+          </p:cNvPr>
+          <p:cNvSpPr>
+            <a:spLocks noGrp="1"/>
+          </p:cNvSpPr>
+          <p:nvPr>
+            <p:ph type="title"/>
+          </p:nvPr>
+        </p:nvSpPr>
+        <p:spPr>
+          <a:xfrm>
+            <a:off x="838091" y="1306360"/>
+            <a:ext cx="10515818" cy="1690776"/>
+          </a:xfrm>
+        </p:spPr>
+        <p:txBody>
+          <a:bodyPr/>
+          <a:lstStyle/>
+          <a:p>
+            <a:r>
+              <a:rPr lang="en-US" sz="6000" dirty="0"/>
+              <a:t>Thank You!</a:t>
+            </a:r>
+          </a:p>
+        </p:txBody>
+      </p:sp>
+      <p:sp>
+        <p:nvSpPr>
+          <p:cNvPr id="6" name="Text Placeholder 5">
+            <a:extLst>
+              <a:ext uri="{FF2B5EF4-FFF2-40B4-BE49-F238E27FC236}">
+                <a16:creationId xmlns:a16="http://schemas.microsoft.com/office/drawing/2014/main" id="{7FF91EDB-7BD0-453F-80BD-82DF4B04EFF6}"/>
+              </a:ext>
+            </a:extLst>
+          </p:cNvPr>
+          <p:cNvSpPr>
+            <a:spLocks noGrp="1"/>
+          </p:cNvSpPr>
+          <p:nvPr>
+            <p:ph type="body" sz="quarter" idx="10"/>
+          </p:nvPr>
+        </p:nvSpPr>
+        <p:spPr>
+          <a:xfrm>
+            <a:off x="838091" y="4684144"/>
+            <a:ext cx="10515818" cy="1155940"/>
+          </a:xfrm>
+        </p:spPr>
+        <p:txBody>
+          <a:bodyPr/>
+          <a:lstStyle/>
+          <a:p>
+            <a:r>
+              <a:rPr lang="en-US" sz="4000" dirty="0"/>
+              <a:t>https://github.com/rpardee/hcsrn_2019</a:t>
+            </a:r>
+          </a:p>
+          <a:p>
+            <a:endParaRPr lang="en-US" sz="2000" dirty="0"/>
+          </a:p>
+          <a:p>
+            <a:r>
+              <a:rPr lang="en-US" sz="2000" dirty="0"/>
+              <a:t>roy.e.pardee@kp.org</a:t>
+            </a:r>
+          </a:p>
+          <a:p>
+            <a:r>
+              <a:rPr lang="en-US" sz="2000" dirty="0"/>
+              <a:t>david.j.cronkite@kp.org</a:t>
+            </a:r>
+          </a:p>
+        </p:txBody>
+      </p:sp>
+      <p:sp>
+        <p:nvSpPr>
+          <p:cNvPr id="4" name="Slide Number Placeholder 3">
+            <a:extLst>
+              <a:ext uri="{FF2B5EF4-FFF2-40B4-BE49-F238E27FC236}">
+                <a16:creationId xmlns:a16="http://schemas.microsoft.com/office/drawing/2014/main" id="{117AD612-B4E1-4199-AFDB-1A1E7566813D}"/>
+              </a:ext>
+            </a:extLst>
+          </p:cNvPr>
+          <p:cNvSpPr>
+            <a:spLocks noGrp="1"/>
+          </p:cNvSpPr>
+          <p:nvPr>
+            <p:ph type="sldNum" sz="quarter" idx="11"/>
+          </p:nvPr>
+        </p:nvSpPr>
+        <p:spPr/>
+        <p:txBody>
+          <a:bodyPr/>
+          <a:lstStyle/>
+          <a:p>
+            <a:fld id="{6D22F896-40B5-4ADD-8801-0D06FADFA095}" type="slidenum">
+              <a:rPr lang="en-US" smtClean="0"/>
+              <a:t>16</a:t>
+            </a:fld>
+            <a:endParaRPr lang="en-US" dirty="0"/>
+          </a:p>
+        </p:txBody>
+      </p:sp>
+    </p:spTree>
+    <p:extLst>
+      <p:ext uri="{BB962C8B-B14F-4D97-AF65-F5344CB8AC3E}">
+        <p14:creationId xmlns:p14="http://schemas.microsoft.com/office/powerpoint/2010/main" val="2017354462"/>
+      </p:ext>
+    </p:extLst>
+  </p:cSld>
+  <p:clrMapOvr>
+    <a:masterClrMapping/>
+  </p:clrMapOvr>
+</p:sld>
+</file>
+
+<file path=ppt/slides/slide17.xml><?xml version="1.0" encoding="utf-8"?>
+<p:sld xmlns:a="http://schemas.openxmlformats.org/drawingml/2006/main" xmlns:r="http://schemas.openxmlformats.org/officeDocument/2006/relationships" xmlns:p="http://schemas.openxmlformats.org/presentationml/2006/main">
+  <p:cSld>
+    <p:spTree>
+      <p:nvGrpSpPr>
+        <p:cNvPr id="1" name=""/>
+        <p:cNvGrpSpPr/>
+        <p:nvPr/>
+      </p:nvGrpSpPr>
+      <p:grpSpPr>
+        <a:xfrm>
+          <a:off x="0" y="0"/>
+          <a:ext cx="0" cy="0"/>
+          <a:chOff x="0" y="0"/>
+          <a:chExt cx="0" cy="0"/>
+        </a:xfrm>
+      </p:grpSpPr>
+      <p:sp>
+        <p:nvSpPr>
+          <p:cNvPr id="29" name="Text Placeholder 28">
+            <a:extLst>
+              <a:ext uri="{FF2B5EF4-FFF2-40B4-BE49-F238E27FC236}">
+                <a16:creationId xmlns:a16="http://schemas.microsoft.com/office/drawing/2014/main" id="{C1F188DA-015E-4BB0-934B-F132DB871503}"/>
+              </a:ext>
+            </a:extLst>
+          </p:cNvPr>
+          <p:cNvSpPr>
+            <a:spLocks noGrp="1"/>
+          </p:cNvSpPr>
+          <p:nvPr>
+            <p:ph type="body" sz="quarter" idx="14"/>
+          </p:nvPr>
+        </p:nvSpPr>
+        <p:spPr/>
+        <p:txBody>
+          <a:bodyPr/>
+          <a:lstStyle/>
+          <a:p>
+            <a:endParaRPr lang="en-US"/>
+          </a:p>
+        </p:txBody>
+      </p:sp>
+      <p:sp>
+        <p:nvSpPr>
+          <p:cNvPr id="30" name="Text Placeholder 29">
+            <a:extLst>
+              <a:ext uri="{FF2B5EF4-FFF2-40B4-BE49-F238E27FC236}">
+                <a16:creationId xmlns:a16="http://schemas.microsoft.com/office/drawing/2014/main" id="{8878F790-4198-4AB4-A6B1-BFE114F72AA2}"/>
+              </a:ext>
+            </a:extLst>
+          </p:cNvPr>
+          <p:cNvSpPr>
+            <a:spLocks noGrp="1"/>
+          </p:cNvSpPr>
+          <p:nvPr>
+            <p:ph type="body" sz="quarter" idx="15"/>
+          </p:nvPr>
+        </p:nvSpPr>
+        <p:spPr/>
+        <p:txBody>
+          <a:bodyPr/>
+          <a:lstStyle/>
+          <a:p>
+            <a:endParaRPr lang="en-US"/>
+          </a:p>
+        </p:txBody>
+      </p:sp>
+      <p:sp>
+        <p:nvSpPr>
+          <p:cNvPr id="6" name="Title 5">
+            <a:extLst>
+              <a:ext uri="{FF2B5EF4-FFF2-40B4-BE49-F238E27FC236}">
+                <a16:creationId xmlns:a16="http://schemas.microsoft.com/office/drawing/2014/main" id="{196F7678-A0ED-4A84-8835-D38DE69228E8}"/>
+              </a:ext>
+            </a:extLst>
+          </p:cNvPr>
+          <p:cNvSpPr>
+            <a:spLocks noGrp="1"/>
+          </p:cNvSpPr>
+          <p:nvPr>
+            <p:ph type="title"/>
+          </p:nvPr>
+        </p:nvSpPr>
+        <p:spPr/>
+        <p:txBody>
+          <a:bodyPr/>
+          <a:lstStyle/>
+          <a:p>
+            <a:r>
+              <a:rPr lang="en-US" sz="3600" dirty="0"/>
+              <a:t>Context: Learning Health System</a:t>
+            </a:r>
+          </a:p>
+        </p:txBody>
+      </p:sp>
+      <p:sp>
+        <p:nvSpPr>
+          <p:cNvPr id="10" name="Content Placeholder 9">
+            <a:extLst>
+              <a:ext uri="{FF2B5EF4-FFF2-40B4-BE49-F238E27FC236}">
+                <a16:creationId xmlns:a16="http://schemas.microsoft.com/office/drawing/2014/main" id="{32977DC1-8D77-41B6-B23C-D5881E5D6FBB}"/>
+              </a:ext>
+            </a:extLst>
+          </p:cNvPr>
+          <p:cNvSpPr>
+            <a:spLocks noGrp="1"/>
+          </p:cNvSpPr>
+          <p:nvPr>
+            <p:ph sz="quarter" idx="19"/>
+          </p:nvPr>
+        </p:nvSpPr>
+        <p:spPr/>
+        <p:txBody>
+          <a:bodyPr/>
+          <a:lstStyle/>
+          <a:p>
+            <a:r>
+              <a:rPr lang="en-US" sz="2800" dirty="0"/>
+              <a:t>Partnership between Research and Care Delivery aimed at cutting out the middle layers of the Research </a:t>
+            </a:r>
+            <a:r>
+              <a:rPr lang="en-US" sz="2800" dirty="0">
+                <a:sym typeface="Wingdings" panose="05000000000000000000" pitchFamily="2" charset="2"/>
+              </a:rPr>
+              <a:t> Dissemination  Practice cycle.</a:t>
+            </a:r>
+          </a:p>
+          <a:p>
+            <a:pPr lvl="1"/>
+            <a:r>
+              <a:rPr lang="en-US" sz="2800" dirty="0">
+                <a:sym typeface="Wingdings" panose="05000000000000000000" pitchFamily="2" charset="2"/>
+              </a:rPr>
+              <a:t>Not Research</a:t>
+            </a:r>
+          </a:p>
+          <a:p>
+            <a:pPr lvl="1"/>
+            <a:r>
+              <a:rPr lang="en-US" sz="2800" dirty="0">
+                <a:sym typeface="Wingdings" panose="05000000000000000000" pitchFamily="2" charset="2"/>
+              </a:rPr>
+              <a:t>Aims at leveraging data to optimize care delivery</a:t>
+            </a:r>
+          </a:p>
+          <a:p>
+            <a:r>
+              <a:rPr lang="en-US" sz="2800" dirty="0"/>
+              <a:t>Care Management “ensures patients receive timely and appropriate care and supports utilization management activities.”</a:t>
+            </a:r>
+          </a:p>
+          <a:p>
+            <a:r>
+              <a:rPr lang="en-US" sz="2800" dirty="0"/>
+              <a:t>KPWA LHS Goal: reduce inpatient admissions by 2%</a:t>
+            </a:r>
+          </a:p>
+        </p:txBody>
+      </p:sp>
+      <p:sp>
+        <p:nvSpPr>
+          <p:cNvPr id="7" name="Slide Number Placeholder 6">
+            <a:extLst>
+              <a:ext uri="{FF2B5EF4-FFF2-40B4-BE49-F238E27FC236}">
+                <a16:creationId xmlns:a16="http://schemas.microsoft.com/office/drawing/2014/main" id="{D44A96A6-A317-455E-A84C-717EDE44CA65}"/>
+              </a:ext>
+            </a:extLst>
+          </p:cNvPr>
+          <p:cNvSpPr>
+            <a:spLocks noGrp="1"/>
+          </p:cNvSpPr>
+          <p:nvPr>
+            <p:ph type="sldNum" sz="quarter" idx="4"/>
+          </p:nvPr>
+        </p:nvSpPr>
+        <p:spPr/>
+        <p:txBody>
+          <a:bodyPr/>
+          <a:lstStyle/>
+          <a:p>
+            <a:fld id="{8C8B385D-DF67-E241-B0BF-76B80A8E743B}" type="slidenum">
+              <a:rPr lang="en-US" smtClean="0"/>
+              <a:pPr/>
+              <a:t>17</a:t>
+            </a:fld>
+            <a:endParaRPr lang="en-US" dirty="0"/>
+          </a:p>
+        </p:txBody>
+      </p:sp>
+    </p:spTree>
+    <p:extLst>
+      <p:ext uri="{BB962C8B-B14F-4D97-AF65-F5344CB8AC3E}">
+        <p14:creationId xmlns:p14="http://schemas.microsoft.com/office/powerpoint/2010/main" val="1790581713"/>
+      </p:ext>
+    </p:extLst>
+  </p:cSld>
+  <p:clrMapOvr>
+    <a:masterClrMapping/>
+  </p:clrMapOvr>
+</p:sld>
+</file>
+
+<file path=ppt/slides/slide18.xml><?xml version="1.0" encoding="utf-8"?>
+<p:sld xmlns:a="http://schemas.openxmlformats.org/drawingml/2006/main" xmlns:r="http://schemas.openxmlformats.org/officeDocument/2006/relationships" xmlns:p="http://schemas.openxmlformats.org/presentationml/2006/main">
+  <p:cSld>
+    <p:spTree>
+      <p:nvGrpSpPr>
+        <p:cNvPr id="1" name=""/>
+        <p:cNvGrpSpPr/>
+        <p:nvPr/>
+      </p:nvGrpSpPr>
+      <p:grpSpPr>
+        <a:xfrm>
+          <a:off x="0" y="0"/>
+          <a:ext cx="0" cy="0"/>
+          <a:chOff x="0" y="0"/>
+          <a:chExt cx="0" cy="0"/>
+        </a:xfrm>
+      </p:grpSpPr>
+      <p:sp>
+        <p:nvSpPr>
           <p:cNvPr id="2" name="Text Placeholder 1">
             <a:extLst>
               <a:ext uri="{FF2B5EF4-FFF2-40B4-BE49-F238E27FC236}">
@@ -15279,7 +15819,7 @@
             <a:fld id="{8C8B385D-DF67-E241-B0BF-76B80A8E743B}" type="slidenum">
               <a:rPr lang="en-US" smtClean="0"/>
               <a:pPr/>
-              <a:t>16</a:t>
+              <a:t>18</a:t>
             </a:fld>
             <a:endParaRPr lang="en-US" dirty="0"/>
           </a:p>
@@ -16713,7 +17253,7 @@
 </p:sld>
 </file>
 
-<file path=ppt/slides/slide17.xml><?xml version="1.0" encoding="utf-8"?>
+<file path=ppt/slides/slide19.xml><?xml version="1.0" encoding="utf-8"?>
 <p:sld xmlns:a="http://schemas.openxmlformats.org/drawingml/2006/main" xmlns:r="http://schemas.openxmlformats.org/officeDocument/2006/relationships" xmlns:p="http://schemas.openxmlformats.org/presentationml/2006/main">
   <p:cSld>
     <p:spTree>
@@ -16774,7 +17314,243 @@
 </p:sld>
 </file>
 
-<file path=ppt/slides/slide18.xml><?xml version="1.0" encoding="utf-8"?>
+<file path=ppt/slides/slide2.xml><?xml version="1.0" encoding="utf-8"?>
+<p:sld xmlns:a="http://schemas.openxmlformats.org/drawingml/2006/main" xmlns:r="http://schemas.openxmlformats.org/officeDocument/2006/relationships" xmlns:p="http://schemas.openxmlformats.org/presentationml/2006/main">
+  <p:cSld>
+    <p:spTree>
+      <p:nvGrpSpPr>
+        <p:cNvPr id="1" name=""/>
+        <p:cNvGrpSpPr/>
+        <p:nvPr/>
+      </p:nvGrpSpPr>
+      <p:grpSpPr>
+        <a:xfrm>
+          <a:off x="0" y="0"/>
+          <a:ext cx="0" cy="0"/>
+          <a:chOff x="0" y="0"/>
+          <a:chExt cx="0" cy="0"/>
+        </a:xfrm>
+      </p:grpSpPr>
+      <p:sp>
+        <p:nvSpPr>
+          <p:cNvPr id="9" name="Text Placeholder 8">
+            <a:extLst>
+              <a:ext uri="{FF2B5EF4-FFF2-40B4-BE49-F238E27FC236}">
+                <a16:creationId xmlns:a16="http://schemas.microsoft.com/office/drawing/2014/main" id="{5D97BFE3-4063-41B5-9DAF-E4B753911ECE}"/>
+              </a:ext>
+            </a:extLst>
+          </p:cNvPr>
+          <p:cNvSpPr>
+            <a:spLocks noGrp="1"/>
+          </p:cNvSpPr>
+          <p:nvPr>
+            <p:ph type="body" sz="quarter" idx="14"/>
+          </p:nvPr>
+        </p:nvSpPr>
+        <p:spPr/>
+        <p:txBody>
+          <a:bodyPr/>
+          <a:lstStyle/>
+          <a:p>
+            <a:endParaRPr lang="en-US"/>
+          </a:p>
+        </p:txBody>
+      </p:sp>
+      <p:sp>
+        <p:nvSpPr>
+          <p:cNvPr id="10" name="Text Placeholder 9">
+            <a:extLst>
+              <a:ext uri="{FF2B5EF4-FFF2-40B4-BE49-F238E27FC236}">
+                <a16:creationId xmlns:a16="http://schemas.microsoft.com/office/drawing/2014/main" id="{C5992D4D-5CC1-4780-A101-233F7F01E29F}"/>
+              </a:ext>
+            </a:extLst>
+          </p:cNvPr>
+          <p:cNvSpPr>
+            <a:spLocks noGrp="1"/>
+          </p:cNvSpPr>
+          <p:nvPr>
+            <p:ph type="body" sz="quarter" idx="15"/>
+          </p:nvPr>
+        </p:nvSpPr>
+        <p:spPr/>
+        <p:txBody>
+          <a:bodyPr/>
+          <a:lstStyle/>
+          <a:p>
+            <a:endParaRPr lang="en-US"/>
+          </a:p>
+        </p:txBody>
+      </p:sp>
+      <p:sp>
+        <p:nvSpPr>
+          <p:cNvPr id="8" name="Title 7">
+            <a:extLst>
+              <a:ext uri="{FF2B5EF4-FFF2-40B4-BE49-F238E27FC236}">
+                <a16:creationId xmlns:a16="http://schemas.microsoft.com/office/drawing/2014/main" id="{CC827348-02FF-4AE8-86DB-C53DC66E4E5C}"/>
+              </a:ext>
+            </a:extLst>
+          </p:cNvPr>
+          <p:cNvSpPr>
+            <a:spLocks noGrp="1"/>
+          </p:cNvSpPr>
+          <p:nvPr>
+            <p:ph type="title"/>
+          </p:nvPr>
+        </p:nvSpPr>
+        <p:spPr/>
+        <p:txBody>
+          <a:bodyPr/>
+          <a:lstStyle/>
+          <a:p>
+            <a:r>
+              <a:rPr lang="en-US" sz="4400"/>
+              <a:t>“Data is the new oil”</a:t>
+            </a:r>
+            <a:endParaRPr lang="en-US" sz="4400" dirty="0"/>
+          </a:p>
+        </p:txBody>
+      </p:sp>
+      <p:sp>
+        <p:nvSpPr>
+          <p:cNvPr id="11" name="Content Placeholder 10">
+            <a:extLst>
+              <a:ext uri="{FF2B5EF4-FFF2-40B4-BE49-F238E27FC236}">
+                <a16:creationId xmlns:a16="http://schemas.microsoft.com/office/drawing/2014/main" id="{174B9344-6F60-4EAC-9405-A1410AC4C75A}"/>
+              </a:ext>
+            </a:extLst>
+          </p:cNvPr>
+          <p:cNvSpPr>
+            <a:spLocks noGrp="1"/>
+          </p:cNvSpPr>
+          <p:nvPr>
+            <p:ph sz="quarter" idx="19"/>
+          </p:nvPr>
+        </p:nvSpPr>
+        <p:spPr/>
+        <p:txBody>
+          <a:bodyPr/>
+          <a:lstStyle/>
+          <a:p>
+            <a:r>
+              <a:rPr lang="en-US" sz="2000" dirty="0"/>
+              <a:t>Hype is inescapable.</a:t>
+            </a:r>
+          </a:p>
+          <a:p>
+            <a:r>
+              <a:rPr lang="en-US" sz="2000" dirty="0"/>
+              <a:t>No shortage of vendors willing to help you spend money turning your data into “insights”.</a:t>
+            </a:r>
+          </a:p>
+          <a:p>
+            <a:r>
+              <a:rPr lang="en-US" sz="2000" dirty="0"/>
+              <a:t>But the market seems to be bifurcated:</a:t>
+            </a:r>
+          </a:p>
+          <a:p>
+            <a:pPr lvl="1"/>
+            <a:r>
+              <a:rPr lang="en-US" sz="2000" b="1" dirty="0"/>
+              <a:t>Insurers</a:t>
+            </a:r>
+            <a:r>
+              <a:rPr lang="en-US" sz="2000" dirty="0"/>
+              <a:t> have claims, which should be comprehensive but imprecise with respect to patient health status.</a:t>
+            </a:r>
+          </a:p>
+          <a:p>
+            <a:pPr lvl="1"/>
+            <a:r>
+              <a:rPr lang="en-US" sz="2000" b="1" dirty="0"/>
+              <a:t>Providers</a:t>
+            </a:r>
+            <a:r>
+              <a:rPr lang="en-US" sz="2000" dirty="0"/>
+              <a:t> have clinical observations, which are detailed but often not comprehensive.</a:t>
+            </a:r>
+          </a:p>
+          <a:p>
+            <a:r>
+              <a:rPr lang="en-US" sz="2000" dirty="0"/>
+              <a:t>As hybrid orgs, HMOs usually have a combination of these types of data.</a:t>
+            </a:r>
+          </a:p>
+          <a:p>
+            <a:pPr lvl="1"/>
+            <a:r>
+              <a:rPr lang="en-US" sz="2000" dirty="0"/>
+              <a:t>So we can use </a:t>
+            </a:r>
+            <a:r>
+              <a:rPr lang="en-US" sz="2000" i="1" dirty="0"/>
+              <a:t>either.</a:t>
+            </a:r>
+          </a:p>
+          <a:p>
+            <a:pPr lvl="1"/>
+            <a:r>
+              <a:rPr lang="en-US" sz="2000" dirty="0"/>
+              <a:t>We should use </a:t>
+            </a:r>
+            <a:r>
+              <a:rPr lang="en-US" sz="2000" b="1" dirty="0"/>
+              <a:t>both.</a:t>
+            </a:r>
+          </a:p>
+          <a:p>
+            <a:pPr lvl="1"/>
+            <a:r>
+              <a:rPr lang="en-US" sz="2000" dirty="0"/>
+              <a:t>DIY approach allows this.</a:t>
+            </a:r>
+          </a:p>
+        </p:txBody>
+      </p:sp>
+      <p:sp>
+        <p:nvSpPr>
+          <p:cNvPr id="6" name="Slide Number Placeholder 5">
+            <a:extLst>
+              <a:ext uri="{FF2B5EF4-FFF2-40B4-BE49-F238E27FC236}">
+                <a16:creationId xmlns:a16="http://schemas.microsoft.com/office/drawing/2014/main" id="{44AA0D5C-04B5-4F97-99E4-ADCEC71A2CB6}"/>
+              </a:ext>
+            </a:extLst>
+          </p:cNvPr>
+          <p:cNvSpPr>
+            <a:spLocks noGrp="1"/>
+          </p:cNvSpPr>
+          <p:nvPr>
+            <p:ph type="sldNum" sz="quarter" idx="4"/>
+          </p:nvPr>
+        </p:nvSpPr>
+        <p:spPr/>
+        <p:txBody>
+          <a:bodyPr/>
+          <a:lstStyle/>
+          <a:p>
+            <a:fld id="{8C8B385D-DF67-E241-B0BF-76B80A8E743B}" type="slidenum">
+              <a:rPr lang="en-US" smtClean="0"/>
+              <a:pPr/>
+              <a:t>2</a:t>
+            </a:fld>
+            <a:endParaRPr lang="en-US" dirty="0"/>
+          </a:p>
+        </p:txBody>
+      </p:sp>
+    </p:spTree>
+    <p:extLst>
+      <p:ext uri="{BB962C8B-B14F-4D97-AF65-F5344CB8AC3E}">
+        <p14:creationId xmlns:p14="http://schemas.microsoft.com/office/powerpoint/2010/main" val="321420137"/>
+      </p:ext>
+    </p:extLst>
+  </p:cSld>
+  <p:clrMapOvr>
+    <a:masterClrMapping/>
+  </p:clrMapOvr>
+</p:sld>
+</file>
+
+<file path=ppt/slides/slide20.xml><?xml version="1.0" encoding="utf-8"?>
 <p:sld xmlns:a="http://schemas.openxmlformats.org/drawingml/2006/main" xmlns:r="http://schemas.openxmlformats.org/officeDocument/2006/relationships" xmlns:p="http://schemas.openxmlformats.org/presentationml/2006/main">
   <p:cSld>
     <p:spTree>
@@ -16972,242 +17748,6 @@
 </p:sld>
 </file>
 
-<file path=ppt/slides/slide2.xml><?xml version="1.0" encoding="utf-8"?>
-<p:sld xmlns:a="http://schemas.openxmlformats.org/drawingml/2006/main" xmlns:r="http://schemas.openxmlformats.org/officeDocument/2006/relationships" xmlns:p="http://schemas.openxmlformats.org/presentationml/2006/main">
-  <p:cSld>
-    <p:spTree>
-      <p:nvGrpSpPr>
-        <p:cNvPr id="1" name=""/>
-        <p:cNvGrpSpPr/>
-        <p:nvPr/>
-      </p:nvGrpSpPr>
-      <p:grpSpPr>
-        <a:xfrm>
-          <a:off x="0" y="0"/>
-          <a:ext cx="0" cy="0"/>
-          <a:chOff x="0" y="0"/>
-          <a:chExt cx="0" cy="0"/>
-        </a:xfrm>
-      </p:grpSpPr>
-      <p:sp>
-        <p:nvSpPr>
-          <p:cNvPr id="9" name="Text Placeholder 8">
-            <a:extLst>
-              <a:ext uri="{FF2B5EF4-FFF2-40B4-BE49-F238E27FC236}">
-                <a16:creationId xmlns:a16="http://schemas.microsoft.com/office/drawing/2014/main" id="{5D97BFE3-4063-41B5-9DAF-E4B753911ECE}"/>
-              </a:ext>
-            </a:extLst>
-          </p:cNvPr>
-          <p:cNvSpPr>
-            <a:spLocks noGrp="1"/>
-          </p:cNvSpPr>
-          <p:nvPr>
-            <p:ph type="body" sz="quarter" idx="14"/>
-          </p:nvPr>
-        </p:nvSpPr>
-        <p:spPr/>
-        <p:txBody>
-          <a:bodyPr/>
-          <a:lstStyle/>
-          <a:p>
-            <a:endParaRPr lang="en-US"/>
-          </a:p>
-        </p:txBody>
-      </p:sp>
-      <p:sp>
-        <p:nvSpPr>
-          <p:cNvPr id="10" name="Text Placeholder 9">
-            <a:extLst>
-              <a:ext uri="{FF2B5EF4-FFF2-40B4-BE49-F238E27FC236}">
-                <a16:creationId xmlns:a16="http://schemas.microsoft.com/office/drawing/2014/main" id="{C5992D4D-5CC1-4780-A101-233F7F01E29F}"/>
-              </a:ext>
-            </a:extLst>
-          </p:cNvPr>
-          <p:cNvSpPr>
-            <a:spLocks noGrp="1"/>
-          </p:cNvSpPr>
-          <p:nvPr>
-            <p:ph type="body" sz="quarter" idx="15"/>
-          </p:nvPr>
-        </p:nvSpPr>
-        <p:spPr/>
-        <p:txBody>
-          <a:bodyPr/>
-          <a:lstStyle/>
-          <a:p>
-            <a:endParaRPr lang="en-US"/>
-          </a:p>
-        </p:txBody>
-      </p:sp>
-      <p:sp>
-        <p:nvSpPr>
-          <p:cNvPr id="8" name="Title 7">
-            <a:extLst>
-              <a:ext uri="{FF2B5EF4-FFF2-40B4-BE49-F238E27FC236}">
-                <a16:creationId xmlns:a16="http://schemas.microsoft.com/office/drawing/2014/main" id="{CC827348-02FF-4AE8-86DB-C53DC66E4E5C}"/>
-              </a:ext>
-            </a:extLst>
-          </p:cNvPr>
-          <p:cNvSpPr>
-            <a:spLocks noGrp="1"/>
-          </p:cNvSpPr>
-          <p:nvPr>
-            <p:ph type="title"/>
-          </p:nvPr>
-        </p:nvSpPr>
-        <p:spPr/>
-        <p:txBody>
-          <a:bodyPr/>
-          <a:lstStyle/>
-          <a:p>
-            <a:r>
-              <a:rPr lang="en-US" sz="4400"/>
-              <a:t>“Data is the new oil”</a:t>
-            </a:r>
-            <a:endParaRPr lang="en-US" sz="4400" dirty="0"/>
-          </a:p>
-        </p:txBody>
-      </p:sp>
-      <p:sp>
-        <p:nvSpPr>
-          <p:cNvPr id="11" name="Content Placeholder 10">
-            <a:extLst>
-              <a:ext uri="{FF2B5EF4-FFF2-40B4-BE49-F238E27FC236}">
-                <a16:creationId xmlns:a16="http://schemas.microsoft.com/office/drawing/2014/main" id="{174B9344-6F60-4EAC-9405-A1410AC4C75A}"/>
-              </a:ext>
-            </a:extLst>
-          </p:cNvPr>
-          <p:cNvSpPr>
-            <a:spLocks noGrp="1"/>
-          </p:cNvSpPr>
-          <p:nvPr>
-            <p:ph sz="quarter" idx="19"/>
-          </p:nvPr>
-        </p:nvSpPr>
-        <p:spPr/>
-        <p:txBody>
-          <a:bodyPr/>
-          <a:lstStyle/>
-          <a:p>
-            <a:r>
-              <a:rPr lang="en-US" sz="2000" dirty="0"/>
-              <a:t>Hype is inescapable.</a:t>
-            </a:r>
-          </a:p>
-          <a:p>
-            <a:r>
-              <a:rPr lang="en-US" sz="2000" dirty="0"/>
-              <a:t>No shortage of vendors willing to help you spend money turning your data into “insights”.</a:t>
-            </a:r>
-          </a:p>
-          <a:p>
-            <a:r>
-              <a:rPr lang="en-US" sz="2000" dirty="0"/>
-              <a:t>But the market seems to be bifurcated:</a:t>
-            </a:r>
-          </a:p>
-          <a:p>
-            <a:pPr lvl="1"/>
-            <a:r>
-              <a:rPr lang="en-US" sz="2000" b="1" dirty="0"/>
-              <a:t>Insurers</a:t>
-            </a:r>
-            <a:r>
-              <a:rPr lang="en-US" sz="2000" dirty="0"/>
-              <a:t> have claims, which should be comprehensive but imprecise with respect to patient health status.</a:t>
-            </a:r>
-          </a:p>
-          <a:p>
-            <a:pPr lvl="1"/>
-            <a:r>
-              <a:rPr lang="en-US" sz="2000" b="1" dirty="0"/>
-              <a:t>Providers</a:t>
-            </a:r>
-            <a:r>
-              <a:rPr lang="en-US" sz="2000" dirty="0"/>
-              <a:t> have clinical observations, which are detailed but often not comprehensive.</a:t>
-            </a:r>
-          </a:p>
-          <a:p>
-            <a:r>
-              <a:rPr lang="en-US" sz="2000" dirty="0"/>
-              <a:t>As hybrid orgs, HMOs usually have a combination of these types of data.</a:t>
-            </a:r>
-          </a:p>
-          <a:p>
-            <a:pPr lvl="1"/>
-            <a:r>
-              <a:rPr lang="en-US" sz="2000" dirty="0"/>
-              <a:t>So we can use </a:t>
-            </a:r>
-            <a:r>
-              <a:rPr lang="en-US" sz="2000" i="1" dirty="0"/>
-              <a:t>either</a:t>
-            </a:r>
-          </a:p>
-          <a:p>
-            <a:pPr lvl="1"/>
-            <a:r>
-              <a:rPr lang="en-US" sz="2000" dirty="0"/>
-              <a:t>We should use </a:t>
-            </a:r>
-            <a:r>
-              <a:rPr lang="en-US" sz="2000" b="1" dirty="0"/>
-              <a:t>both</a:t>
-            </a:r>
-          </a:p>
-          <a:p>
-            <a:pPr lvl="1"/>
-            <a:r>
-              <a:rPr lang="en-US" sz="2000" dirty="0"/>
-              <a:t>DIY approach allows this</a:t>
-            </a:r>
-          </a:p>
-        </p:txBody>
-      </p:sp>
-      <p:sp>
-        <p:nvSpPr>
-          <p:cNvPr id="6" name="Slide Number Placeholder 5">
-            <a:extLst>
-              <a:ext uri="{FF2B5EF4-FFF2-40B4-BE49-F238E27FC236}">
-                <a16:creationId xmlns:a16="http://schemas.microsoft.com/office/drawing/2014/main" id="{44AA0D5C-04B5-4F97-99E4-ADCEC71A2CB6}"/>
-              </a:ext>
-            </a:extLst>
-          </p:cNvPr>
-          <p:cNvSpPr>
-            <a:spLocks noGrp="1"/>
-          </p:cNvSpPr>
-          <p:nvPr>
-            <p:ph type="sldNum" sz="quarter" idx="4"/>
-          </p:nvPr>
-        </p:nvSpPr>
-        <p:spPr/>
-        <p:txBody>
-          <a:bodyPr/>
-          <a:lstStyle/>
-          <a:p>
-            <a:fld id="{8C8B385D-DF67-E241-B0BF-76B80A8E743B}" type="slidenum">
-              <a:rPr lang="en-US" smtClean="0"/>
-              <a:pPr/>
-              <a:t>2</a:t>
-            </a:fld>
-            <a:endParaRPr lang="en-US" dirty="0"/>
-          </a:p>
-        </p:txBody>
-      </p:sp>
-    </p:spTree>
-    <p:extLst>
-      <p:ext uri="{BB962C8B-B14F-4D97-AF65-F5344CB8AC3E}">
-        <p14:creationId xmlns:p14="http://schemas.microsoft.com/office/powerpoint/2010/main" val="321420137"/>
-      </p:ext>
-    </p:extLst>
-  </p:cSld>
-  <p:clrMapOvr>
-    <a:masterClrMapping/>
-  </p:clrMapOvr>
-</p:sld>
-</file>
-
 <file path=ppt/slides/slide3.xml><?xml version="1.0" encoding="utf-8"?>
 <p:sld xmlns:a="http://schemas.openxmlformats.org/drawingml/2006/main" xmlns:r="http://schemas.openxmlformats.org/officeDocument/2006/relationships" xmlns:p="http://schemas.openxmlformats.org/presentationml/2006/main">
   <p:cSld>
@@ -17884,6 +18424,489 @@
       </p:grpSpPr>
       <p:sp>
         <p:nvSpPr>
+          <p:cNvPr id="9" name="Text Placeholder 8">
+            <a:extLst>
+              <a:ext uri="{FF2B5EF4-FFF2-40B4-BE49-F238E27FC236}">
+                <a16:creationId xmlns:a16="http://schemas.microsoft.com/office/drawing/2014/main" id="{0BB7C70F-B930-4A08-9874-5EB5B952FBB6}"/>
+              </a:ext>
+            </a:extLst>
+          </p:cNvPr>
+          <p:cNvSpPr>
+            <a:spLocks noGrp="1"/>
+          </p:cNvSpPr>
+          <p:nvPr>
+            <p:ph type="body" sz="quarter" idx="14"/>
+          </p:nvPr>
+        </p:nvSpPr>
+        <p:spPr/>
+        <p:txBody>
+          <a:bodyPr/>
+          <a:lstStyle/>
+          <a:p>
+            <a:endParaRPr lang="en-US"/>
+          </a:p>
+        </p:txBody>
+      </p:sp>
+      <p:sp>
+        <p:nvSpPr>
+          <p:cNvPr id="10" name="Text Placeholder 9">
+            <a:extLst>
+              <a:ext uri="{FF2B5EF4-FFF2-40B4-BE49-F238E27FC236}">
+                <a16:creationId xmlns:a16="http://schemas.microsoft.com/office/drawing/2014/main" id="{3CD43190-6448-403E-AAEB-0291C2BF3CB9}"/>
+              </a:ext>
+            </a:extLst>
+          </p:cNvPr>
+          <p:cNvSpPr>
+            <a:spLocks noGrp="1"/>
+          </p:cNvSpPr>
+          <p:nvPr>
+            <p:ph type="body" sz="quarter" idx="15"/>
+          </p:nvPr>
+        </p:nvSpPr>
+        <p:spPr/>
+        <p:txBody>
+          <a:bodyPr/>
+          <a:lstStyle/>
+          <a:p>
+            <a:endParaRPr lang="en-US"/>
+          </a:p>
+        </p:txBody>
+      </p:sp>
+      <p:sp>
+        <p:nvSpPr>
+          <p:cNvPr id="8" name="Title 7">
+            <a:extLst>
+              <a:ext uri="{FF2B5EF4-FFF2-40B4-BE49-F238E27FC236}">
+                <a16:creationId xmlns:a16="http://schemas.microsoft.com/office/drawing/2014/main" id="{D12D2D41-F1B7-4882-A14E-0A0F0F24CEDD}"/>
+              </a:ext>
+            </a:extLst>
+          </p:cNvPr>
+          <p:cNvSpPr>
+            <a:spLocks noGrp="1"/>
+          </p:cNvSpPr>
+          <p:nvPr>
+            <p:ph type="title"/>
+          </p:nvPr>
+        </p:nvSpPr>
+        <p:spPr/>
+        <p:txBody>
+          <a:bodyPr/>
+          <a:lstStyle/>
+          <a:p>
+            <a:r>
+              <a:rPr lang="en-US" sz="3200" dirty="0"/>
+              <a:t>Machine Learning/Data Science Approach</a:t>
+            </a:r>
+          </a:p>
+        </p:txBody>
+      </p:sp>
+      <p:sp>
+        <p:nvSpPr>
+          <p:cNvPr id="11" name="Content Placeholder 10">
+            <a:extLst>
+              <a:ext uri="{FF2B5EF4-FFF2-40B4-BE49-F238E27FC236}">
+                <a16:creationId xmlns:a16="http://schemas.microsoft.com/office/drawing/2014/main" id="{343C97C3-2563-413A-B310-6DEE32EA210C}"/>
+              </a:ext>
+            </a:extLst>
+          </p:cNvPr>
+          <p:cNvSpPr>
+            <a:spLocks noGrp="1"/>
+          </p:cNvSpPr>
+          <p:nvPr>
+            <p:ph sz="quarter" idx="19"/>
+          </p:nvPr>
+        </p:nvSpPr>
+        <p:spPr/>
+        <p:txBody>
+          <a:bodyPr/>
+          <a:lstStyle/>
+          <a:p>
+            <a:r>
+              <a:rPr lang="en-US" sz="2400" dirty="0"/>
+              <a:t>Outcome: Hospitalization in the following year.</a:t>
+            </a:r>
+          </a:p>
+          <a:p>
+            <a:pPr lvl="1"/>
+            <a:r>
+              <a:rPr lang="en-US" sz="2400" dirty="0"/>
+              <a:t>Taken from institutional claims.</a:t>
+            </a:r>
+          </a:p>
+          <a:p>
+            <a:pPr lvl="1"/>
+            <a:r>
+              <a:rPr lang="en-US" sz="2400" dirty="0"/>
+              <a:t>Excluding DRGs signifying accidents or pregnancy.</a:t>
+            </a:r>
+          </a:p>
+          <a:p>
+            <a:r>
+              <a:rPr lang="en-US" sz="2400" dirty="0"/>
+              <a:t>The Machine Learning Approach:</a:t>
+            </a:r>
+          </a:p>
+          <a:p>
+            <a:pPr lvl="1"/>
+            <a:r>
+              <a:rPr lang="en-US" sz="2400" dirty="0"/>
+              <a:t>There are libraries of generic ML algorithms which can be applied to many prediction tasks.</a:t>
+            </a:r>
+          </a:p>
+          <a:p>
+            <a:pPr lvl="2"/>
+            <a:r>
+              <a:rPr lang="en-US" sz="2400" dirty="0"/>
+              <a:t>We used Python’s </a:t>
+            </a:r>
+            <a:r>
+              <a:rPr lang="en-US" sz="2400" dirty="0" err="1"/>
+              <a:t>scikit</a:t>
+            </a:r>
+            <a:r>
+              <a:rPr lang="en-US" sz="2400" dirty="0"/>
+              <a:t>-learn collection.</a:t>
+            </a:r>
+          </a:p>
+          <a:p>
+            <a:pPr lvl="1"/>
+            <a:r>
+              <a:rPr lang="en-US" sz="2400" dirty="0"/>
+              <a:t>Feed your data + gold standard to those </a:t>
+            </a:r>
+            <a:r>
+              <a:rPr lang="en-US" sz="2400" dirty="0" err="1"/>
+              <a:t>algos</a:t>
+            </a:r>
+            <a:r>
+              <a:rPr lang="en-US" sz="2400" dirty="0"/>
+              <a:t> to “train” them.</a:t>
+            </a:r>
+          </a:p>
+          <a:p>
+            <a:pPr lvl="1"/>
+            <a:r>
+              <a:rPr lang="en-US" sz="2400" dirty="0"/>
+              <a:t>Then set the trained </a:t>
+            </a:r>
+            <a:r>
+              <a:rPr lang="en-US" sz="2400" dirty="0" err="1"/>
+              <a:t>algos</a:t>
+            </a:r>
+            <a:r>
+              <a:rPr lang="en-US" sz="2400" dirty="0"/>
+              <a:t> on some held-back “test” data.</a:t>
+            </a:r>
+          </a:p>
+          <a:p>
+            <a:pPr lvl="1"/>
+            <a:r>
+              <a:rPr lang="en-US" sz="2400" dirty="0"/>
+              <a:t>Evaluate predictions.</a:t>
+            </a:r>
+          </a:p>
+        </p:txBody>
+      </p:sp>
+      <p:sp>
+        <p:nvSpPr>
+          <p:cNvPr id="7" name="Slide Number Placeholder 6">
+            <a:extLst>
+              <a:ext uri="{FF2B5EF4-FFF2-40B4-BE49-F238E27FC236}">
+                <a16:creationId xmlns:a16="http://schemas.microsoft.com/office/drawing/2014/main" id="{BF17C6AE-B0BF-4B05-A608-AE8D6B627893}"/>
+              </a:ext>
+            </a:extLst>
+          </p:cNvPr>
+          <p:cNvSpPr>
+            <a:spLocks noGrp="1"/>
+          </p:cNvSpPr>
+          <p:nvPr>
+            <p:ph type="sldNum" sz="quarter" idx="4"/>
+          </p:nvPr>
+        </p:nvSpPr>
+        <p:spPr/>
+        <p:txBody>
+          <a:bodyPr/>
+          <a:lstStyle/>
+          <a:p>
+            <a:fld id="{8C8B385D-DF67-E241-B0BF-76B80A8E743B}" type="slidenum">
+              <a:rPr lang="en-US" smtClean="0"/>
+              <a:pPr/>
+              <a:t>6</a:t>
+            </a:fld>
+            <a:endParaRPr lang="en-US" dirty="0"/>
+          </a:p>
+        </p:txBody>
+      </p:sp>
+    </p:spTree>
+    <p:extLst>
+      <p:ext uri="{BB962C8B-B14F-4D97-AF65-F5344CB8AC3E}">
+        <p14:creationId xmlns:p14="http://schemas.microsoft.com/office/powerpoint/2010/main" val="721174123"/>
+      </p:ext>
+    </p:extLst>
+  </p:cSld>
+  <p:clrMapOvr>
+    <a:masterClrMapping/>
+  </p:clrMapOvr>
+</p:sld>
+</file>
+
+<file path=ppt/slides/slide7.xml><?xml version="1.0" encoding="utf-8"?>
+<p:sld xmlns:a="http://schemas.openxmlformats.org/drawingml/2006/main" xmlns:r="http://schemas.openxmlformats.org/officeDocument/2006/relationships" xmlns:p="http://schemas.openxmlformats.org/presentationml/2006/main" show="0">
+  <p:cSld>
+    <p:spTree>
+      <p:nvGrpSpPr>
+        <p:cNvPr id="1" name=""/>
+        <p:cNvGrpSpPr/>
+        <p:nvPr/>
+      </p:nvGrpSpPr>
+      <p:grpSpPr>
+        <a:xfrm>
+          <a:off x="0" y="0"/>
+          <a:ext cx="0" cy="0"/>
+          <a:chOff x="0" y="0"/>
+          <a:chExt cx="0" cy="0"/>
+        </a:xfrm>
+      </p:grpSpPr>
+      <p:sp>
+        <p:nvSpPr>
+          <p:cNvPr id="9" name="Text Placeholder 8">
+            <a:extLst>
+              <a:ext uri="{FF2B5EF4-FFF2-40B4-BE49-F238E27FC236}">
+                <a16:creationId xmlns:a16="http://schemas.microsoft.com/office/drawing/2014/main" id="{C70D59E1-1938-433E-838F-AB5FF19FD007}"/>
+              </a:ext>
+            </a:extLst>
+          </p:cNvPr>
+          <p:cNvSpPr>
+            <a:spLocks noGrp="1"/>
+          </p:cNvSpPr>
+          <p:nvPr>
+            <p:ph type="body" sz="quarter" idx="14"/>
+          </p:nvPr>
+        </p:nvSpPr>
+        <p:spPr/>
+        <p:txBody>
+          <a:bodyPr/>
+          <a:lstStyle/>
+          <a:p>
+            <a:endParaRPr lang="en-US"/>
+          </a:p>
+        </p:txBody>
+      </p:sp>
+      <p:sp>
+        <p:nvSpPr>
+          <p:cNvPr id="10" name="Text Placeholder 9">
+            <a:extLst>
+              <a:ext uri="{FF2B5EF4-FFF2-40B4-BE49-F238E27FC236}">
+                <a16:creationId xmlns:a16="http://schemas.microsoft.com/office/drawing/2014/main" id="{71365AF5-0103-4940-9AE9-BB36D3D2C8A5}"/>
+              </a:ext>
+            </a:extLst>
+          </p:cNvPr>
+          <p:cNvSpPr>
+            <a:spLocks noGrp="1"/>
+          </p:cNvSpPr>
+          <p:nvPr>
+            <p:ph type="body" sz="quarter" idx="15"/>
+          </p:nvPr>
+        </p:nvSpPr>
+        <p:spPr/>
+        <p:txBody>
+          <a:bodyPr/>
+          <a:lstStyle/>
+          <a:p>
+            <a:endParaRPr lang="en-US"/>
+          </a:p>
+        </p:txBody>
+      </p:sp>
+      <p:sp>
+        <p:nvSpPr>
+          <p:cNvPr id="8" name="Title 7">
+            <a:extLst>
+              <a:ext uri="{FF2B5EF4-FFF2-40B4-BE49-F238E27FC236}">
+                <a16:creationId xmlns:a16="http://schemas.microsoft.com/office/drawing/2014/main" id="{A3BCEF0E-9EFE-4F35-B442-329788B9FDF2}"/>
+              </a:ext>
+            </a:extLst>
+          </p:cNvPr>
+          <p:cNvSpPr>
+            <a:spLocks noGrp="1"/>
+          </p:cNvSpPr>
+          <p:nvPr>
+            <p:ph type="title"/>
+          </p:nvPr>
+        </p:nvSpPr>
+        <p:spPr/>
+        <p:txBody>
+          <a:bodyPr/>
+          <a:lstStyle/>
+          <a:p>
+            <a:r>
+              <a:rPr lang="en-US" sz="2800" dirty="0"/>
+              <a:t>Machine Learning Approach</a:t>
+            </a:r>
+          </a:p>
+        </p:txBody>
+      </p:sp>
+      <p:sp>
+        <p:nvSpPr>
+          <p:cNvPr id="11" name="Content Placeholder 10">
+            <a:extLst>
+              <a:ext uri="{FF2B5EF4-FFF2-40B4-BE49-F238E27FC236}">
+                <a16:creationId xmlns:a16="http://schemas.microsoft.com/office/drawing/2014/main" id="{48C484EC-89FB-444D-8609-2191EC44EBF0}"/>
+              </a:ext>
+            </a:extLst>
+          </p:cNvPr>
+          <p:cNvSpPr>
+            <a:spLocks noGrp="1"/>
+          </p:cNvSpPr>
+          <p:nvPr>
+            <p:ph sz="quarter" idx="19"/>
+          </p:nvPr>
+        </p:nvSpPr>
+        <p:spPr/>
+        <p:txBody>
+          <a:bodyPr/>
+          <a:lstStyle/>
+          <a:p>
+            <a:pPr marL="231775" lvl="2" indent="-227013"/>
+            <a:r>
+              <a:rPr lang="en-US" sz="2000" dirty="0"/>
+              <a:t>Algorithms “learn” from the data (“features”) to make predictions.</a:t>
+            </a:r>
+          </a:p>
+          <a:p>
+            <a:pPr marL="231775" lvl="2" indent="-227013"/>
+            <a:r>
+              <a:rPr lang="en-US" sz="2000" dirty="0"/>
+              <a:t>Python’s </a:t>
+            </a:r>
+            <a:r>
+              <a:rPr lang="en-US" sz="2000" dirty="0" err="1"/>
+              <a:t>scikit</a:t>
+            </a:r>
+            <a:r>
+              <a:rPr lang="en-US" sz="2000" dirty="0"/>
+              <a:t>-learn library (</a:t>
+            </a:r>
+            <a:r>
+              <a:rPr lang="en-US" sz="2000" u="sng" dirty="0">
+                <a:hlinkClick r:id="rId3"/>
+              </a:rPr>
+              <a:t>https://scikit-learn.org</a:t>
+            </a:r>
+            <a:r>
+              <a:rPr lang="en-US" sz="2000" dirty="0"/>
+              <a:t>) provided a wide variety of classifier algorithms for us to try.</a:t>
+            </a:r>
+          </a:p>
+          <a:p>
+            <a:pPr marL="231775" lvl="2" indent="-227013"/>
+            <a:r>
+              <a:rPr lang="en-US" sz="2000" dirty="0"/>
+              <a:t>We used actual hospitalizations in the 12 months starting in April 2016 as our gold standard.</a:t>
+            </a:r>
+          </a:p>
+          <a:p>
+            <a:pPr marL="231775" lvl="2" indent="-227013"/>
+            <a:r>
+              <a:rPr lang="en-US" sz="2000" dirty="0"/>
+              <a:t>In General:</a:t>
+            </a:r>
+          </a:p>
+          <a:p>
+            <a:pPr marL="688884" lvl="3" indent="-227013"/>
+            <a:r>
+              <a:rPr lang="en-US" sz="2000" dirty="0"/>
+              <a:t>Feed a subset of your data (“features”, “variables”) into a classifier along with the gold standard.</a:t>
+            </a:r>
+          </a:p>
+          <a:p>
+            <a:pPr marL="688884" lvl="3" indent="-227013"/>
+            <a:r>
+              <a:rPr lang="en-US" sz="2000" dirty="0"/>
+              <a:t>The classifiers “learn” to make predictions from this data.</a:t>
+            </a:r>
+          </a:p>
+          <a:p>
+            <a:pPr marL="688884" lvl="3" indent="-227013"/>
+            <a:r>
+              <a:rPr lang="en-US" sz="2000" dirty="0"/>
+              <a:t>You then sic them on a held-back subset of data.</a:t>
+            </a:r>
+          </a:p>
+          <a:p>
+            <a:pPr marL="688884" lvl="3" indent="-227013"/>
+            <a:r>
+              <a:rPr lang="en-US" sz="2000" dirty="0"/>
+              <a:t>If the predictions match your gold standard, you’ve got a good classifier.</a:t>
+            </a:r>
+          </a:p>
+          <a:p>
+            <a:pPr marL="231775" indent="-227013"/>
+            <a:endParaRPr lang="en-US" sz="2000" dirty="0"/>
+          </a:p>
+        </p:txBody>
+      </p:sp>
+      <p:sp>
+        <p:nvSpPr>
+          <p:cNvPr id="7" name="Slide Number Placeholder 6">
+            <a:extLst>
+              <a:ext uri="{FF2B5EF4-FFF2-40B4-BE49-F238E27FC236}">
+                <a16:creationId xmlns:a16="http://schemas.microsoft.com/office/drawing/2014/main" id="{22C7D822-5E90-4D37-AC86-45FE5DD4F491}"/>
+              </a:ext>
+            </a:extLst>
+          </p:cNvPr>
+          <p:cNvSpPr>
+            <a:spLocks noGrp="1"/>
+          </p:cNvSpPr>
+          <p:nvPr>
+            <p:ph type="sldNum" sz="quarter" idx="4"/>
+          </p:nvPr>
+        </p:nvSpPr>
+        <p:spPr/>
+        <p:txBody>
+          <a:bodyPr/>
+          <a:lstStyle/>
+          <a:p>
+            <a:fld id="{8C8B385D-DF67-E241-B0BF-76B80A8E743B}" type="slidenum">
+              <a:rPr lang="en-US" smtClean="0"/>
+              <a:pPr/>
+              <a:t>7</a:t>
+            </a:fld>
+            <a:endParaRPr lang="en-US" dirty="0"/>
+          </a:p>
+        </p:txBody>
+      </p:sp>
+    </p:spTree>
+    <p:extLst>
+      <p:ext uri="{BB962C8B-B14F-4D97-AF65-F5344CB8AC3E}">
+        <p14:creationId xmlns:p14="http://schemas.microsoft.com/office/powerpoint/2010/main" val="3295500560"/>
+      </p:ext>
+    </p:extLst>
+  </p:cSld>
+  <p:clrMapOvr>
+    <a:masterClrMapping/>
+  </p:clrMapOvr>
+</p:sld>
+</file>
+
+<file path=ppt/slides/slide8.xml><?xml version="1.0" encoding="utf-8"?>
+<p:sld xmlns:a="http://schemas.openxmlformats.org/drawingml/2006/main" xmlns:r="http://schemas.openxmlformats.org/officeDocument/2006/relationships" xmlns:p="http://schemas.openxmlformats.org/presentationml/2006/main">
+  <p:cSld>
+    <p:spTree>
+      <p:nvGrpSpPr>
+        <p:cNvPr id="1" name=""/>
+        <p:cNvGrpSpPr/>
+        <p:nvPr/>
+      </p:nvGrpSpPr>
+      <p:grpSpPr>
+        <a:xfrm>
+          <a:off x="0" y="0"/>
+          <a:ext cx="0" cy="0"/>
+          <a:chOff x="0" y="0"/>
+          <a:chExt cx="0" cy="0"/>
+        </a:xfrm>
+      </p:grpSpPr>
+      <p:sp>
+        <p:nvSpPr>
           <p:cNvPr id="2" name="Title 1">
             <a:extLst>
               <a:ext uri="{FF2B5EF4-FFF2-40B4-BE49-F238E27FC236}">
@@ -17905,15 +18928,7 @@
           <a:p>
             <a:r>
               <a:rPr lang="en-US" sz="3200" dirty="0"/>
-              <a:t>Machine Learning </a:t>
-            </a:r>
-            <a:r>
-              <a:rPr lang="en-US" sz="3200" dirty="0" err="1"/>
-              <a:t>Boogyman</a:t>
-            </a:r>
-            <a:r>
-              <a:rPr lang="en-US" sz="3200" dirty="0"/>
-              <a:t>: Overfitting</a:t>
+              <a:t>Machine Learning Boogeyman: Overfitting</a:t>
             </a:r>
           </a:p>
         </p:txBody>
@@ -18009,7 +19024,7 @@
 </p:sld>
 </file>
 
-<file path=ppt/slides/slide7.xml><?xml version="1.0" encoding="utf-8"?>
+<file path=ppt/slides/slide9.xml><?xml version="1.0" encoding="utf-8"?>
 <p:sld xmlns:a="http://schemas.openxmlformats.org/drawingml/2006/main" xmlns:r="http://schemas.openxmlformats.org/officeDocument/2006/relationships" xmlns:p="http://schemas.openxmlformats.org/presentationml/2006/main">
   <p:cSld>
     <p:spTree>
@@ -18048,7 +19063,7 @@
         </p:blipFill>
         <p:spPr>
           <a:xfrm>
-            <a:off x="924375" y="360676"/>
+            <a:off x="4087981" y="360676"/>
             <a:ext cx="7437983" cy="6229310"/>
           </a:xfrm>
           <a:prstGeom prst="rect">
@@ -18056,50 +19071,6 @@
           </a:prstGeom>
         </p:spPr>
       </p:pic>
-      <p:sp>
-        <p:nvSpPr>
-          <p:cNvPr id="2" name="Title 1">
-            <a:extLst>
-              <a:ext uri="{FF2B5EF4-FFF2-40B4-BE49-F238E27FC236}">
-                <a16:creationId xmlns:a16="http://schemas.microsoft.com/office/drawing/2014/main" id="{E5D189F2-2F76-4A2D-A57D-B07DF44FFFCC}"/>
-              </a:ext>
-            </a:extLst>
-          </p:cNvPr>
-          <p:cNvSpPr>
-            <a:spLocks noGrp="1"/>
-          </p:cNvSpPr>
-          <p:nvPr>
-            <p:ph type="title"/>
-          </p:nvPr>
-        </p:nvSpPr>
-        <p:spPr>
-          <a:xfrm>
-            <a:off x="8174182" y="758952"/>
-            <a:ext cx="3860800" cy="4041648"/>
-          </a:xfrm>
-        </p:spPr>
-        <p:txBody>
-          <a:bodyPr vert="horz" lIns="91440" tIns="45720" rIns="91440" bIns="45720" rtlCol="0" anchor="b">
-            <a:normAutofit/>
-          </a:bodyPr>
-          <a:lstStyle/>
-          <a:p>
-            <a:pPr>
-              <a:lnSpc>
-                <a:spcPct val="85000"/>
-              </a:lnSpc>
-            </a:pPr>
-            <a:r>
-              <a:rPr lang="en-US" dirty="0">
-                <a:solidFill>
-                  <a:srgbClr val="FFFFFF"/>
-                </a:solidFill>
-              </a:rPr>
-              <a:t>Solution: Divide into Development and Validation Portions</a:t>
-            </a:r>
-          </a:p>
-        </p:txBody>
-      </p:sp>
       <p:sp>
         <p:nvSpPr>
           <p:cNvPr id="17" name="Content Placeholder 10">
@@ -18116,7 +19087,7 @@
         </p:nvSpPr>
         <p:spPr>
           <a:xfrm>
-            <a:off x="8713076" y="1549561"/>
+            <a:off x="662182" y="959765"/>
             <a:ext cx="3237186" cy="4152900"/>
           </a:xfrm>
           <a:prstGeom prst="rect">
@@ -18336,412 +19307,6 @@
     <p:extLst>
       <p:ext uri="{BB962C8B-B14F-4D97-AF65-F5344CB8AC3E}">
         <p14:creationId xmlns:p14="http://schemas.microsoft.com/office/powerpoint/2010/main" val="1211483213"/>
-      </p:ext>
-    </p:extLst>
-  </p:cSld>
-  <p:clrMapOvr>
-    <a:masterClrMapping/>
-  </p:clrMapOvr>
-</p:sld>
-</file>
-
-<file path=ppt/slides/slide8.xml><?xml version="1.0" encoding="utf-8"?>
-<p:sld xmlns:a="http://schemas.openxmlformats.org/drawingml/2006/main" xmlns:r="http://schemas.openxmlformats.org/officeDocument/2006/relationships" xmlns:p="http://schemas.openxmlformats.org/presentationml/2006/main">
-  <p:cSld>
-    <p:spTree>
-      <p:nvGrpSpPr>
-        <p:cNvPr id="1" name=""/>
-        <p:cNvGrpSpPr/>
-        <p:nvPr/>
-      </p:nvGrpSpPr>
-      <p:grpSpPr>
-        <a:xfrm>
-          <a:off x="0" y="0"/>
-          <a:ext cx="0" cy="0"/>
-          <a:chOff x="0" y="0"/>
-          <a:chExt cx="0" cy="0"/>
-        </a:xfrm>
-      </p:grpSpPr>
-      <p:sp>
-        <p:nvSpPr>
-          <p:cNvPr id="2" name="Title 1">
-            <a:extLst>
-              <a:ext uri="{FF2B5EF4-FFF2-40B4-BE49-F238E27FC236}">
-                <a16:creationId xmlns:a16="http://schemas.microsoft.com/office/drawing/2014/main" id="{C6AB2A77-B940-4CB2-B125-F010521A823F}"/>
-              </a:ext>
-            </a:extLst>
-          </p:cNvPr>
-          <p:cNvSpPr>
-            <a:spLocks noGrp="1"/>
-          </p:cNvSpPr>
-          <p:nvPr>
-            <p:ph type="title"/>
-          </p:nvPr>
-        </p:nvSpPr>
-        <p:spPr/>
-        <p:txBody>
-          <a:bodyPr/>
-          <a:lstStyle/>
-          <a:p>
-            <a:r>
-              <a:rPr lang="en-US" sz="3200" dirty="0"/>
-              <a:t>Development Process:</a:t>
-            </a:r>
-          </a:p>
-        </p:txBody>
-      </p:sp>
-      <p:sp>
-        <p:nvSpPr>
-          <p:cNvPr id="3" name="Content Placeholder 2">
-            <a:extLst>
-              <a:ext uri="{FF2B5EF4-FFF2-40B4-BE49-F238E27FC236}">
-                <a16:creationId xmlns:a16="http://schemas.microsoft.com/office/drawing/2014/main" id="{C672D832-6F41-4047-8E00-67D9D06E266B}"/>
-              </a:ext>
-            </a:extLst>
-          </p:cNvPr>
-          <p:cNvSpPr>
-            <a:spLocks noGrp="1"/>
-          </p:cNvSpPr>
-          <p:nvPr>
-            <p:ph idx="1"/>
-          </p:nvPr>
-        </p:nvSpPr>
-        <p:spPr/>
-        <p:txBody>
-          <a:bodyPr/>
-          <a:lstStyle/>
-          <a:p>
-            <a:pPr marL="514350" lvl="0" indent="-514350">
-              <a:buFont typeface="+mj-lt"/>
-              <a:buAutoNum type="arabicPeriod"/>
-            </a:pPr>
-            <a:r>
-              <a:rPr lang="en-US" sz="2400" dirty="0"/>
-              <a:t>Read (just) the development data out of the database.</a:t>
-            </a:r>
-          </a:p>
-          <a:p>
-            <a:pPr marL="514350" lvl="0" indent="-514350">
-              <a:buFont typeface="+mj-lt"/>
-              <a:buAutoNum type="arabicPeriod"/>
-            </a:pPr>
-            <a:r>
-              <a:rPr lang="en-US" sz="2400" dirty="0"/>
-              <a:t>Randomly divide </a:t>
-            </a:r>
-            <a:r>
-              <a:rPr lang="en-US" sz="2400" i="1" dirty="0"/>
-              <a:t>that</a:t>
-            </a:r>
-            <a:r>
-              <a:rPr lang="en-US" sz="2400" dirty="0"/>
-              <a:t> into two-thirds training and one-third test subsamples (again stratified by Hospitalization status).</a:t>
-            </a:r>
-          </a:p>
-          <a:p>
-            <a:pPr marL="514350" lvl="0" indent="-514350">
-              <a:buFont typeface="+mj-lt"/>
-              <a:buAutoNum type="arabicPeriod"/>
-            </a:pPr>
-            <a:r>
-              <a:rPr lang="en-US" sz="2400" dirty="0"/>
-              <a:t>Use the training subsample to train various classifiers (random forest, support vector, etc.)</a:t>
-            </a:r>
-          </a:p>
-          <a:p>
-            <a:pPr marL="514350" lvl="0" indent="-514350">
-              <a:buFont typeface="+mj-lt"/>
-              <a:buAutoNum type="arabicPeriod"/>
-            </a:pPr>
-            <a:r>
-              <a:rPr lang="en-US" sz="2400" dirty="0"/>
-              <a:t>Use those trained classifiers to predict the cases from the ‘test’ subsample.</a:t>
-            </a:r>
-          </a:p>
-          <a:p>
-            <a:pPr marL="514350" lvl="0" indent="-514350">
-              <a:buFont typeface="+mj-lt"/>
-              <a:buAutoNum type="arabicPeriod"/>
-            </a:pPr>
-            <a:r>
-              <a:rPr lang="en-US" sz="2400" dirty="0"/>
-              <a:t>Evaluate performance.</a:t>
-            </a:r>
-          </a:p>
-          <a:p>
-            <a:pPr marL="514350" indent="-514350">
-              <a:buFont typeface="+mj-lt"/>
-              <a:buAutoNum type="arabicPeriod"/>
-            </a:pPr>
-            <a:r>
-              <a:rPr lang="en-US" sz="2400" dirty="0"/>
-              <a:t>If performance is unsatisfactory </a:t>
-            </a:r>
-            <a:r>
-              <a:rPr lang="en-US" sz="2400" b="1" dirty="0"/>
-              <a:t>and</a:t>
-            </a:r>
-            <a:r>
-              <a:rPr lang="en-US" sz="2400" dirty="0"/>
-              <a:t> we can think of something to tweak (features, classifier parameters, etc.) do those tweaks and start back at #1.</a:t>
-            </a:r>
-          </a:p>
-        </p:txBody>
-      </p:sp>
-    </p:spTree>
-    <p:extLst>
-      <p:ext uri="{BB962C8B-B14F-4D97-AF65-F5344CB8AC3E}">
-        <p14:creationId xmlns:p14="http://schemas.microsoft.com/office/powerpoint/2010/main" val="3487464237"/>
-      </p:ext>
-    </p:extLst>
-  </p:cSld>
-  <p:clrMapOvr>
-    <a:masterClrMapping/>
-  </p:clrMapOvr>
-</p:sld>
-</file>
-
-<file path=ppt/slides/slide9.xml><?xml version="1.0" encoding="utf-8"?>
-<p:sld xmlns:a="http://schemas.openxmlformats.org/drawingml/2006/main" xmlns:r="http://schemas.openxmlformats.org/officeDocument/2006/relationships" xmlns:p="http://schemas.openxmlformats.org/presentationml/2006/main">
-  <p:cSld>
-    <p:spTree>
-      <p:nvGrpSpPr>
-        <p:cNvPr id="1" name=""/>
-        <p:cNvGrpSpPr/>
-        <p:nvPr/>
-      </p:nvGrpSpPr>
-      <p:grpSpPr>
-        <a:xfrm>
-          <a:off x="0" y="0"/>
-          <a:ext cx="0" cy="0"/>
-          <a:chOff x="0" y="0"/>
-          <a:chExt cx="0" cy="0"/>
-        </a:xfrm>
-      </p:grpSpPr>
-      <p:sp>
-        <p:nvSpPr>
-          <p:cNvPr id="9" name="Text Placeholder 8">
-            <a:extLst>
-              <a:ext uri="{FF2B5EF4-FFF2-40B4-BE49-F238E27FC236}">
-                <a16:creationId xmlns:a16="http://schemas.microsoft.com/office/drawing/2014/main" id="{13FE8F7C-D8D9-4E08-ABAA-C5E193CDA846}"/>
-              </a:ext>
-            </a:extLst>
-          </p:cNvPr>
-          <p:cNvSpPr>
-            <a:spLocks noGrp="1"/>
-          </p:cNvSpPr>
-          <p:nvPr>
-            <p:ph type="body" sz="quarter" idx="14"/>
-          </p:nvPr>
-        </p:nvSpPr>
-        <p:spPr/>
-        <p:txBody>
-          <a:bodyPr/>
-          <a:lstStyle/>
-          <a:p>
-            <a:endParaRPr lang="en-US" dirty="0"/>
-          </a:p>
-        </p:txBody>
-      </p:sp>
-      <p:sp>
-        <p:nvSpPr>
-          <p:cNvPr id="11" name="Text Placeholder 10">
-            <a:extLst>
-              <a:ext uri="{FF2B5EF4-FFF2-40B4-BE49-F238E27FC236}">
-                <a16:creationId xmlns:a16="http://schemas.microsoft.com/office/drawing/2014/main" id="{8E3D4659-5ED8-4F9F-A39C-0FBC78F5FB0C}"/>
-              </a:ext>
-            </a:extLst>
-          </p:cNvPr>
-          <p:cNvSpPr>
-            <a:spLocks noGrp="1"/>
-          </p:cNvSpPr>
-          <p:nvPr>
-            <p:ph type="body" sz="quarter" idx="15"/>
-          </p:nvPr>
-        </p:nvSpPr>
-        <p:spPr/>
-        <p:txBody>
-          <a:bodyPr/>
-          <a:lstStyle/>
-          <a:p>
-            <a:endParaRPr lang="en-US"/>
-          </a:p>
-        </p:txBody>
-      </p:sp>
-      <p:sp>
-        <p:nvSpPr>
-          <p:cNvPr id="4" name="Title 3">
-            <a:extLst>
-              <a:ext uri="{FF2B5EF4-FFF2-40B4-BE49-F238E27FC236}">
-                <a16:creationId xmlns:a16="http://schemas.microsoft.com/office/drawing/2014/main" id="{E37812BD-31E0-4570-AEEB-2C1D1B104D7F}"/>
-              </a:ext>
-            </a:extLst>
-          </p:cNvPr>
-          <p:cNvSpPr>
-            <a:spLocks noGrp="1"/>
-          </p:cNvSpPr>
-          <p:nvPr>
-            <p:ph type="title"/>
-          </p:nvPr>
-        </p:nvSpPr>
-        <p:spPr/>
-        <p:txBody>
-          <a:bodyPr/>
-          <a:lstStyle/>
-          <a:p>
-            <a:r>
-              <a:rPr lang="en-US" sz="3200" dirty="0"/>
-              <a:t>How’d We Do?</a:t>
-            </a:r>
-          </a:p>
-        </p:txBody>
-      </p:sp>
-      <p:sp>
-        <p:nvSpPr>
-          <p:cNvPr id="12" name="Content Placeholder 11">
-            <a:extLst>
-              <a:ext uri="{FF2B5EF4-FFF2-40B4-BE49-F238E27FC236}">
-                <a16:creationId xmlns:a16="http://schemas.microsoft.com/office/drawing/2014/main" id="{6B387B93-FB0C-4FEF-ADBD-064E110E6326}"/>
-              </a:ext>
-            </a:extLst>
-          </p:cNvPr>
-          <p:cNvSpPr>
-            <a:spLocks noGrp="1"/>
-          </p:cNvSpPr>
-          <p:nvPr>
-            <p:ph sz="quarter" idx="19"/>
-          </p:nvPr>
-        </p:nvSpPr>
-        <p:spPr/>
-        <p:txBody>
-          <a:bodyPr/>
-          <a:lstStyle/>
-          <a:p>
-            <a:r>
-              <a:rPr lang="en-US" sz="2000" dirty="0"/>
-              <a:t>This is a </a:t>
-            </a:r>
-            <a:r>
-              <a:rPr lang="en-US" sz="2000" b="1" dirty="0"/>
-              <a:t>triage</a:t>
-            </a:r>
-            <a:r>
-              <a:rPr lang="en-US" sz="2000" dirty="0"/>
-              <a:t> task—goal is to help Case Managers </a:t>
-            </a:r>
-            <a:r>
-              <a:rPr lang="en-US" sz="2000" i="1" dirty="0"/>
-              <a:t>prioritize</a:t>
-            </a:r>
-            <a:r>
-              <a:rPr lang="en-US" sz="2000" dirty="0"/>
-              <a:t> their efforts.</a:t>
-            </a:r>
-          </a:p>
-          <a:p>
-            <a:r>
-              <a:rPr lang="en-US" sz="2000" dirty="0"/>
-              <a:t>So what we really want is a good </a:t>
-            </a:r>
-            <a:r>
-              <a:rPr lang="en-US" sz="2000" i="1" dirty="0"/>
-              <a:t>ranking</a:t>
-            </a:r>
-            <a:r>
-              <a:rPr lang="en-US" sz="2000" dirty="0"/>
-              <a:t> of most-needy to least-needy.</a:t>
-            </a:r>
-          </a:p>
-          <a:p>
-            <a:r>
-              <a:rPr lang="en-US" sz="2000" dirty="0"/>
-              <a:t>To evaluate rankings:</a:t>
-            </a:r>
-          </a:p>
-          <a:p>
-            <a:pPr marL="617220" lvl="1" indent="-342900">
-              <a:buFont typeface="+mj-lt"/>
-              <a:buAutoNum type="arabicPeriod"/>
-            </a:pPr>
-            <a:r>
-              <a:rPr lang="en-US" sz="2000" dirty="0"/>
-              <a:t>Sort the test subsample by one of the candidate predictions, from most-likely-to-be-hospitalized to least-likely.</a:t>
-            </a:r>
-          </a:p>
-          <a:p>
-            <a:pPr marL="617220" lvl="1" indent="-342900">
-              <a:buFont typeface="+mj-lt"/>
-              <a:buAutoNum type="arabicPeriod"/>
-            </a:pPr>
-            <a:r>
-              <a:rPr lang="en-US" sz="2000" dirty="0"/>
-              <a:t>Run down the line counting the cumulative number of people who were in fact hospitalized.</a:t>
-            </a:r>
-          </a:p>
-          <a:p>
-            <a:pPr marL="617220" lvl="1" indent="-342900">
-              <a:buFont typeface="+mj-lt"/>
-              <a:buAutoNum type="arabicPeriod"/>
-            </a:pPr>
-            <a:r>
-              <a:rPr lang="en-US" sz="2000" dirty="0"/>
-              <a:t>How many people do we have to go through in order to find Y people hospitalized?</a:t>
-            </a:r>
-          </a:p>
-          <a:p>
-            <a:pPr marL="274320" lvl="1" indent="0">
-              <a:buNone/>
-            </a:pPr>
-            <a:endParaRPr lang="en-US" sz="2000" dirty="0"/>
-          </a:p>
-          <a:p>
-            <a:pPr marL="0" indent="-182789">
-              <a:buNone/>
-            </a:pPr>
-            <a:r>
-              <a:rPr lang="en-US" sz="2800" dirty="0"/>
-              <a:t>The faster the Y values climb, the better the predictor.</a:t>
-            </a:r>
-          </a:p>
-          <a:p>
-            <a:endParaRPr lang="en-US" sz="2000" dirty="0"/>
-          </a:p>
-        </p:txBody>
-      </p:sp>
-      <p:sp>
-        <p:nvSpPr>
-          <p:cNvPr id="6" name="Slide Number Placeholder 5">
-            <a:extLst>
-              <a:ext uri="{FF2B5EF4-FFF2-40B4-BE49-F238E27FC236}">
-                <a16:creationId xmlns:a16="http://schemas.microsoft.com/office/drawing/2014/main" id="{43F859F1-3EB0-4637-984D-6BC68A6A6E0B}"/>
-              </a:ext>
-            </a:extLst>
-          </p:cNvPr>
-          <p:cNvSpPr>
-            <a:spLocks noGrp="1"/>
-          </p:cNvSpPr>
-          <p:nvPr>
-            <p:ph type="sldNum" sz="quarter" idx="4"/>
-          </p:nvPr>
-        </p:nvSpPr>
-        <p:spPr/>
-        <p:txBody>
-          <a:bodyPr/>
-          <a:lstStyle/>
-          <a:p>
-            <a:fld id="{8C8B385D-DF67-E241-B0BF-76B80A8E743B}" type="slidenum">
-              <a:rPr lang="en-US" smtClean="0"/>
-              <a:pPr/>
-              <a:t>9</a:t>
-            </a:fld>
-            <a:endParaRPr lang="en-US" dirty="0"/>
-          </a:p>
-        </p:txBody>
-      </p:sp>
-    </p:spTree>
-    <p:extLst>
-      <p:ext uri="{BB962C8B-B14F-4D97-AF65-F5344CB8AC3E}">
-        <p14:creationId xmlns:p14="http://schemas.microsoft.com/office/powerpoint/2010/main" val="1438239045"/>
       </p:ext>
     </p:extLst>
   </p:cSld>

</xml_diff>

<commit_message>
Final touches--fixing to upload.
</commit_message>
<xml_diff>
--- a/analytics_for_hmos.pptx
+++ b/analytics_for_hmos.pptx
@@ -11,15 +11,15 @@
     <p:sldMasterId id="2147483693" r:id="rId7"/>
   </p:sldMasterIdLst>
   <p:notesMasterIdLst>
-    <p:notesMasterId r:id="rId28"/>
+    <p:notesMasterId r:id="rId27"/>
   </p:notesMasterIdLst>
   <p:sldIdLst>
     <p:sldId id="256" r:id="rId8"/>
     <p:sldId id="257" r:id="rId9"/>
     <p:sldId id="258" r:id="rId10"/>
-    <p:sldId id="261" r:id="rId11"/>
-    <p:sldId id="260" r:id="rId12"/>
-    <p:sldId id="278" r:id="rId13"/>
+    <p:sldId id="259" r:id="rId11"/>
+    <p:sldId id="261" r:id="rId12"/>
+    <p:sldId id="260" r:id="rId13"/>
     <p:sldId id="279" r:id="rId14"/>
     <p:sldId id="263" r:id="rId15"/>
     <p:sldId id="264" r:id="rId16"/>
@@ -28,12 +28,11 @@
     <p:sldId id="270" r:id="rId19"/>
     <p:sldId id="271" r:id="rId20"/>
     <p:sldId id="281" r:id="rId21"/>
-    <p:sldId id="274" r:id="rId22"/>
-    <p:sldId id="275" r:id="rId23"/>
-    <p:sldId id="259" r:id="rId24"/>
-    <p:sldId id="262" r:id="rId25"/>
-    <p:sldId id="277" r:id="rId26"/>
-    <p:sldId id="276" r:id="rId27"/>
+    <p:sldId id="275" r:id="rId22"/>
+    <p:sldId id="274" r:id="rId23"/>
+    <p:sldId id="262" r:id="rId24"/>
+    <p:sldId id="277" r:id="rId25"/>
+    <p:sldId id="276" r:id="rId26"/>
   </p:sldIdLst>
   <p:sldSz cx="12192000" cy="6858000"/>
   <p:notesSz cx="6858000" cy="9144000"/>
@@ -163,20 +162,6 @@
 </p:cmAuthorLst>
 </file>
 
-<file path=ppt/comments/comment1.xml><?xml version="1.0" encoding="utf-8"?>
-<p:cmLst xmlns:a="http://schemas.openxmlformats.org/drawingml/2006/main" xmlns:r="http://schemas.openxmlformats.org/officeDocument/2006/relationships" xmlns:p="http://schemas.openxmlformats.org/presentationml/2006/main">
-  <p:cm authorId="1" dt="2019-03-06T12:56:09.765" idx="11">
-    <p:pos x="4138" y="1902"/>
-    <p:text>This terminology should be consistent with slide 5.5</p:text>
-    <p:extLst>
-      <p:ext uri="{C676402C-5697-4E1C-873F-D02D1690AC5C}">
-        <p15:threadingInfo xmlns:p15="http://schemas.microsoft.com/office/powerpoint/2012/main" timeZoneBias="480"/>
-      </p:ext>
-    </p:extLst>
-  </p:cm>
-</p:cmLst>
-</file>
-
 <file path=ppt/notesMasters/notesMaster1.xml><?xml version="1.0" encoding="utf-8"?>
 <p:notesMaster xmlns:a="http://schemas.openxmlformats.org/drawingml/2006/main" xmlns:r="http://schemas.openxmlformats.org/officeDocument/2006/relationships" xmlns:p="http://schemas.openxmlformats.org/presentationml/2006/main">
   <p:cSld>
@@ -259,7 +244,7 @@
           <a:p>
             <a:fld id="{51870728-32F9-4016-A7F9-3908380B41C6}" type="datetimeFigureOut">
               <a:rPr lang="en-US" smtClean="0"/>
-              <a:t>3/9/2019</a:t>
+              <a:t>3/26/2019</a:t>
             </a:fld>
             <a:endParaRPr lang="en-US"/>
           </a:p>
@@ -926,7 +911,42 @@
           <a:p>
             <a:r>
               <a:rPr lang="en-US" dirty="0"/>
-              <a:t>Would it be enough to say “number needed to treat” here?</a:t>
+              <a:t>Here’s the iteration I was talking about.</a:t>
+            </a:r>
+          </a:p>
+          <a:p>
+            <a:endParaRPr lang="en-US" dirty="0"/>
+          </a:p>
+          <a:p>
+            <a:r>
+              <a:rPr lang="en-US" dirty="0"/>
+              <a:t>Note that we’re not bringing any actual clinical or even statistical knowledge to bear on this problem.  This is very much a throw-it-against-the-wall-and-see-what-sticks approach.</a:t>
+            </a:r>
+          </a:p>
+          <a:p>
+            <a:endParaRPr lang="en-US" dirty="0"/>
+          </a:p>
+          <a:p>
+            <a:r>
+              <a:rPr lang="en-US" dirty="0"/>
+              <a:t>One very nice thing about the </a:t>
+            </a:r>
+            <a:r>
+              <a:rPr lang="en-US" dirty="0" err="1"/>
+              <a:t>scikit</a:t>
+            </a:r>
+            <a:r>
+              <a:rPr lang="en-US" dirty="0"/>
+              <a:t>-learn libs I was able to use is that their programmatic interfaces are pretty uniform.  So I was able to write a single function that accepted a generic classifier and the training/test data and would spit out predictions &amp; statistics.</a:t>
+            </a:r>
+          </a:p>
+          <a:p>
+            <a:endParaRPr lang="en-US" dirty="0"/>
+          </a:p>
+          <a:p>
+            <a:r>
+              <a:rPr lang="en-US" dirty="0"/>
+              <a:t>Note also that we don’t touch the validation data in this process at all.  That is our ultimate backstop on overfitting—if we overfit development, validation will smack us upside the head.</a:t>
             </a:r>
           </a:p>
         </p:txBody>
@@ -946,9 +966,9 @@
           <a:bodyPr/>
           <a:lstStyle/>
           <a:p>
-            <a:fld id="{75B7C00E-9EAE-46FD-9540-156265FB12BC}" type="slidenum">
+            <a:fld id="{69FC0A38-DBDE-460A-8530-8E0C13833A00}" type="slidenum">
               <a:rPr lang="en-US" smtClean="0"/>
-              <a:t>11</a:t>
+              <a:t>10</a:t>
             </a:fld>
             <a:endParaRPr lang="en-US"/>
           </a:p>
@@ -957,7 +977,7 @@
     </p:spTree>
     <p:extLst>
       <p:ext uri="{BB962C8B-B14F-4D97-AF65-F5344CB8AC3E}">
-        <p14:creationId xmlns:p14="http://schemas.microsoft.com/office/powerpoint/2010/main" val="239069557"/>
+        <p14:creationId xmlns:p14="http://schemas.microsoft.com/office/powerpoint/2010/main" val="1885339392"/>
       </p:ext>
     </p:extLst>
   </p:cSld>
@@ -1011,227 +1031,19 @@
           <a:bodyPr/>
           <a:lstStyle/>
           <a:p>
-            <a:pPr marL="0" marR="0" lvl="0" indent="0" algn="l" defTabSz="914400" rtl="0" eaLnBrk="1" fontAlgn="auto" latinLnBrk="0" hangingPunct="1">
-              <a:lnSpc>
-                <a:spcPct val="100000"/>
-              </a:lnSpc>
-              <a:spcBef>
-                <a:spcPts val="0"/>
-              </a:spcBef>
-              <a:spcAft>
-                <a:spcPts val="0"/>
-              </a:spcAft>
-              <a:buClrTx/>
-              <a:buSzTx/>
-              <a:buFontTx/>
-              <a:buNone/>
-              <a:tabLst/>
-              <a:defRPr/>
-            </a:pPr>
-            <a:r>
-              <a:rPr lang="en-US" sz="1200" kern="1200" dirty="0">
-                <a:solidFill>
-                  <a:schemeClr val="tx1"/>
-                </a:solidFill>
-                <a:effectLst/>
-                <a:latin typeface="+mn-lt"/>
-                <a:ea typeface="+mn-ea"/>
-                <a:cs typeface="+mn-cs"/>
-              </a:rPr>
-              <a:t>Couple of lines of particular interest:</a:t>
-            </a:r>
-          </a:p>
-          <a:p>
-            <a:pPr marL="228600" marR="0" lvl="0" indent="-228600" algn="l" defTabSz="914400" rtl="0" eaLnBrk="1" fontAlgn="auto" latinLnBrk="0" hangingPunct="1">
-              <a:lnSpc>
-                <a:spcPct val="100000"/>
-              </a:lnSpc>
-              <a:spcBef>
-                <a:spcPts val="0"/>
-              </a:spcBef>
-              <a:spcAft>
-                <a:spcPts val="0"/>
-              </a:spcAft>
-              <a:buClrTx/>
-              <a:buSzTx/>
-              <a:buFont typeface="+mj-lt"/>
-              <a:buAutoNum type="arabicPeriod"/>
-              <a:tabLst/>
-              <a:defRPr/>
-            </a:pPr>
-            <a:r>
-              <a:rPr lang="en-US" sz="1200" kern="1200" dirty="0">
-                <a:solidFill>
-                  <a:schemeClr val="tx1"/>
-                </a:solidFill>
-                <a:effectLst/>
-                <a:latin typeface="+mn-lt"/>
-                <a:ea typeface="+mn-ea"/>
-                <a:cs typeface="+mn-cs"/>
-              </a:rPr>
-              <a:t>The purple ‘cheating’ line is what we get if we order people by their true status—we put everyone who was in fact hospitalized up to the beginning of the line, and have godlike, perfect ‘prediction’.  That represents the absolute best that any predictor could possibly do.  Nobody is in that neighborhood—not even ACG.</a:t>
-            </a:r>
-          </a:p>
-          <a:p>
-            <a:pPr marL="228600" marR="0" lvl="0" indent="-228600" algn="l" defTabSz="914400" rtl="0" eaLnBrk="1" fontAlgn="auto" latinLnBrk="0" hangingPunct="1">
-              <a:lnSpc>
-                <a:spcPct val="100000"/>
-              </a:lnSpc>
-              <a:spcBef>
-                <a:spcPts val="0"/>
-              </a:spcBef>
-              <a:spcAft>
-                <a:spcPts val="0"/>
-              </a:spcAft>
-              <a:buClrTx/>
-              <a:buSzTx/>
-              <a:buFont typeface="+mj-lt"/>
-              <a:buAutoNum type="arabicPeriod"/>
-              <a:tabLst/>
-              <a:defRPr/>
-            </a:pPr>
-            <a:r>
-              <a:rPr lang="en-US" sz="1200" kern="1200" dirty="0">
-                <a:solidFill>
-                  <a:schemeClr val="tx1"/>
-                </a:solidFill>
-                <a:effectLst/>
-                <a:latin typeface="+mn-lt"/>
-                <a:ea typeface="+mn-ea"/>
-                <a:cs typeface="+mn-cs"/>
-              </a:rPr>
-              <a:t>The dull yellow-green 45-degree line in the middle is what we get if we order people randomly.  That’s what we should expect to see from a complete bullshit, snake-oil predictor.  Astoundingly, Naïve Bayes manages to be worse than this.  Possibly I’m using it incorrectly somehow—not sure.</a:t>
-            </a:r>
-          </a:p>
-          <a:p>
-            <a:pPr marL="228600" marR="0" lvl="0" indent="-228600" algn="l" defTabSz="914400" rtl="0" eaLnBrk="1" fontAlgn="auto" latinLnBrk="0" hangingPunct="1">
-              <a:lnSpc>
-                <a:spcPct val="100000"/>
-              </a:lnSpc>
-              <a:spcBef>
-                <a:spcPts val="0"/>
-              </a:spcBef>
-              <a:spcAft>
-                <a:spcPts val="0"/>
-              </a:spcAft>
-              <a:buClrTx/>
-              <a:buSzTx/>
-              <a:buFont typeface="+mj-lt"/>
-              <a:buAutoNum type="arabicPeriod"/>
-              <a:tabLst/>
-              <a:defRPr/>
-            </a:pPr>
-            <a:r>
-              <a:rPr lang="en-US" sz="1200" kern="1200" dirty="0">
-                <a:solidFill>
-                  <a:schemeClr val="tx1"/>
-                </a:solidFill>
-                <a:effectLst/>
-                <a:latin typeface="+mn-lt"/>
-                <a:ea typeface="+mn-ea"/>
-                <a:cs typeface="+mn-cs"/>
-              </a:rPr>
-              <a:t>The turquoise line is of course ACG—that’s what we’re shooting at. It’s a pretty clear favorite over the entire range of the development sample here.  Pre-2,500 people there are two candidates that give ACG a run for its money, but after that ACG pulls away.</a:t>
-            </a:r>
-          </a:p>
-          <a:p>
-            <a:pPr marL="228600" marR="0" lvl="0" indent="-228600" algn="l" defTabSz="914400" rtl="0" eaLnBrk="1" fontAlgn="auto" latinLnBrk="0" hangingPunct="1">
-              <a:lnSpc>
-                <a:spcPct val="100000"/>
-              </a:lnSpc>
-              <a:spcBef>
-                <a:spcPts val="0"/>
-              </a:spcBef>
-              <a:spcAft>
-                <a:spcPts val="0"/>
-              </a:spcAft>
-              <a:buClrTx/>
-              <a:buSzTx/>
-              <a:buFont typeface="+mj-lt"/>
-              <a:buAutoNum type="arabicPeriod"/>
-              <a:tabLst/>
-              <a:defRPr/>
-            </a:pPr>
-            <a:r>
-              <a:rPr lang="en-US" sz="1200" kern="1200" dirty="0">
-                <a:solidFill>
-                  <a:schemeClr val="tx1"/>
-                </a:solidFill>
-                <a:effectLst/>
-                <a:latin typeface="+mn-lt"/>
-                <a:ea typeface="+mn-ea"/>
-                <a:cs typeface="+mn-cs"/>
-              </a:rPr>
-              <a:t>BUT! On the left hand side of the axis, we have two candidate scores that look pretty darn good—SVC and Random Forest.  That’s a pretty important part of the graph actually, because just like you don’t normally have time to page through the 2d, 3</a:t>
-            </a:r>
-            <a:r>
-              <a:rPr lang="en-US" sz="1200" kern="1200" baseline="30000" dirty="0">
-                <a:solidFill>
-                  <a:schemeClr val="tx1"/>
-                </a:solidFill>
-                <a:effectLst/>
-                <a:latin typeface="+mn-lt"/>
-                <a:ea typeface="+mn-ea"/>
-                <a:cs typeface="+mn-cs"/>
-              </a:rPr>
-              <a:t>rd</a:t>
-            </a:r>
-            <a:r>
-              <a:rPr lang="en-US" sz="1200" kern="1200" dirty="0">
-                <a:solidFill>
-                  <a:schemeClr val="tx1"/>
-                </a:solidFill>
-                <a:effectLst/>
-                <a:latin typeface="+mn-lt"/>
-                <a:ea typeface="+mn-ea"/>
-                <a:cs typeface="+mn-cs"/>
-              </a:rPr>
-              <a:t>, 4</a:t>
-            </a:r>
-            <a:r>
-              <a:rPr lang="en-US" sz="1200" kern="1200" baseline="30000" dirty="0">
-                <a:solidFill>
-                  <a:schemeClr val="tx1"/>
-                </a:solidFill>
-                <a:effectLst/>
-                <a:latin typeface="+mn-lt"/>
-                <a:ea typeface="+mn-ea"/>
-                <a:cs typeface="+mn-cs"/>
-              </a:rPr>
-              <a:t>th</a:t>
-            </a:r>
-            <a:r>
-              <a:rPr lang="en-US" sz="1200" kern="1200" dirty="0">
-                <a:solidFill>
-                  <a:schemeClr val="tx1"/>
-                </a:solidFill>
-                <a:effectLst/>
-                <a:latin typeface="+mn-lt"/>
-                <a:ea typeface="+mn-ea"/>
-                <a:cs typeface="+mn-cs"/>
-              </a:rPr>
-              <a:t> pages of google results that you get on a search, CM folks don’t have time to get involved with 2500 people. So all is not lost here. If we can deliver say, the top 300 people most likely to be hospitalized, we’ve got a win.</a:t>
-            </a:r>
-          </a:p>
-          <a:p>
-            <a:pPr marL="228600" marR="0" lvl="0" indent="-228600" algn="l" defTabSz="914400" rtl="0" eaLnBrk="1" fontAlgn="auto" latinLnBrk="0" hangingPunct="1">
-              <a:lnSpc>
-                <a:spcPct val="100000"/>
-              </a:lnSpc>
-              <a:spcBef>
-                <a:spcPts val="0"/>
-              </a:spcBef>
-              <a:spcAft>
-                <a:spcPts val="0"/>
-              </a:spcAft>
-              <a:buClrTx/>
-              <a:buSzTx/>
-              <a:buFont typeface="+mj-lt"/>
-              <a:buAutoNum type="arabicPeriod"/>
-              <a:tabLst/>
-              <a:defRPr/>
-            </a:pPr>
+            <a:r>
+              <a:rPr lang="en-US" dirty="0"/>
+              <a:t>A good predictor will pack the head of the line with people who were in fact hospitalized.</a:t>
+            </a:r>
+          </a:p>
+          <a:p>
             <a:endParaRPr lang="en-US" dirty="0"/>
+          </a:p>
+          <a:p>
+            <a:r>
+              <a:rPr lang="en-US" dirty="0"/>
+              <a:t>(Would it be enough to say “number needed to treat” here?)</a:t>
+            </a:r>
           </a:p>
         </p:txBody>
       </p:sp>
@@ -1250,9 +1062,9 @@
           <a:bodyPr/>
           <a:lstStyle/>
           <a:p>
-            <a:fld id="{69FC0A38-DBDE-460A-8530-8E0C13833A00}" type="slidenum">
+            <a:fld id="{75B7C00E-9EAE-46FD-9540-156265FB12BC}" type="slidenum">
               <a:rPr lang="en-US" smtClean="0"/>
-              <a:t>12</a:t>
+              <a:t>11</a:t>
             </a:fld>
             <a:endParaRPr lang="en-US"/>
           </a:p>
@@ -1261,7 +1073,7 @@
     </p:spTree>
     <p:extLst>
       <p:ext uri="{BB962C8B-B14F-4D97-AF65-F5344CB8AC3E}">
-        <p14:creationId xmlns:p14="http://schemas.microsoft.com/office/powerpoint/2010/main" val="3013002786"/>
+        <p14:creationId xmlns:p14="http://schemas.microsoft.com/office/powerpoint/2010/main" val="239069557"/>
       </p:ext>
     </p:extLst>
   </p:cSld>
@@ -1315,35 +1127,226 @@
           <a:bodyPr/>
           <a:lstStyle/>
           <a:p>
-            <a:r>
-              <a:rPr lang="en-US" dirty="0"/>
-              <a:t>Support Vector classifier beats ACG over this whole range!</a:t>
-            </a:r>
-          </a:p>
-          <a:p>
-            <a:r>
-              <a:rPr lang="en-US" dirty="0"/>
-              <a:t>Random Forest is ahead for the first 135 people or so.</a:t>
-            </a:r>
-          </a:p>
-          <a:p>
-            <a:r>
-              <a:rPr lang="en-US" dirty="0"/>
-              <a:t>Both are worthy alternatives to ACG.</a:t>
-            </a:r>
-          </a:p>
-          <a:p>
-            <a:endParaRPr lang="en-US" dirty="0"/>
-          </a:p>
-          <a:p>
-            <a:r>
-              <a:rPr lang="en-US" dirty="0"/>
-              <a:t>This looks like success to me, and it’s likely that we could improve </a:t>
-            </a:r>
-            <a:r>
-              <a:rPr lang="en-US"/>
-              <a:t>this significantly from here.</a:t>
-            </a:r>
+            <a:pPr marL="0" marR="0" lvl="0" indent="0" algn="l" defTabSz="914400" rtl="0" eaLnBrk="1" fontAlgn="auto" latinLnBrk="0" hangingPunct="1">
+              <a:lnSpc>
+                <a:spcPct val="100000"/>
+              </a:lnSpc>
+              <a:spcBef>
+                <a:spcPts val="0"/>
+              </a:spcBef>
+              <a:spcAft>
+                <a:spcPts val="0"/>
+              </a:spcAft>
+              <a:buClrTx/>
+              <a:buSzTx/>
+              <a:buFontTx/>
+              <a:buNone/>
+              <a:tabLst/>
+              <a:defRPr/>
+            </a:pPr>
+            <a:r>
+              <a:rPr lang="en-US" sz="1200" kern="1200" dirty="0">
+                <a:solidFill>
+                  <a:schemeClr val="tx1"/>
+                </a:solidFill>
+                <a:effectLst/>
+                <a:latin typeface="+mn-lt"/>
+                <a:ea typeface="+mn-ea"/>
+                <a:cs typeface="+mn-cs"/>
+              </a:rPr>
+              <a:t>Couple of lines of particular interest:</a:t>
+            </a:r>
+          </a:p>
+          <a:p>
+            <a:pPr marL="228600" marR="0" lvl="0" indent="-228600" algn="l" defTabSz="914400" rtl="0" eaLnBrk="1" fontAlgn="auto" latinLnBrk="0" hangingPunct="1">
+              <a:lnSpc>
+                <a:spcPct val="100000"/>
+              </a:lnSpc>
+              <a:spcBef>
+                <a:spcPts val="0"/>
+              </a:spcBef>
+              <a:spcAft>
+                <a:spcPts val="0"/>
+              </a:spcAft>
+              <a:buClrTx/>
+              <a:buSzTx/>
+              <a:buFont typeface="+mj-lt"/>
+              <a:buAutoNum type="arabicPeriod"/>
+              <a:tabLst/>
+              <a:defRPr/>
+            </a:pPr>
+            <a:r>
+              <a:rPr lang="en-US" sz="1200" kern="1200" dirty="0">
+                <a:solidFill>
+                  <a:schemeClr val="tx1"/>
+                </a:solidFill>
+                <a:effectLst/>
+                <a:latin typeface="+mn-lt"/>
+                <a:ea typeface="+mn-ea"/>
+                <a:cs typeface="+mn-cs"/>
+              </a:rPr>
+              <a:t>The purple ‘cheating’ line is what we get if we order people by their true status—we put everyone who was in fact hospitalized up to the beginning of the line, and have godlike, perfect ‘prediction’.  That represents the absolute best that any predictor could possibly do.  Nobody is in that neighborhood—not even ACG.</a:t>
+            </a:r>
+          </a:p>
+          <a:p>
+            <a:pPr marL="228600" marR="0" lvl="0" indent="-228600" algn="l" defTabSz="914400" rtl="0" eaLnBrk="1" fontAlgn="auto" latinLnBrk="0" hangingPunct="1">
+              <a:lnSpc>
+                <a:spcPct val="100000"/>
+              </a:lnSpc>
+              <a:spcBef>
+                <a:spcPts val="0"/>
+              </a:spcBef>
+              <a:spcAft>
+                <a:spcPts val="0"/>
+              </a:spcAft>
+              <a:buClrTx/>
+              <a:buSzTx/>
+              <a:buFont typeface="+mj-lt"/>
+              <a:buAutoNum type="arabicPeriod"/>
+              <a:tabLst/>
+              <a:defRPr/>
+            </a:pPr>
+            <a:r>
+              <a:rPr lang="en-US" sz="1200" kern="1200" dirty="0">
+                <a:solidFill>
+                  <a:schemeClr val="tx1"/>
+                </a:solidFill>
+                <a:effectLst/>
+                <a:latin typeface="+mn-lt"/>
+                <a:ea typeface="+mn-ea"/>
+                <a:cs typeface="+mn-cs"/>
+              </a:rPr>
+              <a:t>The dull yellow-green 45-degree line in the middle is what we get if we order people randomly.  That’s what we should expect to see from a complete bullshit, snake-oil predictor.  Astoundingly, Naïve Bayes manages to be worse than this.  Possibly we’re using it incorrectly somehow—not sure.</a:t>
+            </a:r>
+          </a:p>
+          <a:p>
+            <a:pPr marL="228600" marR="0" lvl="0" indent="-228600" algn="l" defTabSz="914400" rtl="0" eaLnBrk="1" fontAlgn="auto" latinLnBrk="0" hangingPunct="1">
+              <a:lnSpc>
+                <a:spcPct val="100000"/>
+              </a:lnSpc>
+              <a:spcBef>
+                <a:spcPts val="0"/>
+              </a:spcBef>
+              <a:spcAft>
+                <a:spcPts val="0"/>
+              </a:spcAft>
+              <a:buClrTx/>
+              <a:buSzTx/>
+              <a:buFont typeface="+mj-lt"/>
+              <a:buAutoNum type="arabicPeriod"/>
+              <a:tabLst/>
+              <a:defRPr/>
+            </a:pPr>
+            <a:r>
+              <a:rPr lang="en-US" sz="1200" kern="1200" dirty="0">
+                <a:solidFill>
+                  <a:schemeClr val="tx1"/>
+                </a:solidFill>
+                <a:effectLst/>
+                <a:latin typeface="+mn-lt"/>
+                <a:ea typeface="+mn-ea"/>
+                <a:cs typeface="+mn-cs"/>
+              </a:rPr>
+              <a:t>The turquoise line is of course ACG—that’s what we’re shooting at. It’s a pretty clear favorite over the entire range of the development sample here.  Pre-2,500 people there are two candidates that give ACG a run for its money, but after that ACG pulls away.</a:t>
+            </a:r>
+          </a:p>
+          <a:p>
+            <a:pPr marL="228600" marR="0" lvl="0" indent="-228600" algn="l" defTabSz="914400" rtl="0" eaLnBrk="1" fontAlgn="auto" latinLnBrk="0" hangingPunct="1">
+              <a:lnSpc>
+                <a:spcPct val="100000"/>
+              </a:lnSpc>
+              <a:spcBef>
+                <a:spcPts val="0"/>
+              </a:spcBef>
+              <a:spcAft>
+                <a:spcPts val="0"/>
+              </a:spcAft>
+              <a:buClrTx/>
+              <a:buSzTx/>
+              <a:buFont typeface="+mj-lt"/>
+              <a:buAutoNum type="arabicPeriod"/>
+              <a:tabLst/>
+              <a:defRPr/>
+            </a:pPr>
+            <a:r>
+              <a:rPr lang="en-US" sz="1200" kern="1200" dirty="0">
+                <a:solidFill>
+                  <a:schemeClr val="tx1"/>
+                </a:solidFill>
+                <a:effectLst/>
+                <a:latin typeface="+mn-lt"/>
+                <a:ea typeface="+mn-ea"/>
+                <a:cs typeface="+mn-cs"/>
+              </a:rPr>
+              <a:t>BUT! On the left hand side of the axis, we have two candidate scores that look pretty darn good—Support Vector Classifier and Random Forest.  That’s a pretty important part of the graph actually, because just like you don’t normally have time to page through the 2d, 3</a:t>
+            </a:r>
+            <a:r>
+              <a:rPr lang="en-US" sz="1200" kern="1200" baseline="30000" dirty="0">
+                <a:solidFill>
+                  <a:schemeClr val="tx1"/>
+                </a:solidFill>
+                <a:effectLst/>
+                <a:latin typeface="+mn-lt"/>
+                <a:ea typeface="+mn-ea"/>
+                <a:cs typeface="+mn-cs"/>
+              </a:rPr>
+              <a:t>rd</a:t>
+            </a:r>
+            <a:r>
+              <a:rPr lang="en-US" sz="1200" kern="1200" dirty="0">
+                <a:solidFill>
+                  <a:schemeClr val="tx1"/>
+                </a:solidFill>
+                <a:effectLst/>
+                <a:latin typeface="+mn-lt"/>
+                <a:ea typeface="+mn-ea"/>
+                <a:cs typeface="+mn-cs"/>
+              </a:rPr>
+              <a:t>, 4</a:t>
+            </a:r>
+            <a:r>
+              <a:rPr lang="en-US" sz="1200" kern="1200" baseline="30000" dirty="0">
+                <a:solidFill>
+                  <a:schemeClr val="tx1"/>
+                </a:solidFill>
+                <a:effectLst/>
+                <a:latin typeface="+mn-lt"/>
+                <a:ea typeface="+mn-ea"/>
+                <a:cs typeface="+mn-cs"/>
+              </a:rPr>
+              <a:t>th</a:t>
+            </a:r>
+            <a:r>
+              <a:rPr lang="en-US" sz="1200" kern="1200" dirty="0">
+                <a:solidFill>
+                  <a:schemeClr val="tx1"/>
+                </a:solidFill>
+                <a:effectLst/>
+                <a:latin typeface="+mn-lt"/>
+                <a:ea typeface="+mn-ea"/>
+                <a:cs typeface="+mn-cs"/>
+              </a:rPr>
+              <a:t> pages of google results that you get on a search, CM folks don’t have time to get involved with 2500 people. So all is not lost here. If we can deliver say, the top 300 people most likely to be hospitalized, we’ve got a win.</a:t>
+            </a:r>
+          </a:p>
+          <a:p>
+            <a:pPr marL="228600" marR="0" lvl="0" indent="-228600" algn="l" defTabSz="914400" rtl="0" eaLnBrk="1" fontAlgn="auto" latinLnBrk="0" hangingPunct="1">
+              <a:lnSpc>
+                <a:spcPct val="100000"/>
+              </a:lnSpc>
+              <a:spcBef>
+                <a:spcPts val="0"/>
+              </a:spcBef>
+              <a:spcAft>
+                <a:spcPts val="0"/>
+              </a:spcAft>
+              <a:buClrTx/>
+              <a:buSzTx/>
+              <a:buFont typeface="+mj-lt"/>
+              <a:buAutoNum type="arabicPeriod"/>
+              <a:tabLst/>
+              <a:defRPr/>
+            </a:pPr>
             <a:endParaRPr lang="en-US" dirty="0"/>
           </a:p>
         </p:txBody>
@@ -1365,7 +1368,7 @@
           <a:p>
             <a:fld id="{69FC0A38-DBDE-460A-8530-8E0C13833A00}" type="slidenum">
               <a:rPr lang="en-US" smtClean="0"/>
-              <a:t>13</a:t>
+              <a:t>12</a:t>
             </a:fld>
             <a:endParaRPr lang="en-US"/>
           </a:p>
@@ -1374,7 +1377,7 @@
     </p:spTree>
     <p:extLst>
       <p:ext uri="{BB962C8B-B14F-4D97-AF65-F5344CB8AC3E}">
-        <p14:creationId xmlns:p14="http://schemas.microsoft.com/office/powerpoint/2010/main" val="1608744341"/>
+        <p14:creationId xmlns:p14="http://schemas.microsoft.com/office/powerpoint/2010/main" val="3013002786"/>
       </p:ext>
     </p:extLst>
   </p:cSld>
@@ -1430,7 +1433,28 @@
           <a:p>
             <a:r>
               <a:rPr lang="en-US" dirty="0"/>
-              <a:t>Machine was Intel Core i-7 w/16GB of Ram, running 64-bit Windows 7.</a:t>
+              <a:t>Support Vector classifier beats ACG over this whole range!</a:t>
+            </a:r>
+          </a:p>
+          <a:p>
+            <a:r>
+              <a:rPr lang="en-US" dirty="0"/>
+              <a:t>Random Forest is ahead for the first 135 people or so.</a:t>
+            </a:r>
+          </a:p>
+          <a:p>
+            <a:r>
+              <a:rPr lang="en-US" dirty="0"/>
+              <a:t>Both are worthy alternatives to ACG.</a:t>
+            </a:r>
+          </a:p>
+          <a:p>
+            <a:endParaRPr lang="en-US" dirty="0"/>
+          </a:p>
+          <a:p>
+            <a:r>
+              <a:rPr lang="en-US" dirty="0"/>
+              <a:t>This looks like success to me, and it’s likely that we could improve this significantly from here if we spent more time/added more data.</a:t>
             </a:r>
           </a:p>
         </p:txBody>
@@ -1450,9 +1474,9 @@
           <a:bodyPr/>
           <a:lstStyle/>
           <a:p>
-            <a:fld id="{75B7C00E-9EAE-46FD-9540-156265FB12BC}" type="slidenum">
+            <a:fld id="{69FC0A38-DBDE-460A-8530-8E0C13833A00}" type="slidenum">
               <a:rPr lang="en-US" smtClean="0"/>
-              <a:t>14</a:t>
+              <a:t>13</a:t>
             </a:fld>
             <a:endParaRPr lang="en-US"/>
           </a:p>
@@ -1461,7 +1485,7 @@
     </p:spTree>
     <p:extLst>
       <p:ext uri="{BB962C8B-B14F-4D97-AF65-F5344CB8AC3E}">
-        <p14:creationId xmlns:p14="http://schemas.microsoft.com/office/powerpoint/2010/main" val="3292949616"/>
+        <p14:creationId xmlns:p14="http://schemas.microsoft.com/office/powerpoint/2010/main" val="1608744341"/>
       </p:ext>
     </p:extLst>
   </p:cSld>
@@ -1517,7 +1541,7 @@
           <a:p>
             <a:r>
               <a:rPr lang="en-US" dirty="0"/>
-              <a:t>Unfortunately it’s not clear I’ll get to do any of this—LHS leadership was not enthusiastic about it, for reasons I still don’t understand.</a:t>
+              <a:t>Machine was Intel Core i-7 w/16GB of Ram, running 64-bit Windows 7.</a:t>
             </a:r>
           </a:p>
         </p:txBody>
@@ -1537,9 +1561,9 @@
           <a:bodyPr/>
           <a:lstStyle/>
           <a:p>
-            <a:fld id="{69FC0A38-DBDE-460A-8530-8E0C13833A00}" type="slidenum">
+            <a:fld id="{75B7C00E-9EAE-46FD-9540-156265FB12BC}" type="slidenum">
               <a:rPr lang="en-US" smtClean="0"/>
-              <a:t>15</a:t>
+              <a:t>14</a:t>
             </a:fld>
             <a:endParaRPr lang="en-US"/>
           </a:p>
@@ -1548,7 +1572,7 @@
     </p:spTree>
     <p:extLst>
       <p:ext uri="{BB962C8B-B14F-4D97-AF65-F5344CB8AC3E}">
-        <p14:creationId xmlns:p14="http://schemas.microsoft.com/office/powerpoint/2010/main" val="14512803"/>
+        <p14:creationId xmlns:p14="http://schemas.microsoft.com/office/powerpoint/2010/main" val="3292949616"/>
       </p:ext>
     </p:extLst>
   </p:cSld>
@@ -1635,7 +1659,7 @@
           <a:p>
             <a:fld id="{75B7C00E-9EAE-46FD-9540-156265FB12BC}" type="slidenum">
               <a:rPr lang="en-US" smtClean="0"/>
-              <a:t>16</a:t>
+              <a:t>15</a:t>
             </a:fld>
             <a:endParaRPr lang="en-US"/>
           </a:p>
@@ -1700,7 +1724,7 @@
           <a:p>
             <a:r>
               <a:rPr lang="en-US" dirty="0"/>
-              <a:t>https://www.hopkinsacg.org/ </a:t>
+              <a:t>Unfortunately it’s not clear I’ll get to do any of this—LHS leadership was not enthusiastic about it, for reasons I still don’t understand.</a:t>
             </a:r>
           </a:p>
         </p:txBody>
@@ -1720,9 +1744,9 @@
           <a:bodyPr/>
           <a:lstStyle/>
           <a:p>
-            <a:fld id="{75B7C00E-9EAE-46FD-9540-156265FB12BC}" type="slidenum">
+            <a:fld id="{69FC0A38-DBDE-460A-8530-8E0C13833A00}" type="slidenum">
               <a:rPr lang="en-US" smtClean="0"/>
-              <a:t>17</a:t>
+              <a:t>16</a:t>
             </a:fld>
             <a:endParaRPr lang="en-US"/>
           </a:p>
@@ -1731,7 +1755,7 @@
     </p:spTree>
     <p:extLst>
       <p:ext uri="{BB962C8B-B14F-4D97-AF65-F5344CB8AC3E}">
-        <p14:creationId xmlns:p14="http://schemas.microsoft.com/office/powerpoint/2010/main" val="1471927266"/>
+        <p14:creationId xmlns:p14="http://schemas.microsoft.com/office/powerpoint/2010/main" val="14512803"/>
       </p:ext>
     </p:extLst>
   </p:cSld>
@@ -1817,7 +1841,7 @@
           <a:p>
             <a:fld id="{75B7C00E-9EAE-46FD-9540-156265FB12BC}" type="slidenum">
               <a:rPr lang="en-US" smtClean="0"/>
-              <a:t>18</a:t>
+              <a:t>17</a:t>
             </a:fld>
             <a:endParaRPr lang="en-US"/>
           </a:p>
@@ -1937,7 +1961,7 @@
           <a:p>
             <a:fld id="{69FC0A38-DBDE-460A-8530-8E0C13833A00}" type="slidenum">
               <a:rPr lang="en-US" smtClean="0"/>
-              <a:t>19</a:t>
+              <a:t>18</a:t>
             </a:fld>
             <a:endParaRPr lang="en-US"/>
           </a:p>
@@ -2033,7 +2057,7 @@
           <a:p>
             <a:fld id="{69FC0A38-DBDE-460A-8530-8E0C13833A00}" type="slidenum">
               <a:rPr lang="en-US" smtClean="0"/>
-              <a:t>20</a:t>
+              <a:t>19</a:t>
             </a:fld>
             <a:endParaRPr lang="en-US"/>
           </a:p>
@@ -2098,7 +2122,24 @@
           <a:p>
             <a:r>
               <a:rPr lang="en-US" dirty="0"/>
-              <a:t>Ask anybody.</a:t>
+              <a:t>(</a:t>
+            </a:r>
+            <a:r>
+              <a:rPr lang="en-US" dirty="0" err="1"/>
+              <a:t>Gonna</a:t>
+            </a:r>
+            <a:r>
+              <a:rPr lang="en-US" dirty="0"/>
+              <a:t> give the ‘why’ before the ‘how’.)</a:t>
+            </a:r>
+          </a:p>
+          <a:p>
+            <a:endParaRPr lang="en-US" dirty="0"/>
+          </a:p>
+          <a:p>
+            <a:r>
+              <a:rPr lang="en-US" dirty="0"/>
+              <a:t>Surely, none of you are going to escape the hype that I’m about to lay down here.</a:t>
             </a:r>
           </a:p>
           <a:p>
@@ -2384,37 +2425,17 @@
           <a:lstStyle/>
           <a:p>
             <a:r>
-              <a:rPr lang="en-US" dirty="0"/>
-              <a:t>https://www.hopkinsacg.org/</a:t>
-            </a:r>
-          </a:p>
-          <a:p>
-            <a:endParaRPr lang="en-US" dirty="0"/>
-          </a:p>
-          <a:p>
-            <a:r>
-              <a:rPr lang="en-US" dirty="0"/>
-              <a:t>Context for this was our Learning Health System initiative, which is in part a collaboration between the Research Institute and the Health Plan @ </a:t>
-            </a:r>
-            <a:r>
-              <a:rPr lang="en-US" dirty="0" err="1"/>
-              <a:t>KaPoW</a:t>
-            </a:r>
-            <a:r>
-              <a:rPr lang="en-US" dirty="0"/>
-              <a:t>.  I was brought on to wrangle data generally.</a:t>
-            </a:r>
-          </a:p>
-          <a:p>
-            <a:endParaRPr lang="en-US" dirty="0"/>
-          </a:p>
-          <a:p>
-            <a:r>
-              <a:rPr lang="en-US" dirty="0"/>
-              <a:t>BTW—I do not mean to impugn the usefulness of ACG—it is definitely useful.</a:t>
-            </a:r>
-          </a:p>
-          <a:p>
+              <a:rPr lang="en-US" sz="1200" b="0" i="0" kern="1200" dirty="0">
+                <a:solidFill>
+                  <a:schemeClr val="tx1"/>
+                </a:solidFill>
+                <a:effectLst/>
+                <a:latin typeface="+mn-lt"/>
+                <a:ea typeface="+mn-ea"/>
+                <a:cs typeface="+mn-cs"/>
+              </a:rPr>
+              <a:t>KPWA’s Complex Case Management program “coordinates the care and services of members with multiple chronic conditions and complicated medical/social needs often resulting in the extensive use of resources. The CCM program is designed to comply with the standards set for the by the National Committee on Quality Assurance (NCQA) and is integral to the accreditation for the health plan. The RN case managers are at minimum bachelor’s level educated and are certified by the Commission for Case Management Certification (CCMC). The social work case managers are licensed independent clinical social workers (LICSW).”</a:t>
+            </a:r>
             <a:endParaRPr lang="en-US" dirty="0"/>
           </a:p>
         </p:txBody>
@@ -2445,7 +2466,7 @@
     </p:spTree>
     <p:extLst>
       <p:ext uri="{BB962C8B-B14F-4D97-AF65-F5344CB8AC3E}">
-        <p14:creationId xmlns:p14="http://schemas.microsoft.com/office/powerpoint/2010/main" val="159832763"/>
+        <p14:creationId xmlns:p14="http://schemas.microsoft.com/office/powerpoint/2010/main" val="1471927266"/>
       </p:ext>
     </p:extLst>
   </p:cSld>
@@ -2501,7 +2522,7 @@
           <a:p>
             <a:r>
               <a:rPr lang="en-US" dirty="0"/>
-              <a:t>Note that we’re using 9 fewer months than ACG.  That was an arbitrary decision on my part—it’s very possible I would have gotten around to extending that if my results weren’t so good.</a:t>
+              <a:t>https://www.hopkinsacg.org/</a:t>
             </a:r>
           </a:p>
           <a:p>
@@ -2510,7 +2531,15 @@
           <a:p>
             <a:r>
               <a:rPr lang="en-US" dirty="0"/>
-              <a:t>Ironically(?) I used ACG’s assessment of those 3 conditions to identify the cohort.</a:t>
+              <a:t>Context for this was our Learning Health System initiative, which is in part a collaboration between the Research Institute and the Health Plan @ </a:t>
+            </a:r>
+            <a:r>
+              <a:rPr lang="en-US" dirty="0" err="1"/>
+              <a:t>KaPoW</a:t>
+            </a:r>
+            <a:r>
+              <a:rPr lang="en-US" dirty="0"/>
+              <a:t>.  I was brought on to wrangle data generally.</a:t>
             </a:r>
           </a:p>
           <a:p>
@@ -2519,33 +2548,11 @@
           <a:p>
             <a:r>
               <a:rPr lang="en-US" dirty="0"/>
-              <a:t>Note how indiscriminate I am about the data that go into the modeling. The vast majority of that will be irrelevant. The Data Science Way is to let the rock tumbler of machine learning sort the wheat from the chaff.</a:t>
+              <a:t>BTW—I do not mean to impugn the usefulness of ACG—it is definitely useful.</a:t>
             </a:r>
           </a:p>
           <a:p>
             <a:endParaRPr lang="en-US" dirty="0"/>
-          </a:p>
-          <a:p>
-            <a:r>
-              <a:rPr lang="en-US" dirty="0"/>
-              <a:t>Details on both cohort definition &amp; feature assembly can be seen in the program </a:t>
-            </a:r>
-            <a:r>
-              <a:rPr lang="en-US" dirty="0" err="1"/>
-              <a:t>get_features.sas</a:t>
-            </a:r>
-            <a:r>
-              <a:rPr lang="en-US" dirty="0"/>
-              <a:t> in the </a:t>
-            </a:r>
-            <a:r>
-              <a:rPr lang="en-US" dirty="0" err="1"/>
-              <a:t>github</a:t>
-            </a:r>
-            <a:r>
-              <a:rPr lang="en-US" dirty="0"/>
-              <a:t> repository named on the thank-you slide.</a:t>
-            </a:r>
           </a:p>
         </p:txBody>
       </p:sp>
@@ -2575,7 +2582,7 @@
     </p:spTree>
     <p:extLst>
       <p:ext uri="{BB962C8B-B14F-4D97-AF65-F5344CB8AC3E}">
-        <p14:creationId xmlns:p14="http://schemas.microsoft.com/office/powerpoint/2010/main" val="3928074908"/>
+        <p14:creationId xmlns:p14="http://schemas.microsoft.com/office/powerpoint/2010/main" val="159832763"/>
       </p:ext>
     </p:extLst>
   </p:cSld>
@@ -2631,7 +2638,59 @@
           <a:p>
             <a:r>
               <a:rPr lang="en-US" dirty="0"/>
-              <a:t>Dig how brute-force this is.</a:t>
+              <a:t>That inspired me to dip a toe in the Data Science waters.</a:t>
+            </a:r>
+          </a:p>
+          <a:p>
+            <a:endParaRPr lang="en-US" dirty="0"/>
+          </a:p>
+          <a:p>
+            <a:r>
+              <a:rPr lang="en-US" dirty="0"/>
+              <a:t>Note that we’re using 9 fewer months than ACG.  That was an arbitrary decision on our part—it’s very possible we would have gotten around to extending that if my results weren’t so good (and of course nothing stops us from extending it to see if we can get even better).</a:t>
+            </a:r>
+          </a:p>
+          <a:p>
+            <a:endParaRPr lang="en-US" dirty="0"/>
+          </a:p>
+          <a:p>
+            <a:r>
+              <a:rPr lang="en-US" dirty="0"/>
+              <a:t>Ironically(?) we used ACG’s assessment of those 3 conditions to identify the cohort.</a:t>
+            </a:r>
+          </a:p>
+          <a:p>
+            <a:endParaRPr lang="en-US" dirty="0"/>
+          </a:p>
+          <a:p>
+            <a:r>
+              <a:rPr lang="en-US" dirty="0"/>
+              <a:t>Note how indiscriminate we are about the data that go into the modeling. The vast majority of that will be irrelevant. The Data Science Way is to let the rock tumbler of machine learning sort the wheat from the chaff.</a:t>
+            </a:r>
+          </a:p>
+          <a:p>
+            <a:endParaRPr lang="en-US" dirty="0"/>
+          </a:p>
+          <a:p>
+            <a:r>
+              <a:rPr lang="en-US" dirty="0"/>
+              <a:t>Details on both cohort definition &amp; feature assembly can be seen in the program </a:t>
+            </a:r>
+            <a:r>
+              <a:rPr lang="en-US" dirty="0" err="1"/>
+              <a:t>get_features.sas</a:t>
+            </a:r>
+            <a:r>
+              <a:rPr lang="en-US" dirty="0"/>
+              <a:t> in the </a:t>
+            </a:r>
+            <a:r>
+              <a:rPr lang="en-US" dirty="0" err="1"/>
+              <a:t>github</a:t>
+            </a:r>
+            <a:r>
+              <a:rPr lang="en-US" dirty="0"/>
+              <a:t> repository named on the thank-you slide (</a:t>
             </a:r>
           </a:p>
         </p:txBody>
@@ -2653,7 +2712,7 @@
           <a:p>
             <a:fld id="{75B7C00E-9EAE-46FD-9540-156265FB12BC}" type="slidenum">
               <a:rPr lang="en-US" smtClean="0"/>
-              <a:t>7</a:t>
+              <a:t>6</a:t>
             </a:fld>
             <a:endParaRPr lang="en-US"/>
           </a:p>
@@ -2662,7 +2721,7 @@
     </p:spTree>
     <p:extLst>
       <p:ext uri="{BB962C8B-B14F-4D97-AF65-F5344CB8AC3E}">
-        <p14:creationId xmlns:p14="http://schemas.microsoft.com/office/powerpoint/2010/main" val="4138497965"/>
+        <p14:creationId xmlns:p14="http://schemas.microsoft.com/office/powerpoint/2010/main" val="3928074908"/>
       </p:ext>
     </p:extLst>
   </p:cSld>
@@ -2718,33 +2777,7 @@
           <a:p>
             <a:r>
               <a:rPr lang="en-US" dirty="0"/>
-              <a:t>Ultimately, we need an answer to the question “why should I believe your predictions?”</a:t>
-            </a:r>
-          </a:p>
-          <a:p>
-            <a:endParaRPr lang="en-US" dirty="0"/>
-          </a:p>
-          <a:p>
-            <a:r>
-              <a:rPr lang="en-US" dirty="0"/>
-              <a:t>Harken back to your stats professors railing against stepwise regression.  That was one of the first iterative, automated model selection techniques. The primary reason that was bad was that it involved doing </a:t>
-            </a:r>
-            <a:r>
-              <a:rPr lang="en-US" dirty="0" err="1"/>
-              <a:t>waaaay</a:t>
-            </a:r>
-            <a:r>
-              <a:rPr lang="en-US" dirty="0"/>
-              <a:t> too many significance tests w/out protecting the overall experiment-wise error rate.</a:t>
-            </a:r>
-          </a:p>
-          <a:p>
-            <a:endParaRPr lang="en-US" dirty="0"/>
-          </a:p>
-          <a:p>
-            <a:r>
-              <a:rPr lang="en-US" dirty="0"/>
-              <a:t>For a representative screed against stepwise, see e.g. https://towardsdatascience.com/stopping-stepwise-why-stepwise-selection-is-bad-and-what-you-should-use-instead-90818b3f52df.</a:t>
+              <a:t>Dig how brute-force this is.</a:t>
             </a:r>
           </a:p>
         </p:txBody>
@@ -2764,9 +2797,9 @@
           <a:bodyPr/>
           <a:lstStyle/>
           <a:p>
-            <a:fld id="{69FC0A38-DBDE-460A-8530-8E0C13833A00}" type="slidenum">
+            <a:fld id="{75B7C00E-9EAE-46FD-9540-156265FB12BC}" type="slidenum">
               <a:rPr lang="en-US" smtClean="0"/>
-              <a:t>8</a:t>
+              <a:t>7</a:t>
             </a:fld>
             <a:endParaRPr lang="en-US"/>
           </a:p>
@@ -2775,7 +2808,7 @@
     </p:spTree>
     <p:extLst>
       <p:ext uri="{BB962C8B-B14F-4D97-AF65-F5344CB8AC3E}">
-        <p14:creationId xmlns:p14="http://schemas.microsoft.com/office/powerpoint/2010/main" val="812206298"/>
+        <p14:creationId xmlns:p14="http://schemas.microsoft.com/office/powerpoint/2010/main" val="4138497965"/>
       </p:ext>
     </p:extLst>
   </p:cSld>
@@ -2831,13 +2864,58 @@
           <a:p>
             <a:r>
               <a:rPr lang="en-US" dirty="0"/>
-              <a:t>80% dev and 20% validation.</a:t>
-            </a:r>
+              <a:t>Ultimately, we need an answer to the question “why should I believe your predictions?”</a:t>
+            </a:r>
+          </a:p>
+          <a:p>
+            <a:endParaRPr lang="en-US" dirty="0"/>
+          </a:p>
+          <a:p>
+            <a:pPr marL="0" marR="0" lvl="0" indent="0" algn="l" defTabSz="914400" rtl="0" eaLnBrk="1" fontAlgn="auto" latinLnBrk="0" hangingPunct="1">
+              <a:lnSpc>
+                <a:spcPct val="100000"/>
+              </a:lnSpc>
+              <a:spcBef>
+                <a:spcPts val="0"/>
+              </a:spcBef>
+              <a:spcAft>
+                <a:spcPts val="0"/>
+              </a:spcAft>
+              <a:buClrTx/>
+              <a:buSzTx/>
+              <a:buFontTx/>
+              <a:buNone/>
+              <a:tabLst/>
+              <a:defRPr/>
+            </a:pPr>
+            <a:r>
+              <a:rPr lang="en-US" sz="1200" dirty="0"/>
+              <a:t>In the olden days, you’d have to be </a:t>
+            </a:r>
+            <a:r>
+              <a:rPr lang="en-US" sz="1200" b="1" dirty="0"/>
+              <a:t>very</a:t>
+            </a:r>
+            <a:r>
+              <a:rPr lang="en-US" sz="1200" dirty="0"/>
+              <a:t> stingy with the amount of iterating you could do and still rely on the logic of significance testing to make the argument that your results should generalize to new samples.</a:t>
+            </a:r>
+          </a:p>
+          <a:p>
+            <a:endParaRPr lang="en-US" dirty="0"/>
           </a:p>
           <a:p>
             <a:r>
               <a:rPr lang="en-US" dirty="0"/>
-              <a:t>Note that 12% of our cohort has been hospitalized. These are pretty sick people.</a:t>
+              <a:t>(Harken back to your stats professors railing against stepwise regression.  That was one of the first iterative, automated model selection techniques. The primary reason that was bad was that it involved doing </a:t>
+            </a:r>
+            <a:r>
+              <a:rPr lang="en-US" dirty="0" err="1"/>
+              <a:t>waaaay</a:t>
+            </a:r>
+            <a:r>
+              <a:rPr lang="en-US" dirty="0"/>
+              <a:t> too many significance tests w/out protecting the overall experiment-wise error rate.</a:t>
             </a:r>
           </a:p>
           <a:p>
@@ -2846,24 +2924,7 @@
           <a:p>
             <a:r>
               <a:rPr lang="en-US" dirty="0"/>
-              <a:t>‘Hospitalization’ here excludes accidents &amp; pregnancies—see the list of excluded DRGs starting on line 72 of </a:t>
-            </a:r>
-            <a:r>
-              <a:rPr lang="en-US" dirty="0" err="1"/>
-              <a:t>get_features.sas</a:t>
-            </a:r>
-            <a:r>
-              <a:rPr lang="en-US" dirty="0"/>
-              <a:t>.</a:t>
-            </a:r>
-          </a:p>
-          <a:p>
-            <a:endParaRPr lang="en-US" dirty="0"/>
-          </a:p>
-          <a:p>
-            <a:r>
-              <a:rPr lang="en-US" dirty="0"/>
-              <a:t>So—dev is the playground. We can torture that for as long as we like, commit unspeakable statistical crimes upon it etc.  Validation is our safety net—that’s the basis of our argument later on that whatever we put together to predict in dev will be useful beyond that set of data.</a:t>
+              <a:t>For a representative screed against stepwise, see e.g. https://towardsdatascience.com/stopping-stepwise-why-stepwise-selection-is-bad-and-what-you-should-use-instead-90818b3f52df.)</a:t>
             </a:r>
           </a:p>
         </p:txBody>
@@ -2885,7 +2946,7 @@
           <a:p>
             <a:fld id="{69FC0A38-DBDE-460A-8530-8E0C13833A00}" type="slidenum">
               <a:rPr lang="en-US" smtClean="0"/>
-              <a:t>9</a:t>
+              <a:t>8</a:t>
             </a:fld>
             <a:endParaRPr lang="en-US"/>
           </a:p>
@@ -2894,7 +2955,7 @@
     </p:spTree>
     <p:extLst>
       <p:ext uri="{BB962C8B-B14F-4D97-AF65-F5344CB8AC3E}">
-        <p14:creationId xmlns:p14="http://schemas.microsoft.com/office/powerpoint/2010/main" val="3337520326"/>
+        <p14:creationId xmlns:p14="http://schemas.microsoft.com/office/powerpoint/2010/main" val="812206298"/>
       </p:ext>
     </p:extLst>
   </p:cSld>
@@ -2950,7 +3011,7 @@
           <a:p>
             <a:r>
               <a:rPr lang="en-US" dirty="0"/>
-              <a:t>Here’s the iteration I was talking about.</a:t>
+              <a:t>But we’re data rich now!</a:t>
             </a:r>
           </a:p>
           <a:p>
@@ -2959,7 +3020,13 @@
           <a:p>
             <a:r>
               <a:rPr lang="en-US" dirty="0"/>
-              <a:t>Note that we’re not bringing any actual clinical or even statistical knowledge to bear on this problem.  This is very much a throw-it-against-the-wall-and-see-what-sticks approach.</a:t>
+              <a:t>80% dev and 20% validation.</a:t>
+            </a:r>
+          </a:p>
+          <a:p>
+            <a:r>
+              <a:rPr lang="en-US" dirty="0"/>
+              <a:t>Note that 12% of our cohort has been hospitalized. These are pretty sick people.</a:t>
             </a:r>
           </a:p>
           <a:p>
@@ -2968,15 +3035,15 @@
           <a:p>
             <a:r>
               <a:rPr lang="en-US" dirty="0"/>
-              <a:t>One very nice thing about the </a:t>
+              <a:t>‘Hospitalization’ here excludes accidents &amp; pregnancies—see the list of excluded DRGs starting on line 72 of </a:t>
             </a:r>
             <a:r>
               <a:rPr lang="en-US" dirty="0" err="1"/>
-              <a:t>scikit</a:t>
+              <a:t>get_features.sas</a:t>
             </a:r>
             <a:r>
               <a:rPr lang="en-US" dirty="0"/>
-              <a:t>-learn libs I was able to use is that their interfaces are pretty uniform.  So I was able to write a single function that accepted a generic classifier and the training/test data and would spit out predictions &amp; statistics.</a:t>
+              <a:t>.</a:t>
             </a:r>
           </a:p>
           <a:p>
@@ -2985,7 +3052,7 @@
           <a:p>
             <a:r>
               <a:rPr lang="en-US" dirty="0"/>
-              <a:t>Note also that we don’t touch the validation data in this process at all.  That is our ultimate backstop on overfitting—if we overfit development, validation will smack us upside the head.</a:t>
+              <a:t>So—dev is the playground. We can torture that for as long as we like, commit unspeakable statistical crimes upon it etc.  Validation is our safety net—that’s the basis of our argument later on that whatever we put together to predict in dev will be useful beyond that set of data.</a:t>
             </a:r>
           </a:p>
         </p:txBody>
@@ -3007,7 +3074,7 @@
           <a:p>
             <a:fld id="{69FC0A38-DBDE-460A-8530-8E0C13833A00}" type="slidenum">
               <a:rPr lang="en-US" smtClean="0"/>
-              <a:t>10</a:t>
+              <a:t>9</a:t>
             </a:fld>
             <a:endParaRPr lang="en-US"/>
           </a:p>
@@ -3016,7 +3083,7 @@
     </p:spTree>
     <p:extLst>
       <p:ext uri="{BB962C8B-B14F-4D97-AF65-F5344CB8AC3E}">
-        <p14:creationId xmlns:p14="http://schemas.microsoft.com/office/powerpoint/2010/main" val="1885339392"/>
+        <p14:creationId xmlns:p14="http://schemas.microsoft.com/office/powerpoint/2010/main" val="3337520326"/>
       </p:ext>
     </p:extLst>
   </p:cSld>
@@ -8989,7 +9056,7 @@
           <a:p>
             <a:fld id="{48A87A34-81AB-432B-8DAE-1953F412C126}" type="datetimeFigureOut">
               <a:rPr lang="en-US" smtClean="0"/>
-              <a:t>3/9/2019</a:t>
+              <a:t>3/26/2019</a:t>
             </a:fld>
             <a:endParaRPr lang="en-US" dirty="0"/>
           </a:p>
@@ -9277,7 +9344,7 @@
           <a:p>
             <a:fld id="{48A87A34-81AB-432B-8DAE-1953F412C126}" type="datetimeFigureOut">
               <a:rPr lang="en-US" smtClean="0"/>
-              <a:t>3/9/2019</a:t>
+              <a:t>3/26/2019</a:t>
             </a:fld>
             <a:endParaRPr lang="en-US" dirty="0"/>
           </a:p>
@@ -10045,7 +10112,7 @@
           <a:p>
             <a:fld id="{C25EEC7D-36B5-410D-A12B-950009EE4C4D}" type="datetimeFigureOut">
               <a:rPr lang="en-US" smtClean="0"/>
-              <a:t>3/9/2019</a:t>
+              <a:t>3/26/2019</a:t>
             </a:fld>
             <a:endParaRPr lang="en-US"/>
           </a:p>
@@ -10243,7 +10310,7 @@
           <a:p>
             <a:fld id="{C25EEC7D-36B5-410D-A12B-950009EE4C4D}" type="datetimeFigureOut">
               <a:rPr lang="en-US" smtClean="0"/>
-              <a:t>3/9/2019</a:t>
+              <a:t>3/26/2019</a:t>
             </a:fld>
             <a:endParaRPr lang="en-US"/>
           </a:p>
@@ -14480,7 +14547,7 @@
             </a:pPr>
             <a:r>
               <a:rPr lang="en-US" sz="2400" dirty="0"/>
-              <a:t>When done iterating, test classifiers in the held-back Validation data.</a:t>
+              <a:t>When done iterating, evaluate classifiers in the held-back Validation data.</a:t>
             </a:r>
           </a:p>
         </p:txBody>
@@ -14887,7 +14954,7 @@
           </p:nvSpPr>
           <p:spPr>
             <a:xfrm>
-              <a:off x="9880307" y="3968373"/>
+              <a:off x="9880307" y="3903721"/>
               <a:ext cx="1102288" cy="461665"/>
             </a:xfrm>
             <a:prstGeom prst="rect">
@@ -14970,7 +15037,7 @@
           <p:spPr>
             <a:xfrm>
               <a:off x="8471737" y="3399180"/>
-              <a:ext cx="1295401" cy="553998"/>
+              <a:ext cx="2837433" cy="553998"/>
             </a:xfrm>
             <a:prstGeom prst="rect">
               <a:avLst/>
@@ -14990,7 +15057,7 @@
                   </a:solidFill>
                   <a:latin typeface="Arial Rounded MT Bold" panose="020F0704030504030204" pitchFamily="34" charset="0"/>
                 </a:rPr>
-                <a:t>Dev</a:t>
+                <a:t>Development</a:t>
               </a:r>
             </a:p>
           </p:txBody>
@@ -15140,7 +15207,7 @@
             </a:r>
             <a:r>
               <a:rPr lang="en-US" sz="2000" dirty="0"/>
-              <a:t> task—goal is to help Case Managers </a:t>
+              <a:t> task—goal is to help Care Managers </a:t>
             </a:r>
             <a:r>
               <a:rPr lang="en-US" sz="2000" i="1" dirty="0"/>
@@ -15168,7 +15235,7 @@
           <a:p>
             <a:r>
               <a:rPr lang="en-US" sz="2000" dirty="0"/>
-              <a:t>To evaluate rankings:</a:t>
+              <a:t>To evaluate a given predictor:</a:t>
             </a:r>
           </a:p>
           <a:p>
@@ -15178,7 +15245,7 @@
             </a:pPr>
             <a:r>
               <a:rPr lang="en-US" sz="2000" dirty="0"/>
-              <a:t>Sort the test subsample by one of the candidate predictions, from most-likely-to-be-hospitalized to least-likely.</a:t>
+              <a:t>Sort the data from most-likely-to-be-hospitalized to least-likely.</a:t>
             </a:r>
           </a:p>
           <a:p>
@@ -15198,14 +15265,14 @@
             </a:pPr>
             <a:r>
               <a:rPr lang="en-US" sz="2000" dirty="0"/>
-              <a:t>How many people do we have to go through in order to find Y people hospitalized?</a:t>
-            </a:r>
-          </a:p>
-          <a:p>
-            <a:pPr marL="274320" lvl="1" indent="0">
+              <a:t>Plot the number of people examined by the number of hospitalizations detected.</a:t>
+            </a:r>
+          </a:p>
+          <a:p>
+            <a:pPr marL="0" indent="-182789">
               <a:buNone/>
             </a:pPr>
-            <a:endParaRPr lang="en-US" sz="2000" dirty="0"/>
+            <a:endParaRPr lang="en-US" sz="2800" dirty="0"/>
           </a:p>
           <a:p>
             <a:pPr marL="0" indent="-182789">
@@ -15836,10 +15903,10 @@
       </p:grpSpPr>
       <p:sp>
         <p:nvSpPr>
-          <p:cNvPr id="2" name="Title 1">
+          <p:cNvPr id="5" name="Title 4">
             <a:extLst>
               <a:ext uri="{FF2B5EF4-FFF2-40B4-BE49-F238E27FC236}">
-                <a16:creationId xmlns:a16="http://schemas.microsoft.com/office/drawing/2014/main" id="{02D0C212-A423-49D2-99A2-0CFFB9139CF3}"/>
+                <a16:creationId xmlns:a16="http://schemas.microsoft.com/office/drawing/2014/main" id="{07744E30-D06D-4A8C-8C1D-44F154E9BF0E}"/>
               </a:ext>
             </a:extLst>
           </p:cNvPr>
@@ -15850,24 +15917,29 @@
             <p:ph type="title"/>
           </p:nvPr>
         </p:nvSpPr>
-        <p:spPr/>
+        <p:spPr>
+          <a:xfrm>
+            <a:off x="838091" y="1306360"/>
+            <a:ext cx="10515818" cy="1690776"/>
+          </a:xfrm>
+        </p:spPr>
         <p:txBody>
           <a:bodyPr/>
           <a:lstStyle/>
           <a:p>
             <a:r>
-              <a:rPr lang="en-US" sz="3600" dirty="0"/>
-              <a:t>Future Directions</a:t>
-            </a:r>
-          </a:p>
-        </p:txBody>
-      </p:sp>
-      <p:sp>
-        <p:nvSpPr>
-          <p:cNvPr id="3" name="Content Placeholder 2">
+              <a:rPr lang="en-US" sz="8000" dirty="0"/>
+              <a:t>Thank You!</a:t>
+            </a:r>
+          </a:p>
+        </p:txBody>
+      </p:sp>
+      <p:sp>
+        <p:nvSpPr>
+          <p:cNvPr id="6" name="Text Placeholder 5">
             <a:extLst>
               <a:ext uri="{FF2B5EF4-FFF2-40B4-BE49-F238E27FC236}">
-                <a16:creationId xmlns:a16="http://schemas.microsoft.com/office/drawing/2014/main" id="{3E2DE287-CB92-4B45-90F1-E8D2F1F543B5}"/>
+                <a16:creationId xmlns:a16="http://schemas.microsoft.com/office/drawing/2014/main" id="{7FF91EDB-7BD0-453F-80BD-82DF4B04EFF6}"/>
               </a:ext>
             </a:extLst>
           </p:cNvPr>
@@ -15875,88 +15947,74 @@
             <a:spLocks noGrp="1"/>
           </p:cNvSpPr>
           <p:nvPr>
-            <p:ph idx="1"/>
+            <p:ph type="body" sz="quarter" idx="10"/>
+          </p:nvPr>
+        </p:nvSpPr>
+        <p:spPr>
+          <a:xfrm>
+            <a:off x="838091" y="4684144"/>
+            <a:ext cx="10515818" cy="1155940"/>
+          </a:xfrm>
+        </p:spPr>
+        <p:txBody>
+          <a:bodyPr/>
+          <a:lstStyle/>
+          <a:p>
+            <a:r>
+              <a:rPr lang="en-US" sz="4000" dirty="0"/>
+              <a:t>https://github.com/rpardee/hcsrn_2019</a:t>
+            </a:r>
+          </a:p>
+          <a:p>
+            <a:endParaRPr lang="en-US" sz="2000" dirty="0"/>
+          </a:p>
+          <a:p>
+            <a:r>
+              <a:rPr lang="en-US" sz="2000" dirty="0"/>
+              <a:t>roy.e.pardee@kp.org</a:t>
+            </a:r>
+          </a:p>
+          <a:p>
+            <a:r>
+              <a:rPr lang="en-US" sz="2000" dirty="0"/>
+              <a:t>david.j.cronkite@kp.org</a:t>
+            </a:r>
+          </a:p>
+        </p:txBody>
+      </p:sp>
+      <p:sp>
+        <p:nvSpPr>
+          <p:cNvPr id="4" name="Slide Number Placeholder 3">
+            <a:extLst>
+              <a:ext uri="{FF2B5EF4-FFF2-40B4-BE49-F238E27FC236}">
+                <a16:creationId xmlns:a16="http://schemas.microsoft.com/office/drawing/2014/main" id="{117AD612-B4E1-4199-AFDB-1A1E7566813D}"/>
+              </a:ext>
+            </a:extLst>
+          </p:cNvPr>
+          <p:cNvSpPr>
+            <a:spLocks noGrp="1"/>
+          </p:cNvSpPr>
+          <p:nvPr>
+            <p:ph type="sldNum" sz="quarter" idx="11"/>
           </p:nvPr>
         </p:nvSpPr>
         <p:spPr/>
         <p:txBody>
-          <a:bodyPr>
-            <a:normAutofit/>
-          </a:bodyPr>
+          <a:bodyPr/>
           <a:lstStyle/>
           <a:p>
-            <a:r>
-              <a:rPr lang="en-US" sz="2400" dirty="0"/>
-              <a:t>Switch </a:t>
-            </a:r>
-          </a:p>
-          <a:p>
-            <a:pPr lvl="1"/>
-            <a:r>
-              <a:rPr lang="en-US" sz="2400" dirty="0"/>
-              <a:t>from using binary feature flags to counts of feature occurrences.</a:t>
-            </a:r>
-          </a:p>
-          <a:p>
-            <a:pPr lvl="1"/>
-            <a:r>
-              <a:rPr lang="en-US" sz="2400" dirty="0"/>
-              <a:t>to ingredient-level </a:t>
-            </a:r>
-            <a:r>
-              <a:rPr lang="en-US" sz="2400" dirty="0" err="1"/>
-              <a:t>RxCUIs</a:t>
-            </a:r>
-            <a:r>
-              <a:rPr lang="en-US" sz="2400" dirty="0"/>
-              <a:t> (or supplement with?)</a:t>
-            </a:r>
-          </a:p>
-          <a:p>
-            <a:pPr lvl="1"/>
-            <a:r>
-              <a:rPr lang="en-US" sz="2400" dirty="0"/>
-              <a:t>to lower-latency sources for dx/</a:t>
-            </a:r>
-            <a:r>
-              <a:rPr lang="en-US" sz="2400" dirty="0" err="1"/>
-              <a:t>px</a:t>
-            </a:r>
-            <a:r>
-              <a:rPr lang="en-US" sz="2400" dirty="0"/>
-              <a:t> (other sources are already daily).</a:t>
-            </a:r>
-          </a:p>
-          <a:p>
-            <a:r>
-              <a:rPr lang="en-US" sz="2400" dirty="0"/>
-              <a:t>Try additional classifiers.</a:t>
-            </a:r>
-          </a:p>
-          <a:p>
-            <a:r>
-              <a:rPr lang="en-US" sz="2400" dirty="0"/>
-              <a:t>Tweak Parameters.</a:t>
-            </a:r>
-          </a:p>
-          <a:p>
-            <a:r>
-              <a:rPr lang="en-US" sz="2400" dirty="0"/>
-              <a:t>Expand population, either to additional diseases, or to the general population.</a:t>
-            </a:r>
-          </a:p>
-          <a:p>
-            <a:r>
-              <a:rPr lang="en-US" sz="2400" dirty="0"/>
-              <a:t>Create additional predictors for Care Managers’ ratings of success/impact.</a:t>
-            </a:r>
+            <a:fld id="{6D22F896-40B5-4ADD-8801-0D06FADFA095}" type="slidenum">
+              <a:rPr lang="en-US" smtClean="0"/>
+              <a:t>15</a:t>
+            </a:fld>
+            <a:endParaRPr lang="en-US" dirty="0"/>
           </a:p>
         </p:txBody>
       </p:sp>
     </p:spTree>
     <p:extLst>
       <p:ext uri="{BB962C8B-B14F-4D97-AF65-F5344CB8AC3E}">
-        <p14:creationId xmlns:p14="http://schemas.microsoft.com/office/powerpoint/2010/main" val="3441954348"/>
+        <p14:creationId xmlns:p14="http://schemas.microsoft.com/office/powerpoint/2010/main" val="2017354462"/>
       </p:ext>
     </p:extLst>
   </p:cSld>
@@ -15985,10 +16043,10 @@
       </p:grpSpPr>
       <p:sp>
         <p:nvSpPr>
-          <p:cNvPr id="5" name="Title 4">
+          <p:cNvPr id="2" name="Title 1">
             <a:extLst>
               <a:ext uri="{FF2B5EF4-FFF2-40B4-BE49-F238E27FC236}">
-                <a16:creationId xmlns:a16="http://schemas.microsoft.com/office/drawing/2014/main" id="{07744E30-D06D-4A8C-8C1D-44F154E9BF0E}"/>
+                <a16:creationId xmlns:a16="http://schemas.microsoft.com/office/drawing/2014/main" id="{02D0C212-A423-49D2-99A2-0CFFB9139CF3}"/>
               </a:ext>
             </a:extLst>
           </p:cNvPr>
@@ -15999,29 +16057,24 @@
             <p:ph type="title"/>
           </p:nvPr>
         </p:nvSpPr>
-        <p:spPr>
-          <a:xfrm>
-            <a:off x="838091" y="1306360"/>
-            <a:ext cx="10515818" cy="1690776"/>
-          </a:xfrm>
-        </p:spPr>
+        <p:spPr/>
         <p:txBody>
           <a:bodyPr/>
           <a:lstStyle/>
           <a:p>
             <a:r>
-              <a:rPr lang="en-US" sz="6000" dirty="0"/>
-              <a:t>Thank You!</a:t>
-            </a:r>
-          </a:p>
-        </p:txBody>
-      </p:sp>
-      <p:sp>
-        <p:nvSpPr>
-          <p:cNvPr id="6" name="Text Placeholder 5">
+              <a:rPr lang="en-US" sz="3600" dirty="0"/>
+              <a:t>Future Directions</a:t>
+            </a:r>
+          </a:p>
+        </p:txBody>
+      </p:sp>
+      <p:sp>
+        <p:nvSpPr>
+          <p:cNvPr id="3" name="Content Placeholder 2">
             <a:extLst>
               <a:ext uri="{FF2B5EF4-FFF2-40B4-BE49-F238E27FC236}">
-                <a16:creationId xmlns:a16="http://schemas.microsoft.com/office/drawing/2014/main" id="{7FF91EDB-7BD0-453F-80BD-82DF4B04EFF6}"/>
+                <a16:creationId xmlns:a16="http://schemas.microsoft.com/office/drawing/2014/main" id="{3E2DE287-CB92-4B45-90F1-E8D2F1F543B5}"/>
               </a:ext>
             </a:extLst>
           </p:cNvPr>
@@ -16029,74 +16082,88 @@
             <a:spLocks noGrp="1"/>
           </p:cNvSpPr>
           <p:nvPr>
-            <p:ph type="body" sz="quarter" idx="10"/>
-          </p:nvPr>
-        </p:nvSpPr>
-        <p:spPr>
-          <a:xfrm>
-            <a:off x="838091" y="4684144"/>
-            <a:ext cx="10515818" cy="1155940"/>
-          </a:xfrm>
-        </p:spPr>
-        <p:txBody>
-          <a:bodyPr/>
+            <p:ph idx="1"/>
+          </p:nvPr>
+        </p:nvSpPr>
+        <p:spPr/>
+        <p:txBody>
+          <a:bodyPr>
+            <a:normAutofit/>
+          </a:bodyPr>
           <a:lstStyle/>
           <a:p>
             <a:r>
-              <a:rPr lang="en-US" sz="4000" dirty="0"/>
-              <a:t>https://github.com/rpardee/hcsrn_2019</a:t>
-            </a:r>
-          </a:p>
-          <a:p>
-            <a:endParaRPr lang="en-US" sz="2000" dirty="0"/>
-          </a:p>
-          <a:p>
-            <a:r>
-              <a:rPr lang="en-US" sz="2000" dirty="0"/>
-              <a:t>roy.e.pardee@kp.org</a:t>
-            </a:r>
-          </a:p>
-          <a:p>
-            <a:r>
-              <a:rPr lang="en-US" sz="2000" dirty="0"/>
-              <a:t>david.j.cronkite@kp.org</a:t>
-            </a:r>
-          </a:p>
-        </p:txBody>
-      </p:sp>
-      <p:sp>
-        <p:nvSpPr>
-          <p:cNvPr id="4" name="Slide Number Placeholder 3">
-            <a:extLst>
-              <a:ext uri="{FF2B5EF4-FFF2-40B4-BE49-F238E27FC236}">
-                <a16:creationId xmlns:a16="http://schemas.microsoft.com/office/drawing/2014/main" id="{117AD612-B4E1-4199-AFDB-1A1E7566813D}"/>
-              </a:ext>
-            </a:extLst>
-          </p:cNvPr>
-          <p:cNvSpPr>
-            <a:spLocks noGrp="1"/>
-          </p:cNvSpPr>
-          <p:nvPr>
-            <p:ph type="sldNum" sz="quarter" idx="11"/>
-          </p:nvPr>
-        </p:nvSpPr>
-        <p:spPr/>
-        <p:txBody>
-          <a:bodyPr/>
-          <a:lstStyle/>
-          <a:p>
-            <a:fld id="{6D22F896-40B5-4ADD-8801-0D06FADFA095}" type="slidenum">
-              <a:rPr lang="en-US" smtClean="0"/>
-              <a:t>16</a:t>
-            </a:fld>
-            <a:endParaRPr lang="en-US" dirty="0"/>
+              <a:rPr lang="en-US" sz="2400" dirty="0"/>
+              <a:t>Switch </a:t>
+            </a:r>
+          </a:p>
+          <a:p>
+            <a:pPr lvl="1"/>
+            <a:r>
+              <a:rPr lang="en-US" sz="2400" dirty="0"/>
+              <a:t>from using binary feature flags to counts of feature occurrences.</a:t>
+            </a:r>
+          </a:p>
+          <a:p>
+            <a:pPr lvl="1"/>
+            <a:r>
+              <a:rPr lang="en-US" sz="2400" dirty="0"/>
+              <a:t>to ingredient-level </a:t>
+            </a:r>
+            <a:r>
+              <a:rPr lang="en-US" sz="2400" dirty="0" err="1"/>
+              <a:t>RxCUIs</a:t>
+            </a:r>
+            <a:r>
+              <a:rPr lang="en-US" sz="2400" dirty="0"/>
+              <a:t> (or supplement with?)</a:t>
+            </a:r>
+          </a:p>
+          <a:p>
+            <a:pPr lvl="1"/>
+            <a:r>
+              <a:rPr lang="en-US" sz="2400" dirty="0"/>
+              <a:t>to lower-latency sources for dx/</a:t>
+            </a:r>
+            <a:r>
+              <a:rPr lang="en-US" sz="2400" dirty="0" err="1"/>
+              <a:t>px</a:t>
+            </a:r>
+            <a:r>
+              <a:rPr lang="en-US" sz="2400" dirty="0"/>
+              <a:t> (other sources are already daily).</a:t>
+            </a:r>
+          </a:p>
+          <a:p>
+            <a:r>
+              <a:rPr lang="en-US" sz="2400" dirty="0"/>
+              <a:t>Try additional classifiers.</a:t>
+            </a:r>
+          </a:p>
+          <a:p>
+            <a:r>
+              <a:rPr lang="en-US" sz="2400" dirty="0"/>
+              <a:t>Tweak Parameters.</a:t>
+            </a:r>
+          </a:p>
+          <a:p>
+            <a:r>
+              <a:rPr lang="en-US" sz="2400" dirty="0"/>
+              <a:t>Expand population, either to additional diseases, or to the general population.</a:t>
+            </a:r>
+          </a:p>
+          <a:p>
+            <a:r>
+              <a:rPr lang="en-US" sz="2400" dirty="0"/>
+              <a:t>Create additional predictors for Care Managers’ ratings of success/impact.</a:t>
+            </a:r>
           </a:p>
         </p:txBody>
       </p:sp>
     </p:spTree>
     <p:extLst>
       <p:ext uri="{BB962C8B-B14F-4D97-AF65-F5344CB8AC3E}">
-        <p14:creationId xmlns:p14="http://schemas.microsoft.com/office/powerpoint/2010/main" val="2017354462"/>
+        <p14:creationId xmlns:p14="http://schemas.microsoft.com/office/powerpoint/2010/main" val="3441954348"/>
       </p:ext>
     </p:extLst>
   </p:cSld>
@@ -16125,213 +16192,6 @@
       </p:grpSpPr>
       <p:sp>
         <p:nvSpPr>
-          <p:cNvPr id="29" name="Text Placeholder 28">
-            <a:extLst>
-              <a:ext uri="{FF2B5EF4-FFF2-40B4-BE49-F238E27FC236}">
-                <a16:creationId xmlns:a16="http://schemas.microsoft.com/office/drawing/2014/main" id="{C1F188DA-015E-4BB0-934B-F132DB871503}"/>
-              </a:ext>
-            </a:extLst>
-          </p:cNvPr>
-          <p:cNvSpPr>
-            <a:spLocks noGrp="1"/>
-          </p:cNvSpPr>
-          <p:nvPr>
-            <p:ph type="body" sz="quarter" idx="14"/>
-          </p:nvPr>
-        </p:nvSpPr>
-        <p:spPr/>
-        <p:txBody>
-          <a:bodyPr/>
-          <a:lstStyle/>
-          <a:p>
-            <a:endParaRPr lang="en-US"/>
-          </a:p>
-        </p:txBody>
-      </p:sp>
-      <p:sp>
-        <p:nvSpPr>
-          <p:cNvPr id="30" name="Text Placeholder 29">
-            <a:extLst>
-              <a:ext uri="{FF2B5EF4-FFF2-40B4-BE49-F238E27FC236}">
-                <a16:creationId xmlns:a16="http://schemas.microsoft.com/office/drawing/2014/main" id="{8878F790-4198-4AB4-A6B1-BFE114F72AA2}"/>
-              </a:ext>
-            </a:extLst>
-          </p:cNvPr>
-          <p:cNvSpPr>
-            <a:spLocks noGrp="1"/>
-          </p:cNvSpPr>
-          <p:nvPr>
-            <p:ph type="body" sz="quarter" idx="15"/>
-          </p:nvPr>
-        </p:nvSpPr>
-        <p:spPr/>
-        <p:txBody>
-          <a:bodyPr/>
-          <a:lstStyle/>
-          <a:p>
-            <a:endParaRPr lang="en-US"/>
-          </a:p>
-        </p:txBody>
-      </p:sp>
-      <p:sp>
-        <p:nvSpPr>
-          <p:cNvPr id="6" name="Title 5">
-            <a:extLst>
-              <a:ext uri="{FF2B5EF4-FFF2-40B4-BE49-F238E27FC236}">
-                <a16:creationId xmlns:a16="http://schemas.microsoft.com/office/drawing/2014/main" id="{196F7678-A0ED-4A84-8835-D38DE69228E8}"/>
-              </a:ext>
-            </a:extLst>
-          </p:cNvPr>
-          <p:cNvSpPr>
-            <a:spLocks noGrp="1"/>
-          </p:cNvSpPr>
-          <p:nvPr>
-            <p:ph type="title"/>
-          </p:nvPr>
-        </p:nvSpPr>
-        <p:spPr/>
-        <p:txBody>
-          <a:bodyPr/>
-          <a:lstStyle/>
-          <a:p>
-            <a:r>
-              <a:rPr lang="en-US" sz="3600" dirty="0"/>
-              <a:t>Context: Learning Health System</a:t>
-            </a:r>
-          </a:p>
-        </p:txBody>
-      </p:sp>
-      <p:sp>
-        <p:nvSpPr>
-          <p:cNvPr id="10" name="Content Placeholder 9">
-            <a:extLst>
-              <a:ext uri="{FF2B5EF4-FFF2-40B4-BE49-F238E27FC236}">
-                <a16:creationId xmlns:a16="http://schemas.microsoft.com/office/drawing/2014/main" id="{32977DC1-8D77-41B6-B23C-D5881E5D6FBB}"/>
-              </a:ext>
-            </a:extLst>
-          </p:cNvPr>
-          <p:cNvSpPr>
-            <a:spLocks noGrp="1"/>
-          </p:cNvSpPr>
-          <p:nvPr>
-            <p:ph sz="quarter" idx="4294967295"/>
-          </p:nvPr>
-        </p:nvSpPr>
-        <p:spPr>
-          <a:xfrm>
-            <a:off x="876980" y="1761996"/>
-            <a:ext cx="8838049" cy="4152900"/>
-          </a:xfrm>
-        </p:spPr>
-        <p:txBody>
-          <a:bodyPr/>
-          <a:lstStyle/>
-          <a:p>
-            <a:r>
-              <a:rPr lang="en-US" sz="2800" dirty="0"/>
-              <a:t>Partnership between Research and Care Delivery aimed at cutting out the middle layers of the Research </a:t>
-            </a:r>
-            <a:r>
-              <a:rPr lang="en-US" sz="2800" dirty="0">
-                <a:sym typeface="Wingdings" panose="05000000000000000000" pitchFamily="2" charset="2"/>
-              </a:rPr>
-              <a:t> Dissemination  Practice cycle.</a:t>
-            </a:r>
-          </a:p>
-          <a:p>
-            <a:pPr lvl="1"/>
-            <a:r>
-              <a:rPr lang="en-US" sz="2800" dirty="0">
-                <a:sym typeface="Wingdings" panose="05000000000000000000" pitchFamily="2" charset="2"/>
-              </a:rPr>
-              <a:t>Not Research</a:t>
-            </a:r>
-          </a:p>
-          <a:p>
-            <a:pPr lvl="1"/>
-            <a:r>
-              <a:rPr lang="en-US" sz="2800" dirty="0">
-                <a:sym typeface="Wingdings" panose="05000000000000000000" pitchFamily="2" charset="2"/>
-              </a:rPr>
-              <a:t>Aims at leveraging data to optimize care delivery</a:t>
-            </a:r>
-          </a:p>
-          <a:p>
-            <a:r>
-              <a:rPr lang="en-US" sz="2800" dirty="0"/>
-              <a:t>Care Management “ensures patients receive timely and appropriate care and supports utilization management activities.”</a:t>
-            </a:r>
-          </a:p>
-          <a:p>
-            <a:r>
-              <a:rPr lang="en-US" sz="2800" dirty="0"/>
-              <a:t>KPWA LHS Goal: reduce inpatient admissions by 2%</a:t>
-            </a:r>
-          </a:p>
-        </p:txBody>
-      </p:sp>
-      <p:sp>
-        <p:nvSpPr>
-          <p:cNvPr id="7" name="Slide Number Placeholder 6">
-            <a:extLst>
-              <a:ext uri="{FF2B5EF4-FFF2-40B4-BE49-F238E27FC236}">
-                <a16:creationId xmlns:a16="http://schemas.microsoft.com/office/drawing/2014/main" id="{D44A96A6-A317-455E-A84C-717EDE44CA65}"/>
-              </a:ext>
-            </a:extLst>
-          </p:cNvPr>
-          <p:cNvSpPr>
-            <a:spLocks noGrp="1"/>
-          </p:cNvSpPr>
-          <p:nvPr>
-            <p:ph type="sldNum" sz="quarter" idx="4"/>
-          </p:nvPr>
-        </p:nvSpPr>
-        <p:spPr/>
-        <p:txBody>
-          <a:bodyPr/>
-          <a:lstStyle/>
-          <a:p>
-            <a:fld id="{8C8B385D-DF67-E241-B0BF-76B80A8E743B}" type="slidenum">
-              <a:rPr lang="en-US" smtClean="0"/>
-              <a:pPr/>
-              <a:t>17</a:t>
-            </a:fld>
-            <a:endParaRPr lang="en-US" dirty="0"/>
-          </a:p>
-        </p:txBody>
-      </p:sp>
-    </p:spTree>
-    <p:extLst>
-      <p:ext uri="{BB962C8B-B14F-4D97-AF65-F5344CB8AC3E}">
-        <p14:creationId xmlns:p14="http://schemas.microsoft.com/office/powerpoint/2010/main" val="1790581713"/>
-      </p:ext>
-    </p:extLst>
-  </p:cSld>
-  <p:clrMapOvr>
-    <a:masterClrMapping/>
-  </p:clrMapOvr>
-</p:sld>
-</file>
-
-<file path=ppt/slides/slide18.xml><?xml version="1.0" encoding="utf-8"?>
-<p:sld xmlns:a="http://schemas.openxmlformats.org/drawingml/2006/main" xmlns:r="http://schemas.openxmlformats.org/officeDocument/2006/relationships" xmlns:p="http://schemas.openxmlformats.org/presentationml/2006/main">
-  <p:cSld>
-    <p:spTree>
-      <p:nvGrpSpPr>
-        <p:cNvPr id="1" name=""/>
-        <p:cNvGrpSpPr/>
-        <p:nvPr/>
-      </p:nvGrpSpPr>
-      <p:grpSpPr>
-        <a:xfrm>
-          <a:off x="0" y="0"/>
-          <a:ext cx="0" cy="0"/>
-          <a:chOff x="0" y="0"/>
-          <a:chExt cx="0" cy="0"/>
-        </a:xfrm>
-      </p:grpSpPr>
-      <p:sp>
-        <p:nvSpPr>
           <p:cNvPr id="2" name="Text Placeholder 1">
             <a:extLst>
               <a:ext uri="{FF2B5EF4-FFF2-40B4-BE49-F238E27FC236}">
@@ -16432,7 +16292,7 @@
             <a:fld id="{8C8B385D-DF67-E241-B0BF-76B80A8E743B}" type="slidenum">
               <a:rPr lang="en-US" smtClean="0"/>
               <a:pPr/>
-              <a:t>18</a:t>
+              <a:t>17</a:t>
             </a:fld>
             <a:endParaRPr lang="en-US" dirty="0"/>
           </a:p>
@@ -17866,7 +17726,7 @@
 </p:sld>
 </file>
 
-<file path=ppt/slides/slide19.xml><?xml version="1.0" encoding="utf-8"?>
+<file path=ppt/slides/slide18.xml><?xml version="1.0" encoding="utf-8"?>
 <p:sld xmlns:a="http://schemas.openxmlformats.org/drawingml/2006/main" xmlns:r="http://schemas.openxmlformats.org/officeDocument/2006/relationships" xmlns:p="http://schemas.openxmlformats.org/presentationml/2006/main">
   <p:cSld>
     <p:spTree>
@@ -17927,248 +17787,7 @@
 </p:sld>
 </file>
 
-<file path=ppt/slides/slide2.xml><?xml version="1.0" encoding="utf-8"?>
-<p:sld xmlns:a="http://schemas.openxmlformats.org/drawingml/2006/main" xmlns:r="http://schemas.openxmlformats.org/officeDocument/2006/relationships" xmlns:p="http://schemas.openxmlformats.org/presentationml/2006/main">
-  <p:cSld>
-    <p:spTree>
-      <p:nvGrpSpPr>
-        <p:cNvPr id="1" name=""/>
-        <p:cNvGrpSpPr/>
-        <p:nvPr/>
-      </p:nvGrpSpPr>
-      <p:grpSpPr>
-        <a:xfrm>
-          <a:off x="0" y="0"/>
-          <a:ext cx="0" cy="0"/>
-          <a:chOff x="0" y="0"/>
-          <a:chExt cx="0" cy="0"/>
-        </a:xfrm>
-      </p:grpSpPr>
-      <p:sp>
-        <p:nvSpPr>
-          <p:cNvPr id="9" name="Text Placeholder 8">
-            <a:extLst>
-              <a:ext uri="{FF2B5EF4-FFF2-40B4-BE49-F238E27FC236}">
-                <a16:creationId xmlns:a16="http://schemas.microsoft.com/office/drawing/2014/main" id="{5D97BFE3-4063-41B5-9DAF-E4B753911ECE}"/>
-              </a:ext>
-            </a:extLst>
-          </p:cNvPr>
-          <p:cNvSpPr>
-            <a:spLocks noGrp="1"/>
-          </p:cNvSpPr>
-          <p:nvPr>
-            <p:ph type="body" sz="quarter" idx="14"/>
-          </p:nvPr>
-        </p:nvSpPr>
-        <p:spPr/>
-        <p:txBody>
-          <a:bodyPr/>
-          <a:lstStyle/>
-          <a:p>
-            <a:endParaRPr lang="en-US"/>
-          </a:p>
-        </p:txBody>
-      </p:sp>
-      <p:sp>
-        <p:nvSpPr>
-          <p:cNvPr id="10" name="Text Placeholder 9">
-            <a:extLst>
-              <a:ext uri="{FF2B5EF4-FFF2-40B4-BE49-F238E27FC236}">
-                <a16:creationId xmlns:a16="http://schemas.microsoft.com/office/drawing/2014/main" id="{C5992D4D-5CC1-4780-A101-233F7F01E29F}"/>
-              </a:ext>
-            </a:extLst>
-          </p:cNvPr>
-          <p:cNvSpPr>
-            <a:spLocks noGrp="1"/>
-          </p:cNvSpPr>
-          <p:nvPr>
-            <p:ph type="body" sz="quarter" idx="15"/>
-          </p:nvPr>
-        </p:nvSpPr>
-        <p:spPr/>
-        <p:txBody>
-          <a:bodyPr/>
-          <a:lstStyle/>
-          <a:p>
-            <a:endParaRPr lang="en-US"/>
-          </a:p>
-        </p:txBody>
-      </p:sp>
-      <p:sp>
-        <p:nvSpPr>
-          <p:cNvPr id="8" name="Title 7">
-            <a:extLst>
-              <a:ext uri="{FF2B5EF4-FFF2-40B4-BE49-F238E27FC236}">
-                <a16:creationId xmlns:a16="http://schemas.microsoft.com/office/drawing/2014/main" id="{CC827348-02FF-4AE8-86DB-C53DC66E4E5C}"/>
-              </a:ext>
-            </a:extLst>
-          </p:cNvPr>
-          <p:cNvSpPr>
-            <a:spLocks noGrp="1"/>
-          </p:cNvSpPr>
-          <p:nvPr>
-            <p:ph type="title"/>
-          </p:nvPr>
-        </p:nvSpPr>
-        <p:spPr/>
-        <p:txBody>
-          <a:bodyPr/>
-          <a:lstStyle/>
-          <a:p>
-            <a:r>
-              <a:rPr lang="en-US" sz="4400"/>
-              <a:t>“Data is the new oil”</a:t>
-            </a:r>
-            <a:endParaRPr lang="en-US" sz="4400" dirty="0"/>
-          </a:p>
-        </p:txBody>
-      </p:sp>
-      <p:sp>
-        <p:nvSpPr>
-          <p:cNvPr id="11" name="Content Placeholder 10">
-            <a:extLst>
-              <a:ext uri="{FF2B5EF4-FFF2-40B4-BE49-F238E27FC236}">
-                <a16:creationId xmlns:a16="http://schemas.microsoft.com/office/drawing/2014/main" id="{174B9344-6F60-4EAC-9405-A1410AC4C75A}"/>
-              </a:ext>
-            </a:extLst>
-          </p:cNvPr>
-          <p:cNvSpPr>
-            <a:spLocks noGrp="1"/>
-          </p:cNvSpPr>
-          <p:nvPr>
-            <p:ph sz="quarter" idx="4294967295"/>
-          </p:nvPr>
-        </p:nvSpPr>
-        <p:spPr>
-          <a:xfrm>
-            <a:off x="876980" y="1761996"/>
-            <a:ext cx="8838049" cy="4152900"/>
-          </a:xfrm>
-        </p:spPr>
-        <p:txBody>
-          <a:bodyPr/>
-          <a:lstStyle/>
-          <a:p>
-            <a:r>
-              <a:rPr lang="en-US" sz="2000" dirty="0"/>
-              <a:t>Hype is inescapable.</a:t>
-            </a:r>
-          </a:p>
-          <a:p>
-            <a:r>
-              <a:rPr lang="en-US" sz="2000" dirty="0"/>
-              <a:t>No shortage of vendors willing to help you spend money turning your data into “insights”.</a:t>
-            </a:r>
-          </a:p>
-          <a:p>
-            <a:r>
-              <a:rPr lang="en-US" sz="2000" dirty="0"/>
-              <a:t>But the market seems to be bifurcated:</a:t>
-            </a:r>
-          </a:p>
-          <a:p>
-            <a:pPr lvl="1"/>
-            <a:r>
-              <a:rPr lang="en-US" sz="2000" b="1" dirty="0"/>
-              <a:t>Insurers</a:t>
-            </a:r>
-            <a:r>
-              <a:rPr lang="en-US" sz="2000" dirty="0"/>
-              <a:t> have claims, which should be comprehensive but imprecise with respect to patient health status.</a:t>
-            </a:r>
-          </a:p>
-          <a:p>
-            <a:pPr lvl="1"/>
-            <a:r>
-              <a:rPr lang="en-US" sz="2000" b="1" dirty="0"/>
-              <a:t>Providers</a:t>
-            </a:r>
-            <a:r>
-              <a:rPr lang="en-US" sz="2000" dirty="0"/>
-              <a:t> have clinical observations, which are detailed but often not comprehensive.</a:t>
-            </a:r>
-          </a:p>
-          <a:p>
-            <a:r>
-              <a:rPr lang="en-US" sz="2000" dirty="0"/>
-              <a:t>As hybrid orgs, HMOs usually have a combination of these types of data.</a:t>
-            </a:r>
-          </a:p>
-          <a:p>
-            <a:pPr lvl="1"/>
-            <a:r>
-              <a:rPr lang="en-US" sz="2000" dirty="0"/>
-              <a:t>So we can use </a:t>
-            </a:r>
-            <a:r>
-              <a:rPr lang="en-US" sz="2000" i="1" dirty="0"/>
-              <a:t>either.</a:t>
-            </a:r>
-          </a:p>
-          <a:p>
-            <a:pPr lvl="1"/>
-            <a:r>
-              <a:rPr lang="en-US" sz="2000" dirty="0"/>
-              <a:t>We should use </a:t>
-            </a:r>
-            <a:r>
-              <a:rPr lang="en-US" sz="2000" b="1" dirty="0"/>
-              <a:t>both.</a:t>
-            </a:r>
-          </a:p>
-          <a:p>
-            <a:pPr lvl="1"/>
-            <a:r>
-              <a:rPr lang="en-US" sz="2000" dirty="0"/>
-              <a:t>DIY approach allows this.</a:t>
-            </a:r>
-          </a:p>
-        </p:txBody>
-      </p:sp>
-      <p:sp>
-        <p:nvSpPr>
-          <p:cNvPr id="6" name="Slide Number Placeholder 5">
-            <a:extLst>
-              <a:ext uri="{FF2B5EF4-FFF2-40B4-BE49-F238E27FC236}">
-                <a16:creationId xmlns:a16="http://schemas.microsoft.com/office/drawing/2014/main" id="{44AA0D5C-04B5-4F97-99E4-ADCEC71A2CB6}"/>
-              </a:ext>
-            </a:extLst>
-          </p:cNvPr>
-          <p:cNvSpPr>
-            <a:spLocks noGrp="1"/>
-          </p:cNvSpPr>
-          <p:nvPr>
-            <p:ph type="sldNum" sz="quarter" idx="4"/>
-          </p:nvPr>
-        </p:nvSpPr>
-        <p:spPr/>
-        <p:txBody>
-          <a:bodyPr/>
-          <a:lstStyle/>
-          <a:p>
-            <a:fld id="{8C8B385D-DF67-E241-B0BF-76B80A8E743B}" type="slidenum">
-              <a:rPr lang="en-US" smtClean="0"/>
-              <a:pPr/>
-              <a:t>2</a:t>
-            </a:fld>
-            <a:endParaRPr lang="en-US" dirty="0"/>
-          </a:p>
-        </p:txBody>
-      </p:sp>
-    </p:spTree>
-    <p:extLst>
-      <p:ext uri="{BB962C8B-B14F-4D97-AF65-F5344CB8AC3E}">
-        <p14:creationId xmlns:p14="http://schemas.microsoft.com/office/powerpoint/2010/main" val="321420137"/>
-      </p:ext>
-    </p:extLst>
-  </p:cSld>
-  <p:clrMapOvr>
-    <a:masterClrMapping/>
-  </p:clrMapOvr>
-</p:sld>
-</file>
-
-<file path=ppt/slides/slide20.xml><?xml version="1.0" encoding="utf-8"?>
+<file path=ppt/slides/slide19.xml><?xml version="1.0" encoding="utf-8"?>
 <p:sld xmlns:a="http://schemas.openxmlformats.org/drawingml/2006/main" xmlns:r="http://schemas.openxmlformats.org/officeDocument/2006/relationships" xmlns:p="http://schemas.openxmlformats.org/presentationml/2006/main">
   <p:cSld>
     <p:spTree>
@@ -18366,6 +17985,247 @@
 </p:sld>
 </file>
 
+<file path=ppt/slides/slide2.xml><?xml version="1.0" encoding="utf-8"?>
+<p:sld xmlns:a="http://schemas.openxmlformats.org/drawingml/2006/main" xmlns:r="http://schemas.openxmlformats.org/officeDocument/2006/relationships" xmlns:p="http://schemas.openxmlformats.org/presentationml/2006/main">
+  <p:cSld>
+    <p:spTree>
+      <p:nvGrpSpPr>
+        <p:cNvPr id="1" name=""/>
+        <p:cNvGrpSpPr/>
+        <p:nvPr/>
+      </p:nvGrpSpPr>
+      <p:grpSpPr>
+        <a:xfrm>
+          <a:off x="0" y="0"/>
+          <a:ext cx="0" cy="0"/>
+          <a:chOff x="0" y="0"/>
+          <a:chExt cx="0" cy="0"/>
+        </a:xfrm>
+      </p:grpSpPr>
+      <p:sp>
+        <p:nvSpPr>
+          <p:cNvPr id="9" name="Text Placeholder 8">
+            <a:extLst>
+              <a:ext uri="{FF2B5EF4-FFF2-40B4-BE49-F238E27FC236}">
+                <a16:creationId xmlns:a16="http://schemas.microsoft.com/office/drawing/2014/main" id="{5D97BFE3-4063-41B5-9DAF-E4B753911ECE}"/>
+              </a:ext>
+            </a:extLst>
+          </p:cNvPr>
+          <p:cNvSpPr>
+            <a:spLocks noGrp="1"/>
+          </p:cNvSpPr>
+          <p:nvPr>
+            <p:ph type="body" sz="quarter" idx="14"/>
+          </p:nvPr>
+        </p:nvSpPr>
+        <p:spPr/>
+        <p:txBody>
+          <a:bodyPr/>
+          <a:lstStyle/>
+          <a:p>
+            <a:endParaRPr lang="en-US"/>
+          </a:p>
+        </p:txBody>
+      </p:sp>
+      <p:sp>
+        <p:nvSpPr>
+          <p:cNvPr id="10" name="Text Placeholder 9">
+            <a:extLst>
+              <a:ext uri="{FF2B5EF4-FFF2-40B4-BE49-F238E27FC236}">
+                <a16:creationId xmlns:a16="http://schemas.microsoft.com/office/drawing/2014/main" id="{C5992D4D-5CC1-4780-A101-233F7F01E29F}"/>
+              </a:ext>
+            </a:extLst>
+          </p:cNvPr>
+          <p:cNvSpPr>
+            <a:spLocks noGrp="1"/>
+          </p:cNvSpPr>
+          <p:nvPr>
+            <p:ph type="body" sz="quarter" idx="15"/>
+          </p:nvPr>
+        </p:nvSpPr>
+        <p:spPr/>
+        <p:txBody>
+          <a:bodyPr/>
+          <a:lstStyle/>
+          <a:p>
+            <a:endParaRPr lang="en-US"/>
+          </a:p>
+        </p:txBody>
+      </p:sp>
+      <p:sp>
+        <p:nvSpPr>
+          <p:cNvPr id="8" name="Title 7">
+            <a:extLst>
+              <a:ext uri="{FF2B5EF4-FFF2-40B4-BE49-F238E27FC236}">
+                <a16:creationId xmlns:a16="http://schemas.microsoft.com/office/drawing/2014/main" id="{CC827348-02FF-4AE8-86DB-C53DC66E4E5C}"/>
+              </a:ext>
+            </a:extLst>
+          </p:cNvPr>
+          <p:cNvSpPr>
+            <a:spLocks noGrp="1"/>
+          </p:cNvSpPr>
+          <p:nvPr>
+            <p:ph type="title"/>
+          </p:nvPr>
+        </p:nvSpPr>
+        <p:spPr/>
+        <p:txBody>
+          <a:bodyPr/>
+          <a:lstStyle/>
+          <a:p>
+            <a:r>
+              <a:rPr lang="en-US" sz="4400"/>
+              <a:t>“Data is the new oil”</a:t>
+            </a:r>
+            <a:endParaRPr lang="en-US" sz="4400" dirty="0"/>
+          </a:p>
+        </p:txBody>
+      </p:sp>
+      <p:sp>
+        <p:nvSpPr>
+          <p:cNvPr id="11" name="Content Placeholder 10">
+            <a:extLst>
+              <a:ext uri="{FF2B5EF4-FFF2-40B4-BE49-F238E27FC236}">
+                <a16:creationId xmlns:a16="http://schemas.microsoft.com/office/drawing/2014/main" id="{174B9344-6F60-4EAC-9405-A1410AC4C75A}"/>
+              </a:ext>
+            </a:extLst>
+          </p:cNvPr>
+          <p:cNvSpPr>
+            <a:spLocks noGrp="1"/>
+          </p:cNvSpPr>
+          <p:nvPr>
+            <p:ph sz="quarter" idx="4294967295"/>
+          </p:nvPr>
+        </p:nvSpPr>
+        <p:spPr>
+          <a:xfrm>
+            <a:off x="876980" y="1761996"/>
+            <a:ext cx="8838049" cy="4152900"/>
+          </a:xfrm>
+        </p:spPr>
+        <p:txBody>
+          <a:bodyPr/>
+          <a:lstStyle/>
+          <a:p>
+            <a:r>
+              <a:rPr lang="en-US" sz="2000" dirty="0"/>
+              <a:t>Hype is inescapable.</a:t>
+            </a:r>
+          </a:p>
+          <a:p>
+            <a:r>
+              <a:rPr lang="en-US" sz="2000" dirty="0"/>
+              <a:t>No shortage of vendors willing to help you spend money turning your data into “insights”.</a:t>
+            </a:r>
+          </a:p>
+          <a:p>
+            <a:r>
+              <a:rPr lang="en-US" sz="2000" dirty="0"/>
+              <a:t>But the market seems to be bifurcated:</a:t>
+            </a:r>
+          </a:p>
+          <a:p>
+            <a:pPr lvl="1"/>
+            <a:r>
+              <a:rPr lang="en-US" sz="2000" b="1" dirty="0"/>
+              <a:t>Insurers</a:t>
+            </a:r>
+            <a:r>
+              <a:rPr lang="en-US" sz="2000" dirty="0"/>
+              <a:t> have claims, which should be comprehensive but imprecise with respect to patient health status.</a:t>
+            </a:r>
+          </a:p>
+          <a:p>
+            <a:pPr lvl="1"/>
+            <a:r>
+              <a:rPr lang="en-US" sz="2000" b="1" dirty="0"/>
+              <a:t>Providers</a:t>
+            </a:r>
+            <a:r>
+              <a:rPr lang="en-US" sz="2000" dirty="0"/>
+              <a:t> have clinical observations, which are detailed but often not comprehensive.</a:t>
+            </a:r>
+          </a:p>
+          <a:p>
+            <a:r>
+              <a:rPr lang="en-US" sz="2000" dirty="0"/>
+              <a:t>As hybrid orgs, HMOs usually have a combination of these types of data.</a:t>
+            </a:r>
+          </a:p>
+          <a:p>
+            <a:pPr lvl="1"/>
+            <a:r>
+              <a:rPr lang="en-US" sz="2000" dirty="0"/>
+              <a:t>So we can use </a:t>
+            </a:r>
+            <a:r>
+              <a:rPr lang="en-US" sz="2000" i="1" dirty="0"/>
+              <a:t>either.</a:t>
+            </a:r>
+          </a:p>
+          <a:p>
+            <a:pPr lvl="1"/>
+            <a:r>
+              <a:rPr lang="en-US" sz="2000" dirty="0"/>
+              <a:t>We should use </a:t>
+            </a:r>
+            <a:r>
+              <a:rPr lang="en-US" sz="2000" b="1" dirty="0"/>
+              <a:t>both.</a:t>
+            </a:r>
+          </a:p>
+          <a:p>
+            <a:pPr lvl="1"/>
+            <a:r>
+              <a:rPr lang="en-US" sz="2000" dirty="0"/>
+              <a:t>DIY approach allows this.</a:t>
+            </a:r>
+          </a:p>
+        </p:txBody>
+      </p:sp>
+      <p:sp>
+        <p:nvSpPr>
+          <p:cNvPr id="6" name="Slide Number Placeholder 5">
+            <a:extLst>
+              <a:ext uri="{FF2B5EF4-FFF2-40B4-BE49-F238E27FC236}">
+                <a16:creationId xmlns:a16="http://schemas.microsoft.com/office/drawing/2014/main" id="{44AA0D5C-04B5-4F97-99E4-ADCEC71A2CB6}"/>
+              </a:ext>
+            </a:extLst>
+          </p:cNvPr>
+          <p:cNvSpPr>
+            <a:spLocks noGrp="1"/>
+          </p:cNvSpPr>
+          <p:nvPr>
+            <p:ph type="sldNum" sz="quarter" idx="4"/>
+          </p:nvPr>
+        </p:nvSpPr>
+        <p:spPr/>
+        <p:txBody>
+          <a:bodyPr/>
+          <a:lstStyle/>
+          <a:p>
+            <a:fld id="{8C8B385D-DF67-E241-B0BF-76B80A8E743B}" type="slidenum">
+              <a:rPr lang="en-US" smtClean="0"/>
+              <a:pPr/>
+              <a:t>2</a:t>
+            </a:fld>
+            <a:endParaRPr lang="en-US" dirty="0"/>
+          </a:p>
+        </p:txBody>
+      </p:sp>
+    </p:spTree>
+    <p:extLst>
+      <p:ext uri="{BB962C8B-B14F-4D97-AF65-F5344CB8AC3E}">
+        <p14:creationId xmlns:p14="http://schemas.microsoft.com/office/powerpoint/2010/main" val="321420137"/>
+      </p:ext>
+    </p:extLst>
+  </p:cSld>
+  <p:clrMapOvr>
+    <a:masterClrMapping/>
+  </p:clrMapOvr>
+</p:sld>
+</file>
+
 <file path=ppt/slides/slide3.xml><?xml version="1.0" encoding="utf-8"?>
 <p:sld xmlns:a="http://schemas.openxmlformats.org/drawingml/2006/main" xmlns:r="http://schemas.openxmlformats.org/officeDocument/2006/relationships" xmlns:p="http://schemas.openxmlformats.org/presentationml/2006/main">
   <p:cSld>
@@ -18588,10 +18448,10 @@
       </p:grpSpPr>
       <p:sp>
         <p:nvSpPr>
-          <p:cNvPr id="15" name="Text Placeholder 14">
+          <p:cNvPr id="29" name="Text Placeholder 28">
             <a:extLst>
               <a:ext uri="{FF2B5EF4-FFF2-40B4-BE49-F238E27FC236}">
-                <a16:creationId xmlns:a16="http://schemas.microsoft.com/office/drawing/2014/main" id="{A0ECC5C5-1ADB-49B4-A9D2-7695B77F6128}"/>
+                <a16:creationId xmlns:a16="http://schemas.microsoft.com/office/drawing/2014/main" id="{C1F188DA-015E-4BB0-934B-F132DB871503}"/>
               </a:ext>
             </a:extLst>
           </p:cNvPr>
@@ -18613,10 +18473,10 @@
       </p:sp>
       <p:sp>
         <p:nvSpPr>
-          <p:cNvPr id="16" name="Text Placeholder 15">
+          <p:cNvPr id="30" name="Text Placeholder 29">
             <a:extLst>
               <a:ext uri="{FF2B5EF4-FFF2-40B4-BE49-F238E27FC236}">
-                <a16:creationId xmlns:a16="http://schemas.microsoft.com/office/drawing/2014/main" id="{EC7ECCA0-1157-412D-B37B-9219D925871D}"/>
+                <a16:creationId xmlns:a16="http://schemas.microsoft.com/office/drawing/2014/main" id="{8878F790-4198-4AB4-A6B1-BFE114F72AA2}"/>
               </a:ext>
             </a:extLst>
           </p:cNvPr>
@@ -18638,10 +18498,10 @@
       </p:sp>
       <p:sp>
         <p:nvSpPr>
-          <p:cNvPr id="8" name="Title 7">
+          <p:cNvPr id="6" name="Title 5">
             <a:extLst>
               <a:ext uri="{FF2B5EF4-FFF2-40B4-BE49-F238E27FC236}">
-                <a16:creationId xmlns:a16="http://schemas.microsoft.com/office/drawing/2014/main" id="{31DAC928-E036-4AFA-8CF1-4156C654A61B}"/>
+                <a16:creationId xmlns:a16="http://schemas.microsoft.com/office/drawing/2014/main" id="{196F7678-A0ED-4A84-8835-D38DE69228E8}"/>
               </a:ext>
             </a:extLst>
           </p:cNvPr>
@@ -18652,29 +18512,24 @@
             <p:ph type="title"/>
           </p:nvPr>
         </p:nvSpPr>
-        <p:spPr>
-          <a:xfrm>
-            <a:off x="876980" y="705679"/>
-            <a:ext cx="10274496" cy="1004887"/>
-          </a:xfrm>
-        </p:spPr>
+        <p:spPr/>
         <p:txBody>
           <a:bodyPr/>
           <a:lstStyle/>
           <a:p>
             <a:r>
-              <a:rPr lang="en-US" sz="3200" dirty="0"/>
-              <a:t>Project Goal: Optimize Care Manager Intervention by focusing on patients likely to be hospitalized</a:t>
-            </a:r>
-          </a:p>
-        </p:txBody>
-      </p:sp>
-      <p:sp>
-        <p:nvSpPr>
-          <p:cNvPr id="11" name="Content Placeholder 10">
+              <a:rPr lang="en-US" sz="4000" dirty="0"/>
+              <a:t>Context: Learning Health System</a:t>
+            </a:r>
+          </a:p>
+        </p:txBody>
+      </p:sp>
+      <p:sp>
+        <p:nvSpPr>
+          <p:cNvPr id="10" name="Content Placeholder 9">
             <a:extLst>
               <a:ext uri="{FF2B5EF4-FFF2-40B4-BE49-F238E27FC236}">
-                <a16:creationId xmlns:a16="http://schemas.microsoft.com/office/drawing/2014/main" id="{BA7141A9-FEF1-4E54-A020-0F5C1132DA2B}"/>
+                <a16:creationId xmlns:a16="http://schemas.microsoft.com/office/drawing/2014/main" id="{32977DC1-8D77-41B6-B23C-D5881E5D6FBB}"/>
               </a:ext>
             </a:extLst>
           </p:cNvPr>
@@ -18687,7 +18542,7 @@
         </p:nvSpPr>
         <p:spPr>
           <a:xfrm>
-            <a:off x="876980" y="1835566"/>
+            <a:off x="876980" y="1761996"/>
             <a:ext cx="8838049" cy="4152900"/>
           </a:xfrm>
         </p:spPr>
@@ -18696,49 +18551,42 @@
           <a:lstStyle/>
           <a:p>
             <a:r>
-              <a:rPr lang="en-US" sz="2800" dirty="0"/>
-              <a:t>Strategy: Use Johns Hopkins’ Adjusted Clinical Groups (ACG) software.</a:t>
-            </a:r>
-          </a:p>
-          <a:p>
-            <a:r>
-              <a:rPr lang="en-US" sz="2800" dirty="0"/>
-              <a:t>ACG process takes the preceding 12 months worth of claims data as grist for its many useful indices and predictors.</a:t>
-            </a:r>
+              <a:rPr lang="en-US" sz="3200" dirty="0"/>
+              <a:t>Partnership between Research and Care Delivery</a:t>
+            </a:r>
+            <a:endParaRPr lang="en-US" sz="3200" dirty="0">
+              <a:sym typeface="Wingdings" panose="05000000000000000000" pitchFamily="2" charset="2"/>
+            </a:endParaRPr>
           </a:p>
           <a:p>
             <a:pPr lvl="1"/>
             <a:r>
-              <a:rPr lang="en-US" sz="2800" dirty="0"/>
-              <a:t>Uses Professional, Institutional and Pharmacy claims.</a:t>
-            </a:r>
-          </a:p>
-          <a:p>
-            <a:pPr lvl="1"/>
-            <a:r>
-              <a:rPr lang="en-US" sz="2800" dirty="0"/>
-              <a:t>But no clinical data.</a:t>
-            </a:r>
-          </a:p>
-          <a:p>
-            <a:pPr lvl="1"/>
-            <a:r>
-              <a:rPr lang="en-US" sz="2800" dirty="0"/>
-              <a:t>Because:</a:t>
-            </a:r>
-            <a:r>
-              <a:rPr lang="en-US" sz="2800" dirty="0">
+              <a:rPr lang="en-US" sz="3200" dirty="0">
                 <a:sym typeface="Wingdings" panose="05000000000000000000" pitchFamily="2" charset="2"/>
               </a:rPr>
-              <a:t> Developed against Insurance data  </a:t>
-            </a:r>
-            <a:r>
-              <a:rPr lang="en-US" sz="2800" dirty="0"/>
-              <a:t>Marketed to Insurers.</a:t>
-            </a:r>
-          </a:p>
-          <a:p>
-            <a:endParaRPr lang="en-US" sz="2800" dirty="0"/>
+              <a:t>Not Research</a:t>
+            </a:r>
+          </a:p>
+          <a:p>
+            <a:pPr lvl="1"/>
+            <a:r>
+              <a:rPr lang="en-US" sz="3200" dirty="0">
+                <a:sym typeface="Wingdings" panose="05000000000000000000" pitchFamily="2" charset="2"/>
+              </a:rPr>
+              <a:t>Aims at leveraging data to optimize care delivery</a:t>
+            </a:r>
+          </a:p>
+          <a:p>
+            <a:r>
+              <a:rPr lang="en-US" sz="3200" dirty="0"/>
+              <a:t>One Goal: reduce inpatient admissions by 2% </a:t>
+            </a:r>
+          </a:p>
+          <a:p>
+            <a:r>
+              <a:rPr lang="en-US" sz="3200" dirty="0"/>
+              <a:t>By optimizing the ops of our Care Management (CM) department.</a:t>
+            </a:r>
           </a:p>
         </p:txBody>
       </p:sp>
@@ -18747,7 +18595,7 @@
           <p:cNvPr id="7" name="Slide Number Placeholder 6">
             <a:extLst>
               <a:ext uri="{FF2B5EF4-FFF2-40B4-BE49-F238E27FC236}">
-                <a16:creationId xmlns:a16="http://schemas.microsoft.com/office/drawing/2014/main" id="{FCD980EF-7B09-4471-9FC1-17C5A4F38778}"/>
+                <a16:creationId xmlns:a16="http://schemas.microsoft.com/office/drawing/2014/main" id="{D44A96A6-A317-455E-A84C-717EDE44CA65}"/>
               </a:ext>
             </a:extLst>
           </p:cNvPr>
@@ -18775,7 +18623,7 @@
     </p:spTree>
     <p:extLst>
       <p:ext uri="{BB962C8B-B14F-4D97-AF65-F5344CB8AC3E}">
-        <p14:creationId xmlns:p14="http://schemas.microsoft.com/office/powerpoint/2010/main" val="1573242420"/>
+        <p14:creationId xmlns:p14="http://schemas.microsoft.com/office/powerpoint/2010/main" val="1790581713"/>
       </p:ext>
     </p:extLst>
   </p:cSld>
@@ -18807,7 +18655,7 @@
           <p:cNvPr id="15" name="Text Placeholder 14">
             <a:extLst>
               <a:ext uri="{FF2B5EF4-FFF2-40B4-BE49-F238E27FC236}">
-                <a16:creationId xmlns:a16="http://schemas.microsoft.com/office/drawing/2014/main" id="{59E44840-7339-422E-ACE2-30A1FD3F22A4}"/>
+                <a16:creationId xmlns:a16="http://schemas.microsoft.com/office/drawing/2014/main" id="{A0ECC5C5-1ADB-49B4-A9D2-7695B77F6128}"/>
               </a:ext>
             </a:extLst>
           </p:cNvPr>
@@ -18832,7 +18680,7 @@
           <p:cNvPr id="16" name="Text Placeholder 15">
             <a:extLst>
               <a:ext uri="{FF2B5EF4-FFF2-40B4-BE49-F238E27FC236}">
-                <a16:creationId xmlns:a16="http://schemas.microsoft.com/office/drawing/2014/main" id="{F5351FBA-3787-4AA1-B6A7-273EC4A563E4}"/>
+                <a16:creationId xmlns:a16="http://schemas.microsoft.com/office/drawing/2014/main" id="{EC7ECCA0-1157-412D-B37B-9219D925871D}"/>
               </a:ext>
             </a:extLst>
           </p:cNvPr>
@@ -18857,7 +18705,7 @@
           <p:cNvPr id="8" name="Title 7">
             <a:extLst>
               <a:ext uri="{FF2B5EF4-FFF2-40B4-BE49-F238E27FC236}">
-                <a16:creationId xmlns:a16="http://schemas.microsoft.com/office/drawing/2014/main" id="{D13EB8A0-21DB-401B-8C44-CBC58CBFCD2C}"/>
+                <a16:creationId xmlns:a16="http://schemas.microsoft.com/office/drawing/2014/main" id="{31DAC928-E036-4AFA-8CF1-4156C654A61B}"/>
               </a:ext>
             </a:extLst>
           </p:cNvPr>
@@ -18868,14 +18716,19 @@
             <p:ph type="title"/>
           </p:nvPr>
         </p:nvSpPr>
-        <p:spPr/>
+        <p:spPr>
+          <a:xfrm>
+            <a:off x="876980" y="705679"/>
+            <a:ext cx="10274496" cy="1004887"/>
+          </a:xfrm>
+        </p:spPr>
         <p:txBody>
           <a:bodyPr/>
           <a:lstStyle/>
           <a:p>
             <a:r>
               <a:rPr lang="en-US" sz="3200" dirty="0"/>
-              <a:t>Side Quest: Can we predict hospitalizations our own selves?</a:t>
+              <a:t>Strategy: Have CM concentrate on patients likely to be hospitalized</a:t>
             </a:r>
           </a:p>
         </p:txBody>
@@ -18885,7 +18738,7 @@
           <p:cNvPr id="11" name="Content Placeholder 10">
             <a:extLst>
               <a:ext uri="{FF2B5EF4-FFF2-40B4-BE49-F238E27FC236}">
-                <a16:creationId xmlns:a16="http://schemas.microsoft.com/office/drawing/2014/main" id="{4F05128F-1673-4290-AB22-8B83D8235B77}"/>
+                <a16:creationId xmlns:a16="http://schemas.microsoft.com/office/drawing/2014/main" id="{BA7141A9-FEF1-4E54-A020-0F5C1132DA2B}"/>
               </a:ext>
             </a:extLst>
           </p:cNvPr>
@@ -18898,7 +18751,7 @@
         </p:nvSpPr>
         <p:spPr>
           <a:xfrm>
-            <a:off x="876980" y="1761996"/>
+            <a:off x="876980" y="1835566"/>
             <a:ext cx="8838049" cy="4152900"/>
           </a:xfrm>
         </p:spPr>
@@ -18907,86 +18760,49 @@
           <a:lstStyle/>
           <a:p>
             <a:r>
-              <a:rPr lang="en-US" sz="2400" dirty="0"/>
-              <a:t>Cohort is everyone who had indication of CHF, Diabetes or Renal disease as of April 2016. N = 70,231.</a:t>
-            </a:r>
-          </a:p>
-          <a:p>
-            <a:r>
-              <a:rPr lang="en-US" sz="2400" dirty="0"/>
-              <a:t>Data Gathered over the </a:t>
-            </a:r>
-            <a:r>
-              <a:rPr lang="en-US" sz="2400" b="1" dirty="0"/>
-              <a:t>three</a:t>
-            </a:r>
-            <a:r>
-              <a:rPr lang="en-US" sz="2400" dirty="0"/>
-              <a:t> months prior to April 2016:</a:t>
+              <a:rPr lang="en-US" sz="2800" dirty="0"/>
+              <a:t>Tactic: Use Johns Hopkins’ Adjusted Clinical Groups (ACG) software.</a:t>
+            </a:r>
+          </a:p>
+          <a:p>
+            <a:r>
+              <a:rPr lang="en-US" sz="2800" dirty="0"/>
+              <a:t>ACG process takes the preceding 12 months worth of claims data as grist for its many useful indices and predictors.</a:t>
             </a:r>
           </a:p>
           <a:p>
             <a:pPr lvl="1"/>
             <a:r>
-              <a:rPr lang="en-US" sz="2400" dirty="0"/>
-              <a:t>Age/Sex</a:t>
+              <a:rPr lang="en-US" sz="2800" dirty="0"/>
+              <a:t>Uses Professional, Institutional and Pharmacy claims.</a:t>
             </a:r>
           </a:p>
           <a:p>
             <a:pPr lvl="1"/>
             <a:r>
-              <a:rPr lang="en-US" sz="2400" dirty="0"/>
-              <a:t>All pharmacy fills (by RxCUI)</a:t>
+              <a:rPr lang="en-US" sz="2800" dirty="0"/>
+              <a:t>But no clinical data.</a:t>
             </a:r>
           </a:p>
           <a:p>
             <a:pPr lvl="1"/>
             <a:r>
-              <a:rPr lang="en-US" sz="2400" dirty="0"/>
-              <a:t>All dx codes</a:t>
-            </a:r>
-          </a:p>
-          <a:p>
-            <a:pPr lvl="1"/>
-            <a:r>
-              <a:rPr lang="en-US" sz="2400" dirty="0"/>
-              <a:t>All </a:t>
-            </a:r>
-            <a:r>
-              <a:rPr lang="en-US" sz="2400" dirty="0" err="1"/>
-              <a:t>px</a:t>
-            </a:r>
-            <a:r>
-              <a:rPr lang="en-US" sz="2400" dirty="0"/>
-              <a:t> codes</a:t>
-            </a:r>
-          </a:p>
-          <a:p>
-            <a:pPr lvl="1"/>
-            <a:r>
-              <a:rPr lang="en-US" sz="2400" dirty="0"/>
-              <a:t>All VDW lab tests, including the abnormal indicator</a:t>
-            </a:r>
-          </a:p>
-          <a:p>
-            <a:pPr lvl="1"/>
-            <a:r>
-              <a:rPr lang="en-US" sz="2400" dirty="0"/>
-              <a:t>All BMI measures, categorized</a:t>
-            </a:r>
-          </a:p>
-          <a:p>
-            <a:pPr lvl="1"/>
-            <a:r>
-              <a:rPr lang="en-US" sz="2400" dirty="0"/>
-              <a:t>All blood pressure measures, categorized</a:t>
-            </a:r>
-          </a:p>
-          <a:p>
-            <a:endParaRPr lang="en-US" sz="2400" dirty="0"/>
-          </a:p>
-          <a:p>
-            <a:endParaRPr lang="en-US" sz="2400" dirty="0"/>
+              <a:rPr lang="en-US" sz="2800" dirty="0"/>
+              <a:t>Because:</a:t>
+            </a:r>
+            <a:r>
+              <a:rPr lang="en-US" sz="2800" dirty="0">
+                <a:sym typeface="Wingdings" panose="05000000000000000000" pitchFamily="2" charset="2"/>
+              </a:rPr>
+              <a:t> </a:t>
+            </a:r>
+            <a:r>
+              <a:rPr lang="en-US" sz="2800" dirty="0"/>
+              <a:t>Marketed to Insurers.</a:t>
+            </a:r>
+          </a:p>
+          <a:p>
+            <a:endParaRPr lang="en-US" sz="2800" dirty="0"/>
           </a:p>
         </p:txBody>
       </p:sp>
@@ -18995,7 +18811,7 @@
           <p:cNvPr id="7" name="Slide Number Placeholder 6">
             <a:extLst>
               <a:ext uri="{FF2B5EF4-FFF2-40B4-BE49-F238E27FC236}">
-                <a16:creationId xmlns:a16="http://schemas.microsoft.com/office/drawing/2014/main" id="{6CE869AE-08DC-4662-80C9-9B3A6D570B91}"/>
+                <a16:creationId xmlns:a16="http://schemas.microsoft.com/office/drawing/2014/main" id="{FCD980EF-7B09-4471-9FC1-17C5A4F38778}"/>
               </a:ext>
             </a:extLst>
           </p:cNvPr>
@@ -19023,7 +18839,7 @@
     </p:spTree>
     <p:extLst>
       <p:ext uri="{BB962C8B-B14F-4D97-AF65-F5344CB8AC3E}">
-        <p14:creationId xmlns:p14="http://schemas.microsoft.com/office/powerpoint/2010/main" val="4228170993"/>
+        <p14:creationId xmlns:p14="http://schemas.microsoft.com/office/powerpoint/2010/main" val="1573242420"/>
       </p:ext>
     </p:extLst>
   </p:cSld>
@@ -19034,7 +18850,7 @@
 </file>
 
 <file path=ppt/slides/slide6.xml><?xml version="1.0" encoding="utf-8"?>
-<p:sld xmlns:a="http://schemas.openxmlformats.org/drawingml/2006/main" xmlns:r="http://schemas.openxmlformats.org/officeDocument/2006/relationships" xmlns:p="http://schemas.openxmlformats.org/presentationml/2006/main" show="0">
+<p:sld xmlns:a="http://schemas.openxmlformats.org/drawingml/2006/main" xmlns:r="http://schemas.openxmlformats.org/officeDocument/2006/relationships" xmlns:p="http://schemas.openxmlformats.org/presentationml/2006/main">
   <p:cSld>
     <p:spTree>
       <p:nvGrpSpPr>
@@ -19052,10 +18868,10 @@
       </p:grpSpPr>
       <p:sp>
         <p:nvSpPr>
-          <p:cNvPr id="9" name="Text Placeholder 8">
+          <p:cNvPr id="15" name="Text Placeholder 14">
             <a:extLst>
               <a:ext uri="{FF2B5EF4-FFF2-40B4-BE49-F238E27FC236}">
-                <a16:creationId xmlns:a16="http://schemas.microsoft.com/office/drawing/2014/main" id="{0BB7C70F-B930-4A08-9874-5EB5B952FBB6}"/>
+                <a16:creationId xmlns:a16="http://schemas.microsoft.com/office/drawing/2014/main" id="{59E44840-7339-422E-ACE2-30A1FD3F22A4}"/>
               </a:ext>
             </a:extLst>
           </p:cNvPr>
@@ -19077,10 +18893,10 @@
       </p:sp>
       <p:sp>
         <p:nvSpPr>
-          <p:cNvPr id="10" name="Text Placeholder 9">
+          <p:cNvPr id="16" name="Text Placeholder 15">
             <a:extLst>
               <a:ext uri="{FF2B5EF4-FFF2-40B4-BE49-F238E27FC236}">
-                <a16:creationId xmlns:a16="http://schemas.microsoft.com/office/drawing/2014/main" id="{3CD43190-6448-403E-AAEB-0291C2BF3CB9}"/>
+                <a16:creationId xmlns:a16="http://schemas.microsoft.com/office/drawing/2014/main" id="{F5351FBA-3787-4AA1-B6A7-273EC4A563E4}"/>
               </a:ext>
             </a:extLst>
           </p:cNvPr>
@@ -19105,7 +18921,7 @@
           <p:cNvPr id="8" name="Title 7">
             <a:extLst>
               <a:ext uri="{FF2B5EF4-FFF2-40B4-BE49-F238E27FC236}">
-                <a16:creationId xmlns:a16="http://schemas.microsoft.com/office/drawing/2014/main" id="{D12D2D41-F1B7-4882-A14E-0A0F0F24CEDD}"/>
+                <a16:creationId xmlns:a16="http://schemas.microsoft.com/office/drawing/2014/main" id="{D13EB8A0-21DB-401B-8C44-CBC58CBFCD2C}"/>
               </a:ext>
             </a:extLst>
           </p:cNvPr>
@@ -19123,7 +18939,7 @@
           <a:p>
             <a:r>
               <a:rPr lang="en-US" sz="3200" dirty="0"/>
-              <a:t>Machine Learning/Data Science Approach</a:t>
+              <a:t>Side Quest: Can we predict hospitalizations our own selves?</a:t>
             </a:r>
           </a:p>
         </p:txBody>
@@ -19133,7 +18949,7 @@
           <p:cNvPr id="11" name="Content Placeholder 10">
             <a:extLst>
               <a:ext uri="{FF2B5EF4-FFF2-40B4-BE49-F238E27FC236}">
-                <a16:creationId xmlns:a16="http://schemas.microsoft.com/office/drawing/2014/main" id="{343C97C3-2563-413A-B310-6DEE32EA210C}"/>
+                <a16:creationId xmlns:a16="http://schemas.microsoft.com/office/drawing/2014/main" id="{4F05128F-1673-4290-AB22-8B83D8235B77}"/>
               </a:ext>
             </a:extLst>
           </p:cNvPr>
@@ -19156,87 +18972,85 @@
           <a:p>
             <a:r>
               <a:rPr lang="en-US" sz="2400" dirty="0"/>
-              <a:t>Outcome: Hospitalization in the following year.</a:t>
+              <a:t>Cohort is everyone who had indication of CHF, Diabetes or Renal disease as of April 2016. N = 70,231.</a:t>
+            </a:r>
+          </a:p>
+          <a:p>
+            <a:r>
+              <a:rPr lang="en-US" sz="2400" dirty="0"/>
+              <a:t>Data Gathered over the </a:t>
+            </a:r>
+            <a:r>
+              <a:rPr lang="en-US" sz="2400" b="1" dirty="0"/>
+              <a:t>three</a:t>
+            </a:r>
+            <a:r>
+              <a:rPr lang="en-US" sz="2400" dirty="0"/>
+              <a:t> months prior to April 2016:</a:t>
             </a:r>
           </a:p>
           <a:p>
             <a:pPr lvl="1"/>
             <a:r>
               <a:rPr lang="en-US" sz="2400" dirty="0"/>
-              <a:t>Taken from institutional claims.</a:t>
+              <a:t>Age/Sex</a:t>
             </a:r>
           </a:p>
           <a:p>
             <a:pPr lvl="1"/>
             <a:r>
               <a:rPr lang="en-US" sz="2400" dirty="0"/>
-              <a:t>Excluding DRGs signifying accidents or pregnancy.</a:t>
-            </a:r>
-          </a:p>
-          <a:p>
+              <a:t>All pharmacy fills (by RxCUI)</a:t>
+            </a:r>
+          </a:p>
+          <a:p>
+            <a:pPr lvl="1"/>
             <a:r>
               <a:rPr lang="en-US" sz="2400" dirty="0"/>
-              <a:t>The Machine Learning Approach:</a:t>
+              <a:t>All dx codes</a:t>
             </a:r>
           </a:p>
           <a:p>
             <a:pPr lvl="1"/>
             <a:r>
               <a:rPr lang="en-US" sz="2400" dirty="0"/>
-              <a:t>There are libraries of generic ML algorithms which can be applied to many prediction tasks.</a:t>
-            </a:r>
-          </a:p>
-          <a:p>
-            <a:pPr lvl="2"/>
+              <a:t>All </a:t>
+            </a:r>
+            <a:r>
+              <a:rPr lang="en-US" sz="2400" dirty="0" err="1"/>
+              <a:t>px</a:t>
+            </a:r>
             <a:r>
               <a:rPr lang="en-US" sz="2400" dirty="0"/>
-              <a:t>We used Python’s </a:t>
-            </a:r>
-            <a:r>
-              <a:rPr lang="en-US" sz="2400" dirty="0" err="1"/>
-              <a:t>scikit</a:t>
-            </a:r>
+              <a:t> codes</a:t>
+            </a:r>
+          </a:p>
+          <a:p>
+            <a:pPr lvl="1"/>
             <a:r>
               <a:rPr lang="en-US" sz="2400" dirty="0"/>
-              <a:t>-learn collection.</a:t>
+              <a:t>All VDW lab tests, including the abnormal indicator</a:t>
             </a:r>
           </a:p>
           <a:p>
             <a:pPr lvl="1"/>
             <a:r>
               <a:rPr lang="en-US" sz="2400" dirty="0"/>
-              <a:t>Feed your data + gold standard to those </a:t>
-            </a:r>
-            <a:r>
-              <a:rPr lang="en-US" sz="2400" dirty="0" err="1"/>
-              <a:t>algos</a:t>
-            </a:r>
+              <a:t>All BMI measures, categorized</a:t>
+            </a:r>
+          </a:p>
+          <a:p>
+            <a:pPr lvl="1"/>
             <a:r>
               <a:rPr lang="en-US" sz="2400" dirty="0"/>
-              <a:t> to “train” them.</a:t>
-            </a:r>
-          </a:p>
-          <a:p>
-            <a:pPr lvl="1"/>
-            <a:r>
-              <a:rPr lang="en-US" sz="2400" dirty="0"/>
-              <a:t>Then set the trained </a:t>
-            </a:r>
-            <a:r>
-              <a:rPr lang="en-US" sz="2400" dirty="0" err="1"/>
-              <a:t>algos</a:t>
-            </a:r>
-            <a:r>
-              <a:rPr lang="en-US" sz="2400" dirty="0"/>
-              <a:t> on some held-back “test” data.</a:t>
-            </a:r>
-          </a:p>
-          <a:p>
-            <a:pPr lvl="1"/>
-            <a:r>
-              <a:rPr lang="en-US" sz="2400" dirty="0"/>
-              <a:t>Evaluate predictions.</a:t>
-            </a:r>
+              <a:t>All blood pressure measures, categorized</a:t>
+            </a:r>
+          </a:p>
+          <a:p>
+            <a:endParaRPr lang="en-US" sz="2400" dirty="0"/>
+          </a:p>
+          <a:p>
+            <a:endParaRPr lang="en-US" sz="2400" dirty="0"/>
           </a:p>
         </p:txBody>
       </p:sp>
@@ -19245,7 +19059,7 @@
           <p:cNvPr id="7" name="Slide Number Placeholder 6">
             <a:extLst>
               <a:ext uri="{FF2B5EF4-FFF2-40B4-BE49-F238E27FC236}">
-                <a16:creationId xmlns:a16="http://schemas.microsoft.com/office/drawing/2014/main" id="{BF17C6AE-B0BF-4B05-A608-AE8D6B627893}"/>
+                <a16:creationId xmlns:a16="http://schemas.microsoft.com/office/drawing/2014/main" id="{6CE869AE-08DC-4662-80C9-9B3A6D570B91}"/>
               </a:ext>
             </a:extLst>
           </p:cNvPr>
@@ -19273,7 +19087,7 @@
     </p:spTree>
     <p:extLst>
       <p:ext uri="{BB962C8B-B14F-4D97-AF65-F5344CB8AC3E}">
-        <p14:creationId xmlns:p14="http://schemas.microsoft.com/office/powerpoint/2010/main" val="721174123"/>
+        <p14:creationId xmlns:p14="http://schemas.microsoft.com/office/powerpoint/2010/main" val="4228170993"/>
       </p:ext>
     </p:extLst>
   </p:cSld>
@@ -19652,14 +19466,14 @@
           <a:p>
             <a:r>
               <a:rPr lang="en-US" sz="2400" dirty="0"/>
-              <a:t>Poses the risk that you will essentially torture your models until they “memorize” your training data.</a:t>
+              <a:t>Poses the risk that you will torture your models until they essentially “memorize” your training data.</a:t>
             </a:r>
           </a:p>
           <a:p>
             <a:pPr lvl="1"/>
             <a:r>
               <a:rPr lang="en-US" sz="2400" dirty="0"/>
-              <a:t>Which makes for excellent stats &amp; demos—on your training data.</a:t>
+              <a:t>Which makes for excellent predictions—on your training data.</a:t>
             </a:r>
           </a:p>
           <a:p>
@@ -19672,15 +19486,36 @@
           <a:p>
             <a:r>
               <a:rPr lang="en-US" sz="2400" dirty="0"/>
-              <a:t>In the olden days, you’d have to be </a:t>
+              <a:t>Traditional stats hypothesis testing relies on mathematical argument.</a:t>
+            </a:r>
+          </a:p>
+          <a:p>
+            <a:r>
+              <a:rPr lang="en-US" sz="2400" dirty="0"/>
+              <a:t>But with data science you justify belief </a:t>
+            </a:r>
+            <a:r>
+              <a:rPr lang="en-US" sz="2400" i="1" dirty="0"/>
+              <a:t>empirically</a:t>
+            </a:r>
+            <a:r>
+              <a:rPr lang="en-US" sz="2400" dirty="0"/>
+              <a:t>.  </a:t>
+            </a:r>
+          </a:p>
+          <a:p>
+            <a:pPr lvl="1"/>
+            <a:r>
+              <a:rPr lang="en-US" sz="2400" dirty="0"/>
+              <a:t>You should believe my predictions </a:t>
             </a:r>
             <a:r>
               <a:rPr lang="en-US" sz="2400" b="1" dirty="0"/>
-              <a:t>very</a:t>
+              <a:t>because I’m demonstrating that they work</a:t>
             </a:r>
             <a:r>
               <a:rPr lang="en-US" sz="2400" dirty="0"/>
-              <a:t> stingy with the amount of iterating you could do and still rely on the logic of significance testing to make the argument that your results should generalize to new samples.</a:t>
+              <a:t>.</a:t>
             </a:r>
           </a:p>
         </p:txBody>

</xml_diff>

<commit_message>
HCSRN webinar tomorrow--tarting up the branding for LHS.
</commit_message>
<xml_diff>
--- a/analytics_for_hmos.pptx
+++ b/analytics_for_hmos.pptx
@@ -35,7 +35,7 @@
     <p:sldId id="276" r:id="rId26"/>
   </p:sldIdLst>
   <p:sldSz cx="12192000" cy="6858000"/>
-  <p:notesSz cx="6858000" cy="9144000"/>
+  <p:notesSz cx="7315200" cy="9601200"/>
   <p:defaultTextStyle>
     <a:defPPr>
       <a:defRPr lang="en-US"/>
@@ -197,17 +197,17 @@
         <p:spPr>
           <a:xfrm>
             <a:off x="0" y="0"/>
-            <a:ext cx="2971800" cy="458788"/>
+            <a:ext cx="3169920" cy="481727"/>
           </a:xfrm>
           <a:prstGeom prst="rect">
             <a:avLst/>
           </a:prstGeom>
         </p:spPr>
         <p:txBody>
-          <a:bodyPr vert="horz" lIns="91440" tIns="45720" rIns="91440" bIns="45720" rtlCol="0"/>
+          <a:bodyPr vert="horz" lIns="96661" tIns="48331" rIns="96661" bIns="48331" rtlCol="0"/>
           <a:lstStyle>
             <a:lvl1pPr algn="l">
-              <a:defRPr sz="1200"/>
+              <a:defRPr sz="1300"/>
             </a:lvl1pPr>
           </a:lstStyle>
           <a:p>
@@ -227,24 +227,24 @@
         </p:nvSpPr>
         <p:spPr>
           <a:xfrm>
-            <a:off x="3884613" y="0"/>
-            <a:ext cx="2971800" cy="458788"/>
+            <a:off x="4143587" y="0"/>
+            <a:ext cx="3169920" cy="481727"/>
           </a:xfrm>
           <a:prstGeom prst="rect">
             <a:avLst/>
           </a:prstGeom>
         </p:spPr>
         <p:txBody>
-          <a:bodyPr vert="horz" lIns="91440" tIns="45720" rIns="91440" bIns="45720" rtlCol="0"/>
+          <a:bodyPr vert="horz" lIns="96661" tIns="48331" rIns="96661" bIns="48331" rtlCol="0"/>
           <a:lstStyle>
             <a:lvl1pPr algn="r">
-              <a:defRPr sz="1200"/>
+              <a:defRPr sz="1300"/>
             </a:lvl1pPr>
           </a:lstStyle>
           <a:p>
             <a:fld id="{51870728-32F9-4016-A7F9-3908380B41C6}" type="datetimeFigureOut">
               <a:rPr lang="en-US" smtClean="0"/>
-              <a:t>3/26/2019</a:t>
+              <a:t>4/11/2019</a:t>
             </a:fld>
             <a:endParaRPr lang="en-US"/>
           </a:p>
@@ -262,8 +262,8 @@
         </p:nvSpPr>
         <p:spPr>
           <a:xfrm>
-            <a:off x="685800" y="1143000"/>
-            <a:ext cx="5486400" cy="3086100"/>
+            <a:off x="777875" y="1200150"/>
+            <a:ext cx="5759450" cy="3240088"/>
           </a:xfrm>
           <a:prstGeom prst="rect">
             <a:avLst/>
@@ -276,7 +276,7 @@
           </a:ln>
         </p:spPr>
         <p:txBody>
-          <a:bodyPr vert="horz" lIns="91440" tIns="45720" rIns="91440" bIns="45720" rtlCol="0" anchor="ctr"/>
+          <a:bodyPr vert="horz" lIns="96661" tIns="48331" rIns="96661" bIns="48331" rtlCol="0" anchor="ctr"/>
           <a:lstStyle/>
           <a:p>
             <a:endParaRPr lang="en-US"/>
@@ -295,15 +295,15 @@
         </p:nvSpPr>
         <p:spPr>
           <a:xfrm>
-            <a:off x="685800" y="4400550"/>
-            <a:ext cx="5486400" cy="3600450"/>
+            <a:off x="731520" y="4620577"/>
+            <a:ext cx="5852160" cy="3780473"/>
           </a:xfrm>
           <a:prstGeom prst="rect">
             <a:avLst/>
           </a:prstGeom>
         </p:spPr>
         <p:txBody>
-          <a:bodyPr vert="horz" lIns="91440" tIns="45720" rIns="91440" bIns="45720" rtlCol="0"/>
+          <a:bodyPr vert="horz" lIns="96661" tIns="48331" rIns="96661" bIns="48331" rtlCol="0"/>
           <a:lstStyle/>
           <a:p>
             <a:pPr lvl="0"/>
@@ -354,18 +354,18 @@
         </p:nvSpPr>
         <p:spPr>
           <a:xfrm>
-            <a:off x="0" y="8685213"/>
-            <a:ext cx="2971800" cy="458787"/>
+            <a:off x="0" y="9119474"/>
+            <a:ext cx="3169920" cy="481726"/>
           </a:xfrm>
           <a:prstGeom prst="rect">
             <a:avLst/>
           </a:prstGeom>
         </p:spPr>
         <p:txBody>
-          <a:bodyPr vert="horz" lIns="91440" tIns="45720" rIns="91440" bIns="45720" rtlCol="0" anchor="b"/>
+          <a:bodyPr vert="horz" lIns="96661" tIns="48331" rIns="96661" bIns="48331" rtlCol="0" anchor="b"/>
           <a:lstStyle>
             <a:lvl1pPr algn="l">
-              <a:defRPr sz="1200"/>
+              <a:defRPr sz="1300"/>
             </a:lvl1pPr>
           </a:lstStyle>
           <a:p>
@@ -385,18 +385,18 @@
         </p:nvSpPr>
         <p:spPr>
           <a:xfrm>
-            <a:off x="3884613" y="8685213"/>
-            <a:ext cx="2971800" cy="458787"/>
+            <a:off x="4143587" y="9119474"/>
+            <a:ext cx="3169920" cy="481726"/>
           </a:xfrm>
           <a:prstGeom prst="rect">
             <a:avLst/>
           </a:prstGeom>
         </p:spPr>
         <p:txBody>
-          <a:bodyPr vert="horz" lIns="91440" tIns="45720" rIns="91440" bIns="45720" rtlCol="0" anchor="b"/>
+          <a:bodyPr vert="horz" lIns="96661" tIns="48331" rIns="96661" bIns="48331" rtlCol="0" anchor="b"/>
           <a:lstStyle>
             <a:lvl1pPr algn="r">
-              <a:defRPr sz="1200"/>
+              <a:defRPr sz="1300"/>
             </a:lvl1pPr>
           </a:lstStyle>
           <a:p>
@@ -555,277 +555,37 @@
           <a:bodyPr/>
           <a:lstStyle/>
           <a:p>
-            <a:pPr marL="0" marR="0" lvl="0" indent="0" algn="l" defTabSz="914400" rtl="0" eaLnBrk="1" fontAlgn="auto" latinLnBrk="0" hangingPunct="1">
-              <a:lnSpc>
-                <a:spcPct val="100000"/>
-              </a:lnSpc>
-              <a:spcBef>
-                <a:spcPts val="0"/>
-              </a:spcBef>
-              <a:spcAft>
-                <a:spcPts val="0"/>
-              </a:spcAft>
-              <a:buClrTx/>
-              <a:buSzTx/>
-              <a:buFontTx/>
-              <a:buNone/>
-              <a:tabLst/>
+            <a:pPr defTabSz="966612">
               <a:defRPr/>
             </a:pPr>
             <a:r>
-              <a:rPr lang="en-US" sz="1200" kern="1200" dirty="0">
-                <a:solidFill>
-                  <a:schemeClr val="tx1"/>
-                </a:solidFill>
-                <a:effectLst/>
-                <a:latin typeface="+mn-lt"/>
-                <a:ea typeface="+mn-ea"/>
-                <a:cs typeface="+mn-cs"/>
-              </a:rPr>
+              <a:rPr lang="en-US" sz="1300" dirty="0"/>
               <a:t>Your oral abstract presentation is scheduled for</a:t>
             </a:r>
             <a:r>
-              <a:rPr lang="en-US" sz="1200" b="1" kern="1200" dirty="0">
-                <a:solidFill>
-                  <a:schemeClr val="tx1"/>
-                </a:solidFill>
-                <a:effectLst/>
-                <a:latin typeface="+mn-lt"/>
-                <a:ea typeface="+mn-ea"/>
-                <a:cs typeface="+mn-cs"/>
-              </a:rPr>
+              <a:rPr lang="en-US" sz="1300" b="1" dirty="0"/>
               <a:t> </a:t>
             </a:r>
             <a:r>
-              <a:rPr lang="en-US" sz="1200" kern="1200" dirty="0">
-                <a:solidFill>
-                  <a:schemeClr val="tx1"/>
-                </a:solidFill>
-                <a:effectLst/>
-                <a:latin typeface="+mn-lt"/>
-                <a:ea typeface="+mn-ea"/>
-                <a:cs typeface="+mn-cs"/>
-              </a:rPr>
+              <a:rPr lang="en-US" sz="1300" dirty="0"/>
               <a:t>a 15-minute talk plus 3-minute Q&amp;A on</a:t>
             </a:r>
             <a:r>
-              <a:rPr lang="en-US" sz="1200" b="1" kern="1200" dirty="0">
-                <a:solidFill>
-                  <a:schemeClr val="tx1"/>
-                </a:solidFill>
-                <a:effectLst/>
-                <a:latin typeface="+mn-lt"/>
-                <a:ea typeface="+mn-ea"/>
-                <a:cs typeface="+mn-cs"/>
-              </a:rPr>
+              <a:rPr lang="en-US" sz="1300" b="1" dirty="0"/>
               <a:t> Tuesday, April 9</a:t>
             </a:r>
             <a:r>
-              <a:rPr lang="en-US" sz="1200" kern="1200" dirty="0">
-                <a:solidFill>
-                  <a:schemeClr val="tx1"/>
-                </a:solidFill>
-                <a:effectLst/>
-                <a:latin typeface="+mn-lt"/>
-                <a:ea typeface="+mn-ea"/>
-                <a:cs typeface="+mn-cs"/>
-              </a:rPr>
+              <a:rPr lang="en-US" sz="1300" dirty="0"/>
               <a:t> at</a:t>
             </a:r>
             <a:r>
-              <a:rPr lang="en-US" sz="1200" b="1" kern="1200" dirty="0">
-                <a:solidFill>
-                  <a:schemeClr val="tx1"/>
-                </a:solidFill>
-                <a:effectLst/>
-                <a:latin typeface="+mn-lt"/>
-                <a:ea typeface="+mn-ea"/>
-                <a:cs typeface="+mn-cs"/>
-              </a:rPr>
+              <a:rPr lang="en-US" sz="1300" b="1" dirty="0"/>
               <a:t> 8:54:00 AM - 9:12:00 AM</a:t>
             </a:r>
             <a:r>
-              <a:rPr lang="en-US" sz="1200" kern="1200" dirty="0">
-                <a:solidFill>
-                  <a:schemeClr val="tx1"/>
-                </a:solidFill>
-                <a:effectLst/>
-                <a:latin typeface="+mn-lt"/>
-                <a:ea typeface="+mn-ea"/>
-                <a:cs typeface="+mn-cs"/>
-              </a:rPr>
+              <a:rPr lang="en-US" sz="1300" dirty="0"/>
               <a:t>. Please note: following the oral presentations, there will be an 18-minute moderated Q&amp;A session for all session presenters.</a:t>
             </a:r>
-          </a:p>
-          <a:p>
-            <a:endParaRPr lang="en-US" dirty="0"/>
-          </a:p>
-          <a:p>
-            <a:r>
-              <a:rPr lang="en-US" sz="1200" b="1" kern="1200" dirty="0">
-                <a:solidFill>
-                  <a:schemeClr val="tx1"/>
-                </a:solidFill>
-                <a:effectLst/>
-                <a:latin typeface="+mn-lt"/>
-                <a:ea typeface="+mn-ea"/>
-                <a:cs typeface="+mn-cs"/>
-              </a:rPr>
-              <a:t>PRESENTATION GUIDELINES</a:t>
-            </a:r>
-            <a:endParaRPr lang="en-US" sz="1200" kern="1200" dirty="0">
-              <a:solidFill>
-                <a:schemeClr val="tx1"/>
-              </a:solidFill>
-              <a:effectLst/>
-              <a:latin typeface="+mn-lt"/>
-              <a:ea typeface="+mn-ea"/>
-              <a:cs typeface="+mn-cs"/>
-            </a:endParaRPr>
-          </a:p>
-          <a:p>
-            <a:pPr lvl="0"/>
-            <a:r>
-              <a:rPr lang="en-US" sz="1200" kern="1200" dirty="0">
-                <a:solidFill>
-                  <a:schemeClr val="tx1"/>
-                </a:solidFill>
-                <a:effectLst/>
-                <a:latin typeface="+mn-lt"/>
-                <a:ea typeface="+mn-ea"/>
-                <a:cs typeface="+mn-cs"/>
-              </a:rPr>
-              <a:t>All presentations must be submitted in advance of the conference. Please upload both a PowerPoint file and PDF file of your presentation using the following link: </a:t>
-            </a:r>
-            <a:r>
-              <a:rPr lang="en-US" sz="1200" u="sng" kern="1200" dirty="0">
-                <a:solidFill>
-                  <a:schemeClr val="tx1"/>
-                </a:solidFill>
-                <a:effectLst/>
-                <a:latin typeface="+mn-lt"/>
-                <a:ea typeface="+mn-ea"/>
-                <a:cs typeface="+mn-cs"/>
-                <a:hlinkClick r:id="rId3"/>
-              </a:rPr>
-              <a:t>hcsrnmeeting.org/presentations</a:t>
-            </a:r>
-            <a:r>
-              <a:rPr lang="en-US" sz="1200" kern="1200" dirty="0">
-                <a:solidFill>
-                  <a:schemeClr val="tx1"/>
-                </a:solidFill>
-                <a:effectLst/>
-                <a:latin typeface="+mn-lt"/>
-                <a:ea typeface="+mn-ea"/>
-                <a:cs typeface="+mn-cs"/>
-              </a:rPr>
-              <a:t> </a:t>
-            </a:r>
-          </a:p>
-          <a:p>
-            <a:pPr lvl="0"/>
-            <a:r>
-              <a:rPr lang="en-US" sz="1200" kern="1200" dirty="0">
-                <a:solidFill>
-                  <a:schemeClr val="tx1"/>
-                </a:solidFill>
-                <a:effectLst/>
-                <a:latin typeface="+mn-lt"/>
-                <a:ea typeface="+mn-ea"/>
-                <a:cs typeface="+mn-cs"/>
-              </a:rPr>
-              <a:t>Presentations must be uploaded by Wednesday, March 27, 2019. </a:t>
-            </a:r>
-          </a:p>
-          <a:p>
-            <a:pPr lvl="0"/>
-            <a:r>
-              <a:rPr lang="en-US" sz="1200" kern="1200" dirty="0">
-                <a:solidFill>
-                  <a:schemeClr val="tx1"/>
-                </a:solidFill>
-                <a:effectLst/>
-                <a:latin typeface="+mn-lt"/>
-                <a:ea typeface="+mn-ea"/>
-                <a:cs typeface="+mn-cs"/>
-              </a:rPr>
-              <a:t>Personal laptops may not be used at the Conference. A PC will be provided with the latest version of PowerPoint.</a:t>
-            </a:r>
-          </a:p>
-          <a:p>
-            <a:pPr lvl="0"/>
-            <a:r>
-              <a:rPr lang="en-US" sz="1200" b="1" kern="1200" dirty="0">
-                <a:solidFill>
-                  <a:schemeClr val="tx1"/>
-                </a:solidFill>
-                <a:effectLst/>
-                <a:latin typeface="+mn-lt"/>
-                <a:ea typeface="+mn-ea"/>
-                <a:cs typeface="+mn-cs"/>
-              </a:rPr>
-              <a:t>Projectors will be set in 16:9 format.</a:t>
-            </a:r>
-            <a:r>
-              <a:rPr lang="en-US" sz="1200" kern="1200" dirty="0">
-                <a:solidFill>
-                  <a:schemeClr val="tx1"/>
-                </a:solidFill>
-                <a:effectLst/>
-                <a:latin typeface="+mn-lt"/>
-                <a:ea typeface="+mn-ea"/>
-                <a:cs typeface="+mn-cs"/>
-              </a:rPr>
-              <a:t> Please format your presentation slides in “widescreen.”</a:t>
-            </a:r>
-          </a:p>
-          <a:p>
-            <a:pPr lvl="0"/>
-            <a:r>
-              <a:rPr lang="en-US" sz="1200" kern="1200" dirty="0">
-                <a:solidFill>
-                  <a:schemeClr val="tx1"/>
-                </a:solidFill>
-                <a:effectLst/>
-                <a:latin typeface="+mn-lt"/>
-                <a:ea typeface="+mn-ea"/>
-                <a:cs typeface="+mn-cs"/>
-              </a:rPr>
-              <a:t>Immediately following the Conference, your presentation will be posted as a PDF on the conference website for download. If you have propriety information that cannot be posted to the website, please also provide a web-version of your presentation with the propriety information removed. Be sure all materials being uploaded are properly accredited and appropriate permission has been given to all copyrighted information. </a:t>
-            </a:r>
-          </a:p>
-          <a:p>
-            <a:pPr lvl="0"/>
-            <a:r>
-              <a:rPr lang="en-US" sz="1200" kern="1200" dirty="0">
-                <a:solidFill>
-                  <a:schemeClr val="tx1"/>
-                </a:solidFill>
-                <a:effectLst/>
-                <a:latin typeface="+mn-lt"/>
-                <a:ea typeface="+mn-ea"/>
-                <a:cs typeface="+mn-cs"/>
-              </a:rPr>
-              <a:t>If you do not want your presentation posted on the website, please indicate so on the presentation upload site. </a:t>
-            </a:r>
-          </a:p>
-          <a:p>
-            <a:r>
-              <a:rPr lang="en-US" sz="1200" kern="1200" dirty="0">
-                <a:solidFill>
-                  <a:schemeClr val="tx1"/>
-                </a:solidFill>
-                <a:effectLst/>
-                <a:latin typeface="+mn-lt"/>
-                <a:ea typeface="+mn-ea"/>
-                <a:cs typeface="+mn-cs"/>
-              </a:rPr>
-              <a:t> </a:t>
-            </a:r>
-          </a:p>
-          <a:p>
-            <a:endParaRPr lang="en-US" dirty="0"/>
           </a:p>
         </p:txBody>
       </p:sp>
@@ -1127,224 +887,78 @@
           <a:bodyPr/>
           <a:lstStyle/>
           <a:p>
-            <a:pPr marL="0" marR="0" lvl="0" indent="0" algn="l" defTabSz="914400" rtl="0" eaLnBrk="1" fontAlgn="auto" latinLnBrk="0" hangingPunct="1">
-              <a:lnSpc>
-                <a:spcPct val="100000"/>
-              </a:lnSpc>
-              <a:spcBef>
-                <a:spcPts val="0"/>
-              </a:spcBef>
-              <a:spcAft>
-                <a:spcPts val="0"/>
-              </a:spcAft>
-              <a:buClrTx/>
-              <a:buSzTx/>
-              <a:buFontTx/>
-              <a:buNone/>
-              <a:tabLst/>
+            <a:pPr defTabSz="966612">
               <a:defRPr/>
             </a:pPr>
             <a:r>
-              <a:rPr lang="en-US" sz="1200" kern="1200" dirty="0">
-                <a:solidFill>
-                  <a:schemeClr val="tx1"/>
-                </a:solidFill>
-                <a:effectLst/>
-                <a:latin typeface="+mn-lt"/>
-                <a:ea typeface="+mn-ea"/>
-                <a:cs typeface="+mn-cs"/>
-              </a:rPr>
+              <a:rPr lang="en-US" sz="1300" dirty="0"/>
               <a:t>Couple of lines of particular interest:</a:t>
             </a:r>
           </a:p>
           <a:p>
-            <a:pPr marL="228600" marR="0" lvl="0" indent="-228600" algn="l" defTabSz="914400" rtl="0" eaLnBrk="1" fontAlgn="auto" latinLnBrk="0" hangingPunct="1">
-              <a:lnSpc>
-                <a:spcPct val="100000"/>
-              </a:lnSpc>
-              <a:spcBef>
-                <a:spcPts val="0"/>
-              </a:spcBef>
-              <a:spcAft>
-                <a:spcPts val="0"/>
-              </a:spcAft>
-              <a:buClrTx/>
-              <a:buSzTx/>
+            <a:pPr marL="241653" indent="-241653" defTabSz="966612">
               <a:buFont typeface="+mj-lt"/>
               <a:buAutoNum type="arabicPeriod"/>
-              <a:tabLst/>
               <a:defRPr/>
             </a:pPr>
             <a:r>
-              <a:rPr lang="en-US" sz="1200" kern="1200" dirty="0">
-                <a:solidFill>
-                  <a:schemeClr val="tx1"/>
-                </a:solidFill>
-                <a:effectLst/>
-                <a:latin typeface="+mn-lt"/>
-                <a:ea typeface="+mn-ea"/>
-                <a:cs typeface="+mn-cs"/>
-              </a:rPr>
+              <a:rPr lang="en-US" sz="1300" dirty="0"/>
               <a:t>The purple ‘cheating’ line is what we get if we order people by their true status—we put everyone who was in fact hospitalized up to the beginning of the line, and have godlike, perfect ‘prediction’.  That represents the absolute best that any predictor could possibly do.  Nobody is in that neighborhood—not even ACG.</a:t>
             </a:r>
           </a:p>
           <a:p>
-            <a:pPr marL="228600" marR="0" lvl="0" indent="-228600" algn="l" defTabSz="914400" rtl="0" eaLnBrk="1" fontAlgn="auto" latinLnBrk="0" hangingPunct="1">
-              <a:lnSpc>
-                <a:spcPct val="100000"/>
-              </a:lnSpc>
-              <a:spcBef>
-                <a:spcPts val="0"/>
-              </a:spcBef>
-              <a:spcAft>
-                <a:spcPts val="0"/>
-              </a:spcAft>
-              <a:buClrTx/>
-              <a:buSzTx/>
+            <a:pPr marL="241653" indent="-241653" defTabSz="966612">
               <a:buFont typeface="+mj-lt"/>
               <a:buAutoNum type="arabicPeriod"/>
-              <a:tabLst/>
               <a:defRPr/>
             </a:pPr>
             <a:r>
-              <a:rPr lang="en-US" sz="1200" kern="1200" dirty="0">
-                <a:solidFill>
-                  <a:schemeClr val="tx1"/>
-                </a:solidFill>
-                <a:effectLst/>
-                <a:latin typeface="+mn-lt"/>
-                <a:ea typeface="+mn-ea"/>
-                <a:cs typeface="+mn-cs"/>
-              </a:rPr>
+              <a:rPr lang="en-US" sz="1300" dirty="0"/>
               <a:t>The dull yellow-green 45-degree line in the middle is what we get if we order people randomly.  That’s what we should expect to see from a complete bullshit, snake-oil predictor.  Astoundingly, Naïve Bayes manages to be worse than this.  Possibly we’re using it incorrectly somehow—not sure.</a:t>
             </a:r>
           </a:p>
           <a:p>
-            <a:pPr marL="228600" marR="0" lvl="0" indent="-228600" algn="l" defTabSz="914400" rtl="0" eaLnBrk="1" fontAlgn="auto" latinLnBrk="0" hangingPunct="1">
-              <a:lnSpc>
-                <a:spcPct val="100000"/>
-              </a:lnSpc>
-              <a:spcBef>
-                <a:spcPts val="0"/>
-              </a:spcBef>
-              <a:spcAft>
-                <a:spcPts val="0"/>
-              </a:spcAft>
-              <a:buClrTx/>
-              <a:buSzTx/>
+            <a:pPr marL="241653" indent="-241653" defTabSz="966612">
               <a:buFont typeface="+mj-lt"/>
               <a:buAutoNum type="arabicPeriod"/>
-              <a:tabLst/>
               <a:defRPr/>
             </a:pPr>
             <a:r>
-              <a:rPr lang="en-US" sz="1200" kern="1200" dirty="0">
-                <a:solidFill>
-                  <a:schemeClr val="tx1"/>
-                </a:solidFill>
-                <a:effectLst/>
-                <a:latin typeface="+mn-lt"/>
-                <a:ea typeface="+mn-ea"/>
-                <a:cs typeface="+mn-cs"/>
-              </a:rPr>
+              <a:rPr lang="en-US" sz="1300" dirty="0"/>
               <a:t>The turquoise line is of course ACG—that’s what we’re shooting at. It’s a pretty clear favorite over the entire range of the development sample here.  Pre-2,500 people there are two candidates that give ACG a run for its money, but after that ACG pulls away.</a:t>
             </a:r>
           </a:p>
           <a:p>
-            <a:pPr marL="228600" marR="0" lvl="0" indent="-228600" algn="l" defTabSz="914400" rtl="0" eaLnBrk="1" fontAlgn="auto" latinLnBrk="0" hangingPunct="1">
-              <a:lnSpc>
-                <a:spcPct val="100000"/>
-              </a:lnSpc>
-              <a:spcBef>
-                <a:spcPts val="0"/>
-              </a:spcBef>
-              <a:spcAft>
-                <a:spcPts val="0"/>
-              </a:spcAft>
-              <a:buClrTx/>
-              <a:buSzTx/>
+            <a:pPr marL="241653" indent="-241653" defTabSz="966612">
               <a:buFont typeface="+mj-lt"/>
               <a:buAutoNum type="arabicPeriod"/>
-              <a:tabLst/>
               <a:defRPr/>
             </a:pPr>
             <a:r>
-              <a:rPr lang="en-US" sz="1200" kern="1200" dirty="0">
-                <a:solidFill>
-                  <a:schemeClr val="tx1"/>
-                </a:solidFill>
-                <a:effectLst/>
-                <a:latin typeface="+mn-lt"/>
-                <a:ea typeface="+mn-ea"/>
-                <a:cs typeface="+mn-cs"/>
-              </a:rPr>
+              <a:rPr lang="en-US" sz="1300" dirty="0"/>
               <a:t>BUT! On the left hand side of the axis, we have two candidate scores that look pretty darn good—Support Vector Classifier and Random Forest.  That’s a pretty important part of the graph actually, because just like you don’t normally have time to page through the 2d, 3</a:t>
             </a:r>
             <a:r>
-              <a:rPr lang="en-US" sz="1200" kern="1200" baseline="30000" dirty="0">
-                <a:solidFill>
-                  <a:schemeClr val="tx1"/>
-                </a:solidFill>
-                <a:effectLst/>
-                <a:latin typeface="+mn-lt"/>
-                <a:ea typeface="+mn-ea"/>
-                <a:cs typeface="+mn-cs"/>
-              </a:rPr>
+              <a:rPr lang="en-US" sz="1300" baseline="30000" dirty="0"/>
               <a:t>rd</a:t>
             </a:r>
             <a:r>
-              <a:rPr lang="en-US" sz="1200" kern="1200" dirty="0">
-                <a:solidFill>
-                  <a:schemeClr val="tx1"/>
-                </a:solidFill>
-                <a:effectLst/>
-                <a:latin typeface="+mn-lt"/>
-                <a:ea typeface="+mn-ea"/>
-                <a:cs typeface="+mn-cs"/>
-              </a:rPr>
+              <a:rPr lang="en-US" sz="1300" dirty="0"/>
               <a:t>, 4</a:t>
             </a:r>
             <a:r>
-              <a:rPr lang="en-US" sz="1200" kern="1200" baseline="30000" dirty="0">
-                <a:solidFill>
-                  <a:schemeClr val="tx1"/>
-                </a:solidFill>
-                <a:effectLst/>
-                <a:latin typeface="+mn-lt"/>
-                <a:ea typeface="+mn-ea"/>
-                <a:cs typeface="+mn-cs"/>
-              </a:rPr>
+              <a:rPr lang="en-US" sz="1300" baseline="30000" dirty="0"/>
               <a:t>th</a:t>
             </a:r>
             <a:r>
-              <a:rPr lang="en-US" sz="1200" kern="1200" dirty="0">
-                <a:solidFill>
-                  <a:schemeClr val="tx1"/>
-                </a:solidFill>
-                <a:effectLst/>
-                <a:latin typeface="+mn-lt"/>
-                <a:ea typeface="+mn-ea"/>
-                <a:cs typeface="+mn-cs"/>
-              </a:rPr>
+              <a:rPr lang="en-US" sz="1300" dirty="0"/>
               <a:t> pages of google results that you get on a search, CM folks don’t have time to get involved with 2500 people. So all is not lost here. If we can deliver say, the top 300 people most likely to be hospitalized, we’ve got a win.</a:t>
             </a:r>
           </a:p>
           <a:p>
-            <a:pPr marL="228600" marR="0" lvl="0" indent="-228600" algn="l" defTabSz="914400" rtl="0" eaLnBrk="1" fontAlgn="auto" latinLnBrk="0" hangingPunct="1">
-              <a:lnSpc>
-                <a:spcPct val="100000"/>
-              </a:lnSpc>
-              <a:spcBef>
-                <a:spcPts val="0"/>
-              </a:spcBef>
-              <a:spcAft>
-                <a:spcPts val="0"/>
-              </a:spcAft>
-              <a:buClrTx/>
-              <a:buSzTx/>
+            <a:pPr marL="241653" indent="-241653" defTabSz="966612">
               <a:buFont typeface="+mj-lt"/>
               <a:buAutoNum type="arabicPeriod"/>
-              <a:tabLst/>
               <a:defRPr/>
             </a:pPr>
             <a:endParaRPr lang="en-US" dirty="0"/>
@@ -2190,40 +1804,32 @@
           </a:p>
           <a:p>
             <a:r>
-              <a:rPr lang="en-US" sz="2000" dirty="0"/>
+              <a:rPr lang="en-US" dirty="0"/>
               <a:t>Of course we’ve been doing this way before it was cool</a:t>
             </a:r>
           </a:p>
           <a:p>
             <a:pPr lvl="1"/>
             <a:r>
-              <a:rPr lang="en-US" sz="2000" dirty="0"/>
+              <a:rPr lang="en-US" dirty="0"/>
               <a:t>But mostly in a research context</a:t>
             </a:r>
           </a:p>
           <a:p>
             <a:pPr lvl="1"/>
             <a:r>
-              <a:rPr lang="en-US" sz="2000" dirty="0"/>
-              <a:t>Catnip is </a:t>
-            </a:r>
-            <a:r>
-              <a:rPr lang="en-US" sz="2000" i="1" dirty="0"/>
-              <a:t>mostly</a:t>
-            </a:r>
-            <a:r>
-              <a:rPr lang="en-US" sz="2000" dirty="0"/>
-              <a:t> contributions to the academic literature—publications.</a:t>
+              <a:rPr lang="en-US" dirty="0"/>
+              <a:t>Catnip is mostly contributions to the academic literature—publications.</a:t>
             </a:r>
           </a:p>
           <a:p>
             <a:pPr lvl="1"/>
-            <a:endParaRPr lang="en-US" sz="2000" dirty="0"/>
+            <a:endParaRPr lang="en-US" dirty="0"/>
           </a:p>
           <a:p>
             <a:pPr lvl="1"/>
             <a:r>
-              <a:rPr lang="en-US" sz="2000" dirty="0"/>
+              <a:rPr lang="en-US" dirty="0"/>
               <a:t>This is a different orientation—this is brute-force prediction for fun and profit.  We are not looking to unlock secrets of medicine or science here.  If we do, great, but the cheese here is to make a prediction that we can act on in order to save $$.</a:t>
             </a:r>
           </a:p>
@@ -2425,15 +2031,7 @@
           <a:lstStyle/>
           <a:p>
             <a:r>
-              <a:rPr lang="en-US" sz="1200" b="0" i="0" kern="1200" dirty="0">
-                <a:solidFill>
-                  <a:schemeClr val="tx1"/>
-                </a:solidFill>
-                <a:effectLst/>
-                <a:latin typeface="+mn-lt"/>
-                <a:ea typeface="+mn-ea"/>
-                <a:cs typeface="+mn-cs"/>
-              </a:rPr>
+              <a:rPr lang="en-US" sz="1300" dirty="0"/>
               <a:t>KPWA’s Complex Case Management program “coordinates the care and services of members with multiple chronic conditions and complicated medical/social needs often resulting in the extensive use of resources. The CCM program is designed to comply with the standards set for the by the National Committee on Quality Assurance (NCQA) and is integral to the accreditation for the health plan. The RN case managers are at minimum bachelor’s level educated and are certified by the Commission for Case Management Certification (CCMC). The social work case managers are licensed independent clinical social workers (LICSW).”</a:t>
             </a:r>
             <a:endParaRPr lang="en-US" dirty="0"/>
@@ -2871,33 +2469,19 @@
             <a:endParaRPr lang="en-US" dirty="0"/>
           </a:p>
           <a:p>
-            <a:pPr marL="0" marR="0" lvl="0" indent="0" algn="l" defTabSz="914400" rtl="0" eaLnBrk="1" fontAlgn="auto" latinLnBrk="0" hangingPunct="1">
-              <a:lnSpc>
-                <a:spcPct val="100000"/>
-              </a:lnSpc>
-              <a:spcBef>
-                <a:spcPts val="0"/>
-              </a:spcBef>
-              <a:spcAft>
-                <a:spcPts val="0"/>
-              </a:spcAft>
-              <a:buClrTx/>
-              <a:buSzTx/>
-              <a:buFontTx/>
-              <a:buNone/>
-              <a:tabLst/>
+            <a:pPr defTabSz="966612">
               <a:defRPr/>
             </a:pPr>
             <a:r>
-              <a:rPr lang="en-US" sz="1200" dirty="0"/>
+              <a:rPr lang="en-US" sz="1300" dirty="0"/>
               <a:t>In the olden days, you’d have to be </a:t>
             </a:r>
             <a:r>
-              <a:rPr lang="en-US" sz="1200" b="1" dirty="0"/>
+              <a:rPr lang="en-US" sz="1300" b="1" dirty="0"/>
               <a:t>very</a:t>
             </a:r>
             <a:r>
-              <a:rPr lang="en-US" sz="1200" dirty="0"/>
+              <a:rPr lang="en-US" sz="1300" dirty="0"/>
               <a:t> stingy with the amount of iterating you could do and still rely on the logic of significance testing to make the argument that your results should generalize to new samples.</a:t>
             </a:r>
           </a:p>
@@ -9056,7 +8640,7 @@
           <a:p>
             <a:fld id="{48A87A34-81AB-432B-8DAE-1953F412C126}" type="datetimeFigureOut">
               <a:rPr lang="en-US" smtClean="0"/>
-              <a:t>3/26/2019</a:t>
+              <a:t>4/11/2019</a:t>
             </a:fld>
             <a:endParaRPr lang="en-US" dirty="0"/>
           </a:p>
@@ -9344,7 +8928,7 @@
           <a:p>
             <a:fld id="{48A87A34-81AB-432B-8DAE-1953F412C126}" type="datetimeFigureOut">
               <a:rPr lang="en-US" smtClean="0"/>
-              <a:t>3/26/2019</a:t>
+              <a:t>4/11/2019</a:t>
             </a:fld>
             <a:endParaRPr lang="en-US" dirty="0"/>
           </a:p>
@@ -10112,7 +9696,7 @@
           <a:p>
             <a:fld id="{C25EEC7D-36B5-410D-A12B-950009EE4C4D}" type="datetimeFigureOut">
               <a:rPr lang="en-US" smtClean="0"/>
-              <a:t>3/26/2019</a:t>
+              <a:t>4/11/2019</a:t>
             </a:fld>
             <a:endParaRPr lang="en-US"/>
           </a:p>
@@ -10310,7 +9894,7 @@
           <a:p>
             <a:fld id="{C25EEC7D-36B5-410D-A12B-950009EE4C4D}" type="datetimeFigureOut">
               <a:rPr lang="en-US" smtClean="0"/>
-              <a:t>3/26/2019</a:t>
+              <a:t>4/11/2019</a:t>
             </a:fld>
             <a:endParaRPr lang="en-US"/>
           </a:p>
@@ -19409,7 +18993,12 @@
             <p:ph type="title"/>
           </p:nvPr>
         </p:nvSpPr>
-        <p:spPr/>
+        <p:spPr>
+          <a:xfrm>
+            <a:off x="838200" y="524207"/>
+            <a:ext cx="10515600" cy="910957"/>
+          </a:xfrm>
+        </p:spPr>
         <p:txBody>
           <a:bodyPr/>
           <a:lstStyle/>
@@ -19437,7 +19026,12 @@
             <p:ph idx="1"/>
           </p:nvPr>
         </p:nvSpPr>
-        <p:spPr/>
+        <p:spPr>
+          <a:xfrm>
+            <a:off x="838200" y="1567969"/>
+            <a:ext cx="10515600" cy="4351338"/>
+          </a:xfrm>
+        </p:spPr>
         <p:txBody>
           <a:bodyPr>
             <a:noAutofit/>

</xml_diff>

<commit_message>
more final pre-webinar tweaks.
</commit_message>
<xml_diff>
--- a/analytics_for_hmos.pptx
+++ b/analytics_for_hmos.pptx
@@ -244,7 +244,7 @@
           <a:p>
             <a:fld id="{51870728-32F9-4016-A7F9-3908380B41C6}" type="datetimeFigureOut">
               <a:rPr lang="en-US" smtClean="0"/>
-              <a:t>4/11/2019</a:t>
+              <a:t>7/8/2019</a:t>
             </a:fld>
             <a:endParaRPr lang="en-US"/>
           </a:p>
@@ -8640,7 +8640,7 @@
           <a:p>
             <a:fld id="{48A87A34-81AB-432B-8DAE-1953F412C126}" type="datetimeFigureOut">
               <a:rPr lang="en-US" smtClean="0"/>
-              <a:t>4/11/2019</a:t>
+              <a:t>7/8/2019</a:t>
             </a:fld>
             <a:endParaRPr lang="en-US" dirty="0"/>
           </a:p>
@@ -8928,7 +8928,7 @@
           <a:p>
             <a:fld id="{48A87A34-81AB-432B-8DAE-1953F412C126}" type="datetimeFigureOut">
               <a:rPr lang="en-US" smtClean="0"/>
-              <a:t>4/11/2019</a:t>
+              <a:t>7/8/2019</a:t>
             </a:fld>
             <a:endParaRPr lang="en-US" dirty="0"/>
           </a:p>
@@ -9696,7 +9696,7 @@
           <a:p>
             <a:fld id="{C25EEC7D-36B5-410D-A12B-950009EE4C4D}" type="datetimeFigureOut">
               <a:rPr lang="en-US" smtClean="0"/>
-              <a:t>4/11/2019</a:t>
+              <a:t>7/8/2019</a:t>
             </a:fld>
             <a:endParaRPr lang="en-US"/>
           </a:p>
@@ -9894,7 +9894,7 @@
           <a:p>
             <a:fld id="{C25EEC7D-36B5-410D-A12B-950009EE4C4D}" type="datetimeFigureOut">
               <a:rPr lang="en-US" smtClean="0"/>
-              <a:t>4/11/2019</a:t>
+              <a:t>7/8/2019</a:t>
             </a:fld>
             <a:endParaRPr lang="en-US"/>
           </a:p>
@@ -15020,7 +15020,7 @@
         </p:nvSpPr>
         <p:spPr>
           <a:xfrm>
-            <a:off x="8482910" y="4784415"/>
+            <a:off x="8482910" y="4794925"/>
             <a:ext cx="3277104" cy="1195972"/>
           </a:xfrm>
         </p:spPr>

</xml_diff>